<commit_message>
added more plots and slides
</commit_message>
<xml_diff>
--- a/ppt projeto.pptx
+++ b/ppt projeto.pptx
@@ -10,12 +10,25 @@
     <p:sldId id="258" r:id="rId4"/>
     <p:sldId id="259" r:id="rId5"/>
     <p:sldId id="260" r:id="rId6"/>
-    <p:sldId id="261" r:id="rId7"/>
-    <p:sldId id="262" r:id="rId8"/>
-    <p:sldId id="263" r:id="rId9"/>
-    <p:sldId id="264" r:id="rId10"/>
-    <p:sldId id="265" r:id="rId11"/>
-    <p:sldId id="266" r:id="rId12"/>
+    <p:sldId id="278" r:id="rId7"/>
+    <p:sldId id="261" r:id="rId8"/>
+    <p:sldId id="262" r:id="rId9"/>
+    <p:sldId id="263" r:id="rId10"/>
+    <p:sldId id="264" r:id="rId11"/>
+    <p:sldId id="265" r:id="rId12"/>
+    <p:sldId id="266" r:id="rId13"/>
+    <p:sldId id="276" r:id="rId14"/>
+    <p:sldId id="277" r:id="rId15"/>
+    <p:sldId id="275" r:id="rId16"/>
+    <p:sldId id="268" r:id="rId17"/>
+    <p:sldId id="267" r:id="rId18"/>
+    <p:sldId id="269" r:id="rId19"/>
+    <p:sldId id="270" r:id="rId20"/>
+    <p:sldId id="271" r:id="rId21"/>
+    <p:sldId id="273" r:id="rId22"/>
+    <p:sldId id="279" r:id="rId23"/>
+    <p:sldId id="280" r:id="rId24"/>
+    <p:sldId id="274" r:id="rId25"/>
   </p:sldIdLst>
   <p:sldSz cx="12192000" cy="6858000"/>
   <p:notesSz cx="6858000" cy="9144000"/>
@@ -7263,6 +7276,90 @@
           <p:cNvPr id="2" name="Título 1">
             <a:extLst>
               <a:ext uri="{FF2B5EF4-FFF2-40B4-BE49-F238E27FC236}">
+                <a16:creationId xmlns:a16="http://schemas.microsoft.com/office/drawing/2014/main" id="{AD4F8C47-E9F1-5A8E-98E4-BB381FC5CC1B}"/>
+              </a:ext>
+            </a:extLst>
+          </p:cNvPr>
+          <p:cNvSpPr>
+            <a:spLocks noGrp="1"/>
+          </p:cNvSpPr>
+          <p:nvPr>
+            <p:ph type="title"/>
+          </p:nvPr>
+        </p:nvSpPr>
+        <p:spPr/>
+        <p:txBody>
+          <a:bodyPr/>
+          <a:lstStyle/>
+          <a:p>
+            <a:r>
+              <a:rPr lang="pt-PT" dirty="0" err="1"/>
+              <a:t>Results</a:t>
+            </a:r>
+            <a:endParaRPr lang="pt-PT" dirty="0"/>
+          </a:p>
+        </p:txBody>
+      </p:sp>
+      <p:sp>
+        <p:nvSpPr>
+          <p:cNvPr id="3" name="Marcador de Posição de Conteúdo 2">
+            <a:extLst>
+              <a:ext uri="{FF2B5EF4-FFF2-40B4-BE49-F238E27FC236}">
+                <a16:creationId xmlns:a16="http://schemas.microsoft.com/office/drawing/2014/main" id="{74E874F6-0926-BCD5-0745-9366A2D607DA}"/>
+              </a:ext>
+            </a:extLst>
+          </p:cNvPr>
+          <p:cNvSpPr>
+            <a:spLocks noGrp="1"/>
+          </p:cNvSpPr>
+          <p:nvPr>
+            <p:ph idx="1"/>
+          </p:nvPr>
+        </p:nvSpPr>
+        <p:spPr/>
+        <p:txBody>
+          <a:bodyPr/>
+          <a:lstStyle/>
+          <a:p>
+            <a:endParaRPr lang="pt-PT"/>
+          </a:p>
+        </p:txBody>
+      </p:sp>
+    </p:spTree>
+    <p:extLst>
+      <p:ext uri="{BB962C8B-B14F-4D97-AF65-F5344CB8AC3E}">
+        <p14:creationId xmlns:p14="http://schemas.microsoft.com/office/powerpoint/2010/main" val="3698104424"/>
+      </p:ext>
+    </p:extLst>
+  </p:cSld>
+  <p:clrMapOvr>
+    <a:masterClrMapping/>
+  </p:clrMapOvr>
+</p:sld>
+</file>
+
+<file path=ppt/slides/slide11.xml><?xml version="1.0" encoding="utf-8"?>
+<p:sld xmlns:a="http://schemas.openxmlformats.org/drawingml/2006/main" xmlns:r="http://schemas.openxmlformats.org/officeDocument/2006/relationships" xmlns:p="http://schemas.openxmlformats.org/presentationml/2006/main">
+  <p:cSld>
+    <p:spTree>
+      <p:nvGrpSpPr>
+        <p:cNvPr id="1" name=""/>
+        <p:cNvGrpSpPr/>
+        <p:nvPr/>
+      </p:nvGrpSpPr>
+      <p:grpSpPr>
+        <a:xfrm>
+          <a:off x="0" y="0"/>
+          <a:ext cx="0" cy="0"/>
+          <a:chOff x="0" y="0"/>
+          <a:chExt cx="0" cy="0"/>
+        </a:xfrm>
+      </p:grpSpPr>
+      <p:sp>
+        <p:nvSpPr>
+          <p:cNvPr id="2" name="Título 1">
+            <a:extLst>
+              <a:ext uri="{FF2B5EF4-FFF2-40B4-BE49-F238E27FC236}">
                 <a16:creationId xmlns:a16="http://schemas.microsoft.com/office/drawing/2014/main" id="{D9897CC4-F74F-7AFE-AF30-9681DF6B325C}"/>
               </a:ext>
             </a:extLst>
@@ -7325,7 +7422,7 @@
 </p:sld>
 </file>
 
-<file path=ppt/slides/slide11.xml><?xml version="1.0" encoding="utf-8"?>
+<file path=ppt/slides/slide12.xml><?xml version="1.0" encoding="utf-8"?>
 <p:sld xmlns:a="http://schemas.openxmlformats.org/drawingml/2006/main" xmlns:r="http://schemas.openxmlformats.org/officeDocument/2006/relationships" xmlns:p="http://schemas.openxmlformats.org/presentationml/2006/main">
   <p:cSld>
     <p:spTree>
@@ -7400,6 +7497,1295 @@
     <p:extLst>
       <p:ext uri="{BB962C8B-B14F-4D97-AF65-F5344CB8AC3E}">
         <p14:creationId xmlns:p14="http://schemas.microsoft.com/office/powerpoint/2010/main" val="3817316989"/>
+      </p:ext>
+    </p:extLst>
+  </p:cSld>
+  <p:clrMapOvr>
+    <a:masterClrMapping/>
+  </p:clrMapOvr>
+</p:sld>
+</file>
+
+<file path=ppt/slides/slide13.xml><?xml version="1.0" encoding="utf-8"?>
+<p:sld xmlns:a="http://schemas.openxmlformats.org/drawingml/2006/main" xmlns:r="http://schemas.openxmlformats.org/officeDocument/2006/relationships" xmlns:p="http://schemas.openxmlformats.org/presentationml/2006/main">
+  <p:cSld>
+    <p:spTree>
+      <p:nvGrpSpPr>
+        <p:cNvPr id="1" name=""/>
+        <p:cNvGrpSpPr/>
+        <p:nvPr/>
+      </p:nvGrpSpPr>
+      <p:grpSpPr>
+        <a:xfrm>
+          <a:off x="0" y="0"/>
+          <a:ext cx="0" cy="0"/>
+          <a:chOff x="0" y="0"/>
+          <a:chExt cx="0" cy="0"/>
+        </a:xfrm>
+      </p:grpSpPr>
+      <p:sp>
+        <p:nvSpPr>
+          <p:cNvPr id="2" name="Title 1">
+            <a:extLst>
+              <a:ext uri="{FF2B5EF4-FFF2-40B4-BE49-F238E27FC236}">
+                <a16:creationId xmlns:a16="http://schemas.microsoft.com/office/drawing/2014/main" id="{7CCF727A-69B0-67ED-2E37-1D58A1B40F1A}"/>
+              </a:ext>
+            </a:extLst>
+          </p:cNvPr>
+          <p:cNvSpPr>
+            <a:spLocks noGrp="1"/>
+          </p:cNvSpPr>
+          <p:nvPr>
+            <p:ph type="title"/>
+          </p:nvPr>
+        </p:nvSpPr>
+        <p:spPr>
+          <a:xfrm>
+            <a:off x="1086928" y="382385"/>
+            <a:ext cx="10791646" cy="1492132"/>
+          </a:xfrm>
+        </p:spPr>
+        <p:txBody>
+          <a:bodyPr/>
+          <a:lstStyle/>
+          <a:p>
+            <a:r>
+              <a:rPr lang="en-US" dirty="0"/>
+              <a:t>Evaluation Methodology: problems</a:t>
+            </a:r>
+          </a:p>
+        </p:txBody>
+      </p:sp>
+      <p:sp>
+        <p:nvSpPr>
+          <p:cNvPr id="3" name="Content Placeholder 2">
+            <a:extLst>
+              <a:ext uri="{FF2B5EF4-FFF2-40B4-BE49-F238E27FC236}">
+                <a16:creationId xmlns:a16="http://schemas.microsoft.com/office/drawing/2014/main" id="{15FA2797-CAF7-7C29-6BD5-BFA3A69B3929}"/>
+              </a:ext>
+            </a:extLst>
+          </p:cNvPr>
+          <p:cNvSpPr>
+            <a:spLocks noGrp="1"/>
+          </p:cNvSpPr>
+          <p:nvPr>
+            <p:ph idx="1"/>
+          </p:nvPr>
+        </p:nvSpPr>
+        <p:spPr/>
+        <p:txBody>
+          <a:bodyPr/>
+          <a:lstStyle/>
+          <a:p>
+            <a:r>
+              <a:rPr lang="en-US" dirty="0"/>
+              <a:t>In this project, we did not use the Hold-out methodology for evaluating our models since this technique does not provide sufficient data training the models. For this reason, we applied the Stratified K Folding methodology. However, the standard implementation of this technique is not suitable for the problem at hand since it splits the data regardless of its semantical meaning. </a:t>
+            </a:r>
+          </a:p>
+          <a:p>
+            <a:r>
+              <a:rPr lang="en-US" dirty="0"/>
+              <a:t>In this case, a likely scenario would be, for example, training the model with portions of data from seasons 5 and 8, but testing would be done with the complete data from season 7.  This is not a realistic scenario; therefore, it cannot be used to train and evaluate our models.</a:t>
+            </a:r>
+          </a:p>
+        </p:txBody>
+      </p:sp>
+    </p:spTree>
+    <p:extLst>
+      <p:ext uri="{BB962C8B-B14F-4D97-AF65-F5344CB8AC3E}">
+        <p14:creationId xmlns:p14="http://schemas.microsoft.com/office/powerpoint/2010/main" val="687550049"/>
+      </p:ext>
+    </p:extLst>
+  </p:cSld>
+  <p:clrMapOvr>
+    <a:masterClrMapping/>
+  </p:clrMapOvr>
+</p:sld>
+</file>
+
+<file path=ppt/slides/slide14.xml><?xml version="1.0" encoding="utf-8"?>
+<p:sld xmlns:a="http://schemas.openxmlformats.org/drawingml/2006/main" xmlns:r="http://schemas.openxmlformats.org/officeDocument/2006/relationships" xmlns:p="http://schemas.openxmlformats.org/presentationml/2006/main">
+  <p:cSld>
+    <p:spTree>
+      <p:nvGrpSpPr>
+        <p:cNvPr id="1" name=""/>
+        <p:cNvGrpSpPr/>
+        <p:nvPr/>
+      </p:nvGrpSpPr>
+      <p:grpSpPr>
+        <a:xfrm>
+          <a:off x="0" y="0"/>
+          <a:ext cx="0" cy="0"/>
+          <a:chOff x="0" y="0"/>
+          <a:chExt cx="0" cy="0"/>
+        </a:xfrm>
+      </p:grpSpPr>
+      <p:sp>
+        <p:nvSpPr>
+          <p:cNvPr id="2" name="Title 1">
+            <a:extLst>
+              <a:ext uri="{FF2B5EF4-FFF2-40B4-BE49-F238E27FC236}">
+                <a16:creationId xmlns:a16="http://schemas.microsoft.com/office/drawing/2014/main" id="{01328B24-357B-1C73-730A-6F6D0AD7EDCB}"/>
+              </a:ext>
+            </a:extLst>
+          </p:cNvPr>
+          <p:cNvSpPr>
+            <a:spLocks noGrp="1"/>
+          </p:cNvSpPr>
+          <p:nvPr>
+            <p:ph type="title"/>
+          </p:nvPr>
+        </p:nvSpPr>
+        <p:spPr>
+          <a:xfrm>
+            <a:off x="1048957" y="373759"/>
+            <a:ext cx="10583764" cy="1492132"/>
+          </a:xfrm>
+        </p:spPr>
+        <p:txBody>
+          <a:bodyPr/>
+          <a:lstStyle/>
+          <a:p>
+            <a:r>
+              <a:rPr lang="en-US" dirty="0"/>
+              <a:t>Evaluation Methodology: Solution</a:t>
+            </a:r>
+            <a:endParaRPr lang="pt-PT" dirty="0"/>
+          </a:p>
+        </p:txBody>
+      </p:sp>
+      <p:sp>
+        <p:nvSpPr>
+          <p:cNvPr id="3" name="Content Placeholder 2">
+            <a:extLst>
+              <a:ext uri="{FF2B5EF4-FFF2-40B4-BE49-F238E27FC236}">
+                <a16:creationId xmlns:a16="http://schemas.microsoft.com/office/drawing/2014/main" id="{C2FE6B95-8C37-6837-AEB6-768D4BCF8FFD}"/>
+              </a:ext>
+            </a:extLst>
+          </p:cNvPr>
+          <p:cNvSpPr>
+            <a:spLocks noGrp="1"/>
+          </p:cNvSpPr>
+          <p:nvPr>
+            <p:ph idx="1"/>
+          </p:nvPr>
+        </p:nvSpPr>
+        <p:spPr>
+          <a:xfrm>
+            <a:off x="1251678" y="2286001"/>
+            <a:ext cx="10178322" cy="3821501"/>
+          </a:xfrm>
+        </p:spPr>
+        <p:txBody>
+          <a:bodyPr>
+            <a:normAutofit fontScale="92500" lnSpcReduction="10000"/>
+          </a:bodyPr>
+          <a:lstStyle/>
+          <a:p>
+            <a:r>
+              <a:rPr lang="en-US" dirty="0"/>
+              <a:t>To implement a version of the Stratified K Folding technique that pays attention to the semantic meaning of the data, we followed the advice given in the theoretical classes.</a:t>
+            </a:r>
+          </a:p>
+          <a:p>
+            <a:r>
+              <a:rPr lang="en-US" dirty="0"/>
+              <a:t>Instead of grouping random data from the main dataset into k folds, we implemented an alternative that mimics the functioning of a sliding window. </a:t>
+            </a:r>
+          </a:p>
+          <a:p>
+            <a:r>
+              <a:rPr lang="en-US" dirty="0"/>
+              <a:t>Each fold only contains data from complete seasons.</a:t>
+            </a:r>
+          </a:p>
+          <a:p>
+            <a:r>
+              <a:rPr lang="en-US" dirty="0"/>
+              <a:t>The several folds are obtained by adjusting the time delta of the algorithm. For example, if the dataset contains data from 6 years and we are dividing the data into 3 folds, each fold will contain the data corresponding to 2 years.</a:t>
+            </a:r>
+          </a:p>
+          <a:p>
+            <a:r>
+              <a:rPr lang="en-US" dirty="0"/>
+              <a:t>Using this approach, we were able to train our models with different window sizes, keeping their semantic meaning and simulating a realistic situation, therefore resulting in more reliable predictions.</a:t>
+            </a:r>
+          </a:p>
+        </p:txBody>
+      </p:sp>
+    </p:spTree>
+    <p:extLst>
+      <p:ext uri="{BB962C8B-B14F-4D97-AF65-F5344CB8AC3E}">
+        <p14:creationId xmlns:p14="http://schemas.microsoft.com/office/powerpoint/2010/main" val="2539666551"/>
+      </p:ext>
+    </p:extLst>
+  </p:cSld>
+  <p:clrMapOvr>
+    <a:masterClrMapping/>
+  </p:clrMapOvr>
+</p:sld>
+</file>
+
+<file path=ppt/slides/slide15.xml><?xml version="1.0" encoding="utf-8"?>
+<p:sld xmlns:a="http://schemas.openxmlformats.org/drawingml/2006/main" xmlns:r="http://schemas.openxmlformats.org/officeDocument/2006/relationships" xmlns:p="http://schemas.openxmlformats.org/presentationml/2006/main">
+  <p:cSld>
+    <p:spTree>
+      <p:nvGrpSpPr>
+        <p:cNvPr id="1" name=""/>
+        <p:cNvGrpSpPr/>
+        <p:nvPr/>
+      </p:nvGrpSpPr>
+      <p:grpSpPr>
+        <a:xfrm>
+          <a:off x="0" y="0"/>
+          <a:ext cx="0" cy="0"/>
+          <a:chOff x="0" y="0"/>
+          <a:chExt cx="0" cy="0"/>
+        </a:xfrm>
+      </p:grpSpPr>
+      <p:sp>
+        <p:nvSpPr>
+          <p:cNvPr id="2" name="Title 1">
+            <a:extLst>
+              <a:ext uri="{FF2B5EF4-FFF2-40B4-BE49-F238E27FC236}">
+                <a16:creationId xmlns:a16="http://schemas.microsoft.com/office/drawing/2014/main" id="{9BCA46AD-B0D0-1383-A109-8435C17452CC}"/>
+              </a:ext>
+            </a:extLst>
+          </p:cNvPr>
+          <p:cNvSpPr>
+            <a:spLocks noGrp="1"/>
+          </p:cNvSpPr>
+          <p:nvPr>
+            <p:ph type="title"/>
+          </p:nvPr>
+        </p:nvSpPr>
+        <p:spPr/>
+        <p:txBody>
+          <a:bodyPr/>
+          <a:lstStyle/>
+          <a:p>
+            <a:r>
+              <a:rPr lang="pt-PT" dirty="0" err="1"/>
+              <a:t>Lagged</a:t>
+            </a:r>
+            <a:r>
+              <a:rPr lang="pt-PT" dirty="0"/>
+              <a:t> </a:t>
+            </a:r>
+            <a:r>
+              <a:rPr lang="pt-PT" dirty="0" err="1"/>
+              <a:t>features</a:t>
+            </a:r>
+            <a:r>
+              <a:rPr lang="pt-PT" dirty="0"/>
+              <a:t> </a:t>
+            </a:r>
+            <a:r>
+              <a:rPr lang="pt-PT" dirty="0" err="1"/>
+              <a:t>idea</a:t>
+            </a:r>
+            <a:endParaRPr lang="pt-PT" dirty="0"/>
+          </a:p>
+        </p:txBody>
+      </p:sp>
+      <p:sp>
+        <p:nvSpPr>
+          <p:cNvPr id="3" name="Content Placeholder 2">
+            <a:extLst>
+              <a:ext uri="{FF2B5EF4-FFF2-40B4-BE49-F238E27FC236}">
+                <a16:creationId xmlns:a16="http://schemas.microsoft.com/office/drawing/2014/main" id="{A7BF94BD-C26B-B459-6395-09B9133FC427}"/>
+              </a:ext>
+            </a:extLst>
+          </p:cNvPr>
+          <p:cNvSpPr>
+            <a:spLocks noGrp="1"/>
+          </p:cNvSpPr>
+          <p:nvPr>
+            <p:ph idx="1"/>
+          </p:nvPr>
+        </p:nvSpPr>
+        <p:spPr/>
+        <p:txBody>
+          <a:bodyPr/>
+          <a:lstStyle/>
+          <a:p>
+            <a:r>
+              <a:rPr lang="en-US" dirty="0"/>
+              <a:t>To complement the Sliding Window methodology, we applied Feature Engineering to our data.</a:t>
+            </a:r>
+          </a:p>
+          <a:p>
+            <a:r>
+              <a:rPr lang="en-US" dirty="0" err="1">
+                <a:solidFill>
+                  <a:srgbClr val="FF0000"/>
+                </a:solidFill>
+              </a:rPr>
+              <a:t>Precisa</a:t>
+            </a:r>
+            <a:r>
+              <a:rPr lang="en-US" dirty="0">
+                <a:solidFill>
+                  <a:srgbClr val="FF0000"/>
+                </a:solidFill>
+              </a:rPr>
+              <a:t> de ser </a:t>
+            </a:r>
+            <a:r>
+              <a:rPr lang="en-US" dirty="0" err="1">
+                <a:solidFill>
+                  <a:srgbClr val="FF0000"/>
+                </a:solidFill>
+              </a:rPr>
+              <a:t>descrito</a:t>
+            </a:r>
+            <a:endParaRPr lang="en-US" dirty="0">
+              <a:solidFill>
+                <a:srgbClr val="FF0000"/>
+              </a:solidFill>
+            </a:endParaRPr>
+          </a:p>
+          <a:p>
+            <a:endParaRPr lang="en-US" dirty="0"/>
+          </a:p>
+        </p:txBody>
+      </p:sp>
+    </p:spTree>
+    <p:extLst>
+      <p:ext uri="{BB962C8B-B14F-4D97-AF65-F5344CB8AC3E}">
+        <p14:creationId xmlns:p14="http://schemas.microsoft.com/office/powerpoint/2010/main" val="956684522"/>
+      </p:ext>
+    </p:extLst>
+  </p:cSld>
+  <p:clrMapOvr>
+    <a:masterClrMapping/>
+  </p:clrMapOvr>
+</p:sld>
+</file>
+
+<file path=ppt/slides/slide16.xml><?xml version="1.0" encoding="utf-8"?>
+<p:sld xmlns:a="http://schemas.openxmlformats.org/drawingml/2006/main" xmlns:r="http://schemas.openxmlformats.org/officeDocument/2006/relationships" xmlns:p="http://schemas.openxmlformats.org/presentationml/2006/main">
+  <p:cSld>
+    <p:spTree>
+      <p:nvGrpSpPr>
+        <p:cNvPr id="1" name=""/>
+        <p:cNvGrpSpPr/>
+        <p:nvPr/>
+      </p:nvGrpSpPr>
+      <p:grpSpPr>
+        <a:xfrm>
+          <a:off x="0" y="0"/>
+          <a:ext cx="0" cy="0"/>
+          <a:chOff x="0" y="0"/>
+          <a:chExt cx="0" cy="0"/>
+        </a:xfrm>
+      </p:grpSpPr>
+      <p:sp>
+        <p:nvSpPr>
+          <p:cNvPr id="2" name="Title 1">
+            <a:extLst>
+              <a:ext uri="{FF2B5EF4-FFF2-40B4-BE49-F238E27FC236}">
+                <a16:creationId xmlns:a16="http://schemas.microsoft.com/office/drawing/2014/main" id="{771FFD99-BE56-28B6-36A2-8C5D0A5C3332}"/>
+              </a:ext>
+            </a:extLst>
+          </p:cNvPr>
+          <p:cNvSpPr>
+            <a:spLocks noGrp="1"/>
+          </p:cNvSpPr>
+          <p:nvPr>
+            <p:ph type="title"/>
+          </p:nvPr>
+        </p:nvSpPr>
+        <p:spPr/>
+        <p:txBody>
+          <a:bodyPr/>
+          <a:lstStyle/>
+          <a:p>
+            <a:r>
+              <a:rPr lang="pt-PT" dirty="0"/>
+              <a:t>ML MODELS </a:t>
+            </a:r>
+            <a:r>
+              <a:rPr lang="pt-PT" dirty="0" err="1"/>
+              <a:t>EXplored</a:t>
+            </a:r>
+            <a:endParaRPr lang="pt-PT" dirty="0"/>
+          </a:p>
+        </p:txBody>
+      </p:sp>
+      <p:sp>
+        <p:nvSpPr>
+          <p:cNvPr id="3" name="Content Placeholder 2">
+            <a:extLst>
+              <a:ext uri="{FF2B5EF4-FFF2-40B4-BE49-F238E27FC236}">
+                <a16:creationId xmlns:a16="http://schemas.microsoft.com/office/drawing/2014/main" id="{2D851BEA-9B0F-393F-4520-EAC95A04C792}"/>
+              </a:ext>
+            </a:extLst>
+          </p:cNvPr>
+          <p:cNvSpPr>
+            <a:spLocks noGrp="1"/>
+          </p:cNvSpPr>
+          <p:nvPr>
+            <p:ph idx="1"/>
+          </p:nvPr>
+        </p:nvSpPr>
+        <p:spPr/>
+        <p:txBody>
+          <a:bodyPr>
+            <a:normAutofit fontScale="85000" lnSpcReduction="10000"/>
+          </a:bodyPr>
+          <a:lstStyle/>
+          <a:p>
+            <a:r>
+              <a:rPr lang="en-US" dirty="0"/>
+              <a:t>In the upcoming slide, we will enumerate the Machine Learning models utilized for predicting the qualification of basketball teams for the playoffs.</a:t>
+            </a:r>
+          </a:p>
+          <a:p>
+            <a:r>
+              <a:rPr lang="en-US" dirty="0"/>
+              <a:t>In this project, we explored both regression and classifier models, depending on our target variable.</a:t>
+            </a:r>
+          </a:p>
+          <a:p>
+            <a:r>
+              <a:rPr lang="en-US" dirty="0"/>
+              <a:t>The regression models were used to predict each player future performance, by computing the value of the player’s EFF and DPR performance metrics in the upcoming season. Furthermore, we also used this type models to predict the likelihood of the team’s qualification to the playoff. </a:t>
+            </a:r>
+          </a:p>
+          <a:p>
+            <a:r>
+              <a:rPr lang="en-US" dirty="0"/>
+              <a:t>We opted for regression models over classifiers due to our specific objective of computing a score ranging from 0 to 1, a metric that would determine the top 8 teams eligible for playoff qualification. This approach allowed us to scrutinize and compare the likelihoods of qualification, enabling us to select the most suitable ones, rather than blindly designating 8 teams with a "Y" label, devoid of additional criteria.</a:t>
+            </a:r>
+          </a:p>
+          <a:p>
+            <a:r>
+              <a:rPr lang="en-US" dirty="0"/>
+              <a:t>However, for didactic purposes, we also employed classifier models to forecast playoff qualification, offering a valuable basis for contrasting the outcomes against those produced by the regression models.</a:t>
+            </a:r>
+          </a:p>
+        </p:txBody>
+      </p:sp>
+    </p:spTree>
+    <p:extLst>
+      <p:ext uri="{BB962C8B-B14F-4D97-AF65-F5344CB8AC3E}">
+        <p14:creationId xmlns:p14="http://schemas.microsoft.com/office/powerpoint/2010/main" val="1154948114"/>
+      </p:ext>
+    </p:extLst>
+  </p:cSld>
+  <p:clrMapOvr>
+    <a:masterClrMapping/>
+  </p:clrMapOvr>
+</p:sld>
+</file>
+
+<file path=ppt/slides/slide17.xml><?xml version="1.0" encoding="utf-8"?>
+<p:sld xmlns:a="http://schemas.openxmlformats.org/drawingml/2006/main" xmlns:r="http://schemas.openxmlformats.org/officeDocument/2006/relationships" xmlns:p="http://schemas.openxmlformats.org/presentationml/2006/main">
+  <p:cSld>
+    <p:spTree>
+      <p:nvGrpSpPr>
+        <p:cNvPr id="1" name=""/>
+        <p:cNvGrpSpPr/>
+        <p:nvPr/>
+      </p:nvGrpSpPr>
+      <p:grpSpPr>
+        <a:xfrm>
+          <a:off x="0" y="0"/>
+          <a:ext cx="0" cy="0"/>
+          <a:chOff x="0" y="0"/>
+          <a:chExt cx="0" cy="0"/>
+        </a:xfrm>
+      </p:grpSpPr>
+      <p:sp>
+        <p:nvSpPr>
+          <p:cNvPr id="2" name="Title 1">
+            <a:extLst>
+              <a:ext uri="{FF2B5EF4-FFF2-40B4-BE49-F238E27FC236}">
+                <a16:creationId xmlns:a16="http://schemas.microsoft.com/office/drawing/2014/main" id="{E2B5D58C-621B-9CE6-F53B-595EE192AE01}"/>
+              </a:ext>
+            </a:extLst>
+          </p:cNvPr>
+          <p:cNvSpPr>
+            <a:spLocks noGrp="1"/>
+          </p:cNvSpPr>
+          <p:nvPr>
+            <p:ph type="title"/>
+          </p:nvPr>
+        </p:nvSpPr>
+        <p:spPr/>
+        <p:txBody>
+          <a:bodyPr/>
+          <a:lstStyle/>
+          <a:p>
+            <a:r>
+              <a:rPr lang="pt-PT" dirty="0"/>
+              <a:t>ML </a:t>
+            </a:r>
+            <a:r>
+              <a:rPr lang="pt-PT" dirty="0" err="1"/>
+              <a:t>Models</a:t>
+            </a:r>
+            <a:r>
+              <a:rPr lang="pt-PT" dirty="0"/>
+              <a:t> </a:t>
+            </a:r>
+            <a:r>
+              <a:rPr lang="pt-PT" dirty="0" err="1"/>
+              <a:t>explored</a:t>
+            </a:r>
+            <a:endParaRPr lang="pt-PT" dirty="0"/>
+          </a:p>
+        </p:txBody>
+      </p:sp>
+      <p:sp>
+        <p:nvSpPr>
+          <p:cNvPr id="3" name="Content Placeholder 2">
+            <a:extLst>
+              <a:ext uri="{FF2B5EF4-FFF2-40B4-BE49-F238E27FC236}">
+                <a16:creationId xmlns:a16="http://schemas.microsoft.com/office/drawing/2014/main" id="{262A59F9-0FFE-FF01-0D39-09C35D6658D4}"/>
+              </a:ext>
+            </a:extLst>
+          </p:cNvPr>
+          <p:cNvSpPr>
+            <a:spLocks noGrp="1"/>
+          </p:cNvSpPr>
+          <p:nvPr>
+            <p:ph idx="1"/>
+          </p:nvPr>
+        </p:nvSpPr>
+        <p:spPr>
+          <a:xfrm>
+            <a:off x="1251678" y="2286001"/>
+            <a:ext cx="10178322" cy="3942271"/>
+          </a:xfrm>
+        </p:spPr>
+        <p:txBody>
+          <a:bodyPr numCol="2">
+            <a:normAutofit/>
+          </a:bodyPr>
+          <a:lstStyle/>
+          <a:p>
+            <a:r>
+              <a:rPr lang="pt-PT" dirty="0" err="1"/>
+              <a:t>Regression</a:t>
+            </a:r>
+            <a:r>
+              <a:rPr lang="pt-PT" dirty="0"/>
+              <a:t> </a:t>
+            </a:r>
+            <a:r>
+              <a:rPr lang="pt-PT" dirty="0" err="1"/>
+              <a:t>models</a:t>
+            </a:r>
+            <a:r>
+              <a:rPr lang="pt-PT" dirty="0"/>
+              <a:t>:</a:t>
+            </a:r>
+          </a:p>
+          <a:p>
+            <a:pPr lvl="1"/>
+            <a:r>
+              <a:rPr lang="pt-PT" dirty="0"/>
+              <a:t>Linear </a:t>
+            </a:r>
+            <a:r>
+              <a:rPr lang="pt-PT" dirty="0" err="1"/>
+              <a:t>Regression</a:t>
+            </a:r>
+            <a:endParaRPr lang="pt-PT" dirty="0"/>
+          </a:p>
+          <a:p>
+            <a:pPr lvl="1"/>
+            <a:r>
+              <a:rPr lang="pt-PT" dirty="0" err="1"/>
+              <a:t>Random</a:t>
+            </a:r>
+            <a:r>
+              <a:rPr lang="pt-PT" dirty="0"/>
+              <a:t> </a:t>
+            </a:r>
+            <a:r>
+              <a:rPr lang="pt-PT" dirty="0" err="1"/>
+              <a:t>Forest</a:t>
+            </a:r>
+            <a:r>
+              <a:rPr lang="pt-PT" dirty="0"/>
+              <a:t> </a:t>
+            </a:r>
+            <a:r>
+              <a:rPr lang="pt-PT" dirty="0" err="1"/>
+              <a:t>Regressor</a:t>
+            </a:r>
+            <a:endParaRPr lang="pt-PT" dirty="0"/>
+          </a:p>
+          <a:p>
+            <a:pPr lvl="1"/>
+            <a:r>
+              <a:rPr lang="pt-PT" dirty="0"/>
+              <a:t>Gradiente </a:t>
+            </a:r>
+            <a:r>
+              <a:rPr lang="pt-PT" dirty="0" err="1"/>
+              <a:t>Boosting</a:t>
+            </a:r>
+            <a:r>
+              <a:rPr lang="pt-PT" dirty="0"/>
+              <a:t> </a:t>
+            </a:r>
+            <a:r>
+              <a:rPr lang="pt-PT" dirty="0" err="1"/>
+              <a:t>Regressor</a:t>
+            </a:r>
+            <a:endParaRPr lang="pt-PT" dirty="0"/>
+          </a:p>
+          <a:p>
+            <a:pPr lvl="1"/>
+            <a:r>
+              <a:rPr lang="pt-PT" dirty="0" err="1"/>
+              <a:t>Support</a:t>
+            </a:r>
+            <a:r>
+              <a:rPr lang="pt-PT" dirty="0"/>
+              <a:t> </a:t>
+            </a:r>
+            <a:r>
+              <a:rPr lang="pt-PT" dirty="0" err="1"/>
+              <a:t>Vector</a:t>
+            </a:r>
+            <a:r>
+              <a:rPr lang="pt-PT" dirty="0"/>
+              <a:t> </a:t>
+            </a:r>
+            <a:r>
+              <a:rPr lang="pt-PT" dirty="0" err="1"/>
+              <a:t>Regressor</a:t>
+            </a:r>
+            <a:endParaRPr lang="pt-PT" dirty="0"/>
+          </a:p>
+          <a:p>
+            <a:pPr lvl="1"/>
+            <a:r>
+              <a:rPr lang="pt-PT" dirty="0" err="1"/>
+              <a:t>Ridge</a:t>
+            </a:r>
+            <a:r>
+              <a:rPr lang="pt-PT" dirty="0"/>
+              <a:t> </a:t>
+            </a:r>
+            <a:r>
+              <a:rPr lang="pt-PT" dirty="0" err="1"/>
+              <a:t>Regression</a:t>
+            </a:r>
+            <a:endParaRPr lang="pt-PT" dirty="0"/>
+          </a:p>
+          <a:p>
+            <a:pPr lvl="1"/>
+            <a:r>
+              <a:rPr lang="pt-PT" dirty="0"/>
+              <a:t>Lasso </a:t>
+            </a:r>
+            <a:r>
+              <a:rPr lang="pt-PT" dirty="0" err="1"/>
+              <a:t>Regression</a:t>
+            </a:r>
+            <a:endParaRPr lang="pt-PT" dirty="0"/>
+          </a:p>
+          <a:p>
+            <a:pPr lvl="1"/>
+            <a:r>
+              <a:rPr lang="pt-PT" dirty="0"/>
+              <a:t>MLP </a:t>
+            </a:r>
+            <a:r>
+              <a:rPr lang="pt-PT" dirty="0" err="1"/>
+              <a:t>Regressor</a:t>
+            </a:r>
+            <a:endParaRPr lang="pt-PT" dirty="0"/>
+          </a:p>
+          <a:p>
+            <a:pPr lvl="1"/>
+            <a:endParaRPr lang="pt-PT" dirty="0"/>
+          </a:p>
+          <a:p>
+            <a:pPr lvl="1"/>
+            <a:endParaRPr lang="pt-PT" dirty="0"/>
+          </a:p>
+          <a:p>
+            <a:pPr lvl="1">
+              <a:buFont typeface="Arial" panose="020B0604020202020204" pitchFamily="34" charset="0"/>
+              <a:buChar char="•"/>
+            </a:pPr>
+            <a:r>
+              <a:rPr lang="pt-PT" dirty="0" err="1"/>
+              <a:t>Classifier</a:t>
+            </a:r>
+            <a:r>
+              <a:rPr lang="pt-PT" dirty="0"/>
+              <a:t> </a:t>
+            </a:r>
+            <a:r>
+              <a:rPr lang="pt-PT" dirty="0" err="1"/>
+              <a:t>models</a:t>
+            </a:r>
+            <a:r>
+              <a:rPr lang="pt-PT" dirty="0"/>
+              <a:t>:</a:t>
+            </a:r>
+          </a:p>
+          <a:p>
+            <a:pPr lvl="2">
+              <a:buFont typeface="Gill Sans MT" panose="020B0502020104020203" pitchFamily="34" charset="0"/>
+              <a:buChar char="–"/>
+            </a:pPr>
+            <a:r>
+              <a:rPr lang="pt-PT" dirty="0"/>
+              <a:t>Linear SVC</a:t>
+            </a:r>
+          </a:p>
+          <a:p>
+            <a:pPr lvl="2">
+              <a:buFont typeface="Gill Sans MT" panose="020B0502020104020203" pitchFamily="34" charset="0"/>
+              <a:buChar char="–"/>
+            </a:pPr>
+            <a:r>
+              <a:rPr lang="pt-PT" dirty="0" err="1"/>
+              <a:t>Naive</a:t>
+            </a:r>
+            <a:r>
+              <a:rPr lang="pt-PT" dirty="0"/>
+              <a:t> </a:t>
+            </a:r>
+            <a:r>
+              <a:rPr lang="pt-PT" dirty="0" err="1"/>
+              <a:t>Bayes</a:t>
+            </a:r>
+            <a:endParaRPr lang="pt-PT" dirty="0"/>
+          </a:p>
+          <a:p>
+            <a:pPr lvl="2">
+              <a:buFont typeface="Gill Sans MT" panose="020B0502020104020203" pitchFamily="34" charset="0"/>
+              <a:buChar char="–"/>
+            </a:pPr>
+            <a:r>
+              <a:rPr lang="pt-PT" dirty="0"/>
+              <a:t>K-</a:t>
+            </a:r>
+            <a:r>
+              <a:rPr lang="pt-PT" dirty="0" err="1"/>
+              <a:t>Nearest</a:t>
+            </a:r>
+            <a:r>
+              <a:rPr lang="pt-PT" dirty="0"/>
+              <a:t> </a:t>
+            </a:r>
+            <a:r>
+              <a:rPr lang="pt-PT" dirty="0" err="1"/>
+              <a:t>Neighbours</a:t>
+            </a:r>
+            <a:r>
+              <a:rPr lang="pt-PT" dirty="0"/>
+              <a:t> </a:t>
+            </a:r>
+            <a:r>
+              <a:rPr lang="pt-PT" dirty="0" err="1"/>
+              <a:t>Classifier</a:t>
+            </a:r>
+            <a:endParaRPr lang="pt-PT" dirty="0"/>
+          </a:p>
+          <a:p>
+            <a:pPr lvl="2">
+              <a:buFont typeface="Gill Sans MT" panose="020B0502020104020203" pitchFamily="34" charset="0"/>
+              <a:buChar char="–"/>
+            </a:pPr>
+            <a:r>
+              <a:rPr lang="pt-PT" dirty="0" err="1"/>
+              <a:t>Support</a:t>
+            </a:r>
+            <a:r>
+              <a:rPr lang="pt-PT" dirty="0"/>
+              <a:t> </a:t>
+            </a:r>
+            <a:r>
+              <a:rPr lang="pt-PT" dirty="0" err="1"/>
+              <a:t>Vector</a:t>
+            </a:r>
+            <a:r>
+              <a:rPr lang="pt-PT" dirty="0"/>
+              <a:t> </a:t>
+            </a:r>
+            <a:r>
+              <a:rPr lang="pt-PT" dirty="0" err="1"/>
+              <a:t>Classifier</a:t>
+            </a:r>
+            <a:endParaRPr lang="pt-PT" dirty="0"/>
+          </a:p>
+          <a:p>
+            <a:pPr lvl="2">
+              <a:buFont typeface="Gill Sans MT" panose="020B0502020104020203" pitchFamily="34" charset="0"/>
+              <a:buChar char="–"/>
+            </a:pPr>
+            <a:r>
+              <a:rPr lang="pt-PT" dirty="0" err="1"/>
+              <a:t>Voting</a:t>
+            </a:r>
+            <a:r>
+              <a:rPr lang="pt-PT" dirty="0"/>
+              <a:t> </a:t>
+            </a:r>
+            <a:r>
+              <a:rPr lang="pt-PT" dirty="0" err="1"/>
+              <a:t>Classifier</a:t>
+            </a:r>
+            <a:r>
+              <a:rPr lang="pt-PT" dirty="0"/>
+              <a:t> (Ensemble)</a:t>
+            </a:r>
+          </a:p>
+          <a:p>
+            <a:pPr lvl="3"/>
+            <a:r>
+              <a:rPr lang="pt-PT" dirty="0" err="1"/>
+              <a:t>Logistic</a:t>
+            </a:r>
+            <a:r>
+              <a:rPr lang="pt-PT" dirty="0"/>
+              <a:t> </a:t>
+            </a:r>
+            <a:r>
+              <a:rPr lang="pt-PT" dirty="0" err="1"/>
+              <a:t>Regression</a:t>
+            </a:r>
+            <a:endParaRPr lang="pt-PT" dirty="0"/>
+          </a:p>
+          <a:p>
+            <a:pPr lvl="3"/>
+            <a:r>
+              <a:rPr lang="pt-PT" dirty="0" err="1"/>
+              <a:t>Random</a:t>
+            </a:r>
+            <a:r>
+              <a:rPr lang="pt-PT" dirty="0"/>
+              <a:t> </a:t>
+            </a:r>
+            <a:r>
+              <a:rPr lang="pt-PT" dirty="0" err="1"/>
+              <a:t>Forest</a:t>
+            </a:r>
+            <a:r>
+              <a:rPr lang="pt-PT" dirty="0"/>
+              <a:t> </a:t>
+            </a:r>
+            <a:r>
+              <a:rPr lang="pt-PT" dirty="0" err="1"/>
+              <a:t>Classifier</a:t>
+            </a:r>
+            <a:endParaRPr lang="pt-PT" dirty="0"/>
+          </a:p>
+          <a:p>
+            <a:pPr lvl="3"/>
+            <a:r>
+              <a:rPr lang="pt-PT" dirty="0" err="1"/>
+              <a:t>Decision</a:t>
+            </a:r>
+            <a:r>
+              <a:rPr lang="pt-PT" dirty="0"/>
+              <a:t> </a:t>
+            </a:r>
+            <a:r>
+              <a:rPr lang="pt-PT" dirty="0" err="1"/>
+              <a:t>Tree</a:t>
+            </a:r>
+            <a:r>
+              <a:rPr lang="pt-PT" dirty="0"/>
+              <a:t> </a:t>
+            </a:r>
+            <a:r>
+              <a:rPr lang="pt-PT" dirty="0" err="1"/>
+              <a:t>Classifier</a:t>
+            </a:r>
+            <a:endParaRPr lang="pt-PT" dirty="0"/>
+          </a:p>
+          <a:p>
+            <a:pPr lvl="1">
+              <a:buFont typeface="Arial" panose="020B0604020202020204" pitchFamily="34" charset="0"/>
+              <a:buChar char="•"/>
+            </a:pPr>
+            <a:endParaRPr lang="pt-PT" dirty="0"/>
+          </a:p>
+          <a:p>
+            <a:pPr lvl="2"/>
+            <a:endParaRPr lang="pt-PT" dirty="0"/>
+          </a:p>
+        </p:txBody>
+      </p:sp>
+    </p:spTree>
+    <p:extLst>
+      <p:ext uri="{BB962C8B-B14F-4D97-AF65-F5344CB8AC3E}">
+        <p14:creationId xmlns:p14="http://schemas.microsoft.com/office/powerpoint/2010/main" val="674622604"/>
+      </p:ext>
+    </p:extLst>
+  </p:cSld>
+  <p:clrMapOvr>
+    <a:masterClrMapping/>
+  </p:clrMapOvr>
+</p:sld>
+</file>
+
+<file path=ppt/slides/slide18.xml><?xml version="1.0" encoding="utf-8"?>
+<p:sld xmlns:a="http://schemas.openxmlformats.org/drawingml/2006/main" xmlns:r="http://schemas.openxmlformats.org/officeDocument/2006/relationships" xmlns:p="http://schemas.openxmlformats.org/presentationml/2006/main">
+  <p:cSld>
+    <p:spTree>
+      <p:nvGrpSpPr>
+        <p:cNvPr id="1" name=""/>
+        <p:cNvGrpSpPr/>
+        <p:nvPr/>
+      </p:nvGrpSpPr>
+      <p:grpSpPr>
+        <a:xfrm>
+          <a:off x="0" y="0"/>
+          <a:ext cx="0" cy="0"/>
+          <a:chOff x="0" y="0"/>
+          <a:chExt cx="0" cy="0"/>
+        </a:xfrm>
+      </p:grpSpPr>
+      <p:sp>
+        <p:nvSpPr>
+          <p:cNvPr id="2" name="Title 1">
+            <a:extLst>
+              <a:ext uri="{FF2B5EF4-FFF2-40B4-BE49-F238E27FC236}">
+                <a16:creationId xmlns:a16="http://schemas.microsoft.com/office/drawing/2014/main" id="{D72FADEC-F0B5-02D4-F625-BC4FCDB73D35}"/>
+              </a:ext>
+            </a:extLst>
+          </p:cNvPr>
+          <p:cNvSpPr>
+            <a:spLocks noGrp="1"/>
+          </p:cNvSpPr>
+          <p:nvPr>
+            <p:ph type="title"/>
+          </p:nvPr>
+        </p:nvSpPr>
+        <p:spPr/>
+        <p:txBody>
+          <a:bodyPr/>
+          <a:lstStyle/>
+          <a:p>
+            <a:r>
+              <a:rPr lang="pt-PT" dirty="0" err="1"/>
+              <a:t>Scalers</a:t>
+            </a:r>
+            <a:r>
+              <a:rPr lang="pt-PT" dirty="0"/>
+              <a:t> </a:t>
+            </a:r>
+            <a:r>
+              <a:rPr lang="pt-PT" dirty="0" err="1"/>
+              <a:t>explored</a:t>
+            </a:r>
+            <a:endParaRPr lang="pt-PT" dirty="0"/>
+          </a:p>
+        </p:txBody>
+      </p:sp>
+      <p:sp>
+        <p:nvSpPr>
+          <p:cNvPr id="3" name="Content Placeholder 2">
+            <a:extLst>
+              <a:ext uri="{FF2B5EF4-FFF2-40B4-BE49-F238E27FC236}">
+                <a16:creationId xmlns:a16="http://schemas.microsoft.com/office/drawing/2014/main" id="{2D048246-85DA-FEB5-B662-10C25F7A7CAC}"/>
+              </a:ext>
+            </a:extLst>
+          </p:cNvPr>
+          <p:cNvSpPr>
+            <a:spLocks noGrp="1"/>
+          </p:cNvSpPr>
+          <p:nvPr>
+            <p:ph idx="1"/>
+          </p:nvPr>
+        </p:nvSpPr>
+        <p:spPr/>
+        <p:txBody>
+          <a:bodyPr/>
+          <a:lstStyle/>
+          <a:p>
+            <a:r>
+              <a:rPr lang="en-US" dirty="0"/>
+              <a:t>Given that the output of a Machine Learning algorithm is intricately tied to the input data it receives, we embarked on an exploration of diverse data normalization techniques. Our aim was to assess the impact of these normalization methods on the performance of each model.</a:t>
+            </a:r>
+          </a:p>
+          <a:p>
+            <a:r>
+              <a:rPr lang="en-US" dirty="0"/>
+              <a:t>To this end, we conducted a comparative analysis of the following scaling algorithms:</a:t>
+            </a:r>
+          </a:p>
+          <a:p>
+            <a:pPr lvl="1"/>
+            <a:r>
+              <a:rPr lang="en-US" dirty="0"/>
+              <a:t>Standard Scaler</a:t>
+            </a:r>
+          </a:p>
+          <a:p>
+            <a:pPr lvl="1"/>
+            <a:r>
+              <a:rPr lang="en-US" dirty="0" err="1"/>
+              <a:t>MinMax</a:t>
+            </a:r>
+            <a:r>
+              <a:rPr lang="en-US" dirty="0"/>
+              <a:t> Scaler</a:t>
+            </a:r>
+          </a:p>
+          <a:p>
+            <a:pPr lvl="1"/>
+            <a:r>
+              <a:rPr lang="en-US" dirty="0"/>
+              <a:t>Robust Scaler</a:t>
+            </a:r>
+          </a:p>
+          <a:p>
+            <a:pPr lvl="1"/>
+            <a:r>
+              <a:rPr lang="en-US" dirty="0" err="1"/>
+              <a:t>MaxAbs</a:t>
+            </a:r>
+            <a:r>
+              <a:rPr lang="en-US" dirty="0"/>
+              <a:t> Scaler</a:t>
+            </a:r>
+          </a:p>
+          <a:p>
+            <a:pPr lvl="1"/>
+            <a:r>
+              <a:rPr lang="en-US" dirty="0"/>
+              <a:t>Normalizer</a:t>
+            </a:r>
+          </a:p>
+        </p:txBody>
+      </p:sp>
+    </p:spTree>
+    <p:extLst>
+      <p:ext uri="{BB962C8B-B14F-4D97-AF65-F5344CB8AC3E}">
+        <p14:creationId xmlns:p14="http://schemas.microsoft.com/office/powerpoint/2010/main" val="3182572329"/>
+      </p:ext>
+    </p:extLst>
+  </p:cSld>
+  <p:clrMapOvr>
+    <a:masterClrMapping/>
+  </p:clrMapOvr>
+</p:sld>
+</file>
+
+<file path=ppt/slides/slide19.xml><?xml version="1.0" encoding="utf-8"?>
+<p:sld xmlns:a="http://schemas.openxmlformats.org/drawingml/2006/main" xmlns:r="http://schemas.openxmlformats.org/officeDocument/2006/relationships" xmlns:p="http://schemas.openxmlformats.org/presentationml/2006/main">
+  <p:cSld>
+    <p:spTree>
+      <p:nvGrpSpPr>
+        <p:cNvPr id="1" name=""/>
+        <p:cNvGrpSpPr/>
+        <p:nvPr/>
+      </p:nvGrpSpPr>
+      <p:grpSpPr>
+        <a:xfrm>
+          <a:off x="0" y="0"/>
+          <a:ext cx="0" cy="0"/>
+          <a:chOff x="0" y="0"/>
+          <a:chExt cx="0" cy="0"/>
+        </a:xfrm>
+      </p:grpSpPr>
+      <p:sp>
+        <p:nvSpPr>
+          <p:cNvPr id="2" name="Title 1">
+            <a:extLst>
+              <a:ext uri="{FF2B5EF4-FFF2-40B4-BE49-F238E27FC236}">
+                <a16:creationId xmlns:a16="http://schemas.microsoft.com/office/drawing/2014/main" id="{B7AAED4D-6009-8CE0-5376-7F3A939F6A47}"/>
+              </a:ext>
+            </a:extLst>
+          </p:cNvPr>
+          <p:cNvSpPr>
+            <a:spLocks noGrp="1"/>
+          </p:cNvSpPr>
+          <p:nvPr>
+            <p:ph type="title"/>
+          </p:nvPr>
+        </p:nvSpPr>
+        <p:spPr/>
+        <p:txBody>
+          <a:bodyPr/>
+          <a:lstStyle/>
+          <a:p>
+            <a:r>
+              <a:rPr lang="pt-PT" dirty="0" err="1"/>
+              <a:t>Scalers</a:t>
+            </a:r>
+            <a:r>
+              <a:rPr lang="pt-PT" dirty="0"/>
+              <a:t> </a:t>
+            </a:r>
+            <a:r>
+              <a:rPr lang="pt-PT" dirty="0" err="1"/>
+              <a:t>exploration</a:t>
+            </a:r>
+            <a:r>
+              <a:rPr lang="pt-PT" dirty="0"/>
+              <a:t> </a:t>
+            </a:r>
+            <a:r>
+              <a:rPr lang="pt-PT" dirty="0" err="1"/>
+              <a:t>results</a:t>
+            </a:r>
+            <a:endParaRPr lang="pt-PT" dirty="0"/>
+          </a:p>
+        </p:txBody>
+      </p:sp>
+      <p:pic>
+        <p:nvPicPr>
+          <p:cNvPr id="13" name="Picture 12" descr="A graph with a line&#10;&#10;Description automatically generated">
+            <a:extLst>
+              <a:ext uri="{FF2B5EF4-FFF2-40B4-BE49-F238E27FC236}">
+                <a16:creationId xmlns:a16="http://schemas.microsoft.com/office/drawing/2014/main" id="{2FD70ADE-3451-8416-A846-E206427BC587}"/>
+              </a:ext>
+            </a:extLst>
+          </p:cNvPr>
+          <p:cNvPicPr>
+            <a:picLocks noChangeAspect="1"/>
+          </p:cNvPicPr>
+          <p:nvPr/>
+        </p:nvPicPr>
+        <p:blipFill>
+          <a:blip r:embed="rId2">
+            <a:extLst>
+              <a:ext uri="{28A0092B-C50C-407E-A947-70E740481C1C}">
+                <a14:useLocalDpi xmlns:a14="http://schemas.microsoft.com/office/drawing/2010/main" val="0"/>
+              </a:ext>
+            </a:extLst>
+          </a:blip>
+          <a:stretch>
+            <a:fillRect/>
+          </a:stretch>
+        </p:blipFill>
+        <p:spPr>
+          <a:xfrm>
+            <a:off x="1398148" y="1112636"/>
+            <a:ext cx="3644660" cy="2899913"/>
+          </a:xfrm>
+          <a:prstGeom prst="rect">
+            <a:avLst/>
+          </a:prstGeom>
+        </p:spPr>
+      </p:pic>
+      <p:pic>
+        <p:nvPicPr>
+          <p:cNvPr id="17" name="Picture 16" descr="A graph with blue lines and green lines&#10;&#10;Description automatically generated">
+            <a:extLst>
+              <a:ext uri="{FF2B5EF4-FFF2-40B4-BE49-F238E27FC236}">
+                <a16:creationId xmlns:a16="http://schemas.microsoft.com/office/drawing/2014/main" id="{510B15E7-78A1-6908-D0CB-44E2602D5A0B}"/>
+              </a:ext>
+            </a:extLst>
+          </p:cNvPr>
+          <p:cNvPicPr>
+            <a:picLocks noChangeAspect="1"/>
+          </p:cNvPicPr>
+          <p:nvPr/>
+        </p:nvPicPr>
+        <p:blipFill>
+          <a:blip r:embed="rId3">
+            <a:extLst>
+              <a:ext uri="{28A0092B-C50C-407E-A947-70E740481C1C}">
+                <a14:useLocalDpi xmlns:a14="http://schemas.microsoft.com/office/drawing/2010/main" val="0"/>
+              </a:ext>
+            </a:extLst>
+          </a:blip>
+          <a:stretch>
+            <a:fillRect/>
+          </a:stretch>
+        </p:blipFill>
+        <p:spPr>
+          <a:xfrm>
+            <a:off x="1398148" y="4044179"/>
+            <a:ext cx="3644660" cy="2803584"/>
+          </a:xfrm>
+          <a:prstGeom prst="rect">
+            <a:avLst/>
+          </a:prstGeom>
+        </p:spPr>
+      </p:pic>
+      <p:pic>
+        <p:nvPicPr>
+          <p:cNvPr id="19" name="Picture 18" descr="A graph with blue lines and green lines&#10;&#10;Description automatically generated">
+            <a:extLst>
+              <a:ext uri="{FF2B5EF4-FFF2-40B4-BE49-F238E27FC236}">
+                <a16:creationId xmlns:a16="http://schemas.microsoft.com/office/drawing/2014/main" id="{E88738CC-2EF7-9EBF-93C0-7ED779270941}"/>
+              </a:ext>
+            </a:extLst>
+          </p:cNvPr>
+          <p:cNvPicPr>
+            <a:picLocks noChangeAspect="1"/>
+          </p:cNvPicPr>
+          <p:nvPr/>
+        </p:nvPicPr>
+        <p:blipFill>
+          <a:blip r:embed="rId4">
+            <a:extLst>
+              <a:ext uri="{28A0092B-C50C-407E-A947-70E740481C1C}">
+                <a14:useLocalDpi xmlns:a14="http://schemas.microsoft.com/office/drawing/2010/main" val="0"/>
+              </a:ext>
+            </a:extLst>
+          </a:blip>
+          <a:stretch>
+            <a:fillRect/>
+          </a:stretch>
+        </p:blipFill>
+        <p:spPr>
+          <a:xfrm>
+            <a:off x="6446447" y="4054416"/>
+            <a:ext cx="3644660" cy="2803584"/>
+          </a:xfrm>
+          <a:prstGeom prst="rect">
+            <a:avLst/>
+          </a:prstGeom>
+        </p:spPr>
+      </p:pic>
+      <p:pic>
+        <p:nvPicPr>
+          <p:cNvPr id="15" name="Picture 14" descr="A graph with a line&#10;&#10;Description automatically generated">
+            <a:extLst>
+              <a:ext uri="{FF2B5EF4-FFF2-40B4-BE49-F238E27FC236}">
+                <a16:creationId xmlns:a16="http://schemas.microsoft.com/office/drawing/2014/main" id="{5702DCA0-239C-7EF6-D5CC-2779BAF235FE}"/>
+              </a:ext>
+            </a:extLst>
+          </p:cNvPr>
+          <p:cNvPicPr>
+            <a:picLocks noChangeAspect="1"/>
+          </p:cNvPicPr>
+          <p:nvPr/>
+        </p:nvPicPr>
+        <p:blipFill>
+          <a:blip r:embed="rId5">
+            <a:extLst>
+              <a:ext uri="{28A0092B-C50C-407E-A947-70E740481C1C}">
+                <a14:useLocalDpi xmlns:a14="http://schemas.microsoft.com/office/drawing/2010/main" val="0"/>
+              </a:ext>
+            </a:extLst>
+          </a:blip>
+          <a:stretch>
+            <a:fillRect/>
+          </a:stretch>
+        </p:blipFill>
+        <p:spPr>
+          <a:xfrm>
+            <a:off x="6446447" y="1112636"/>
+            <a:ext cx="3644660" cy="2915728"/>
+          </a:xfrm>
+          <a:prstGeom prst="rect">
+            <a:avLst/>
+          </a:prstGeom>
+        </p:spPr>
+      </p:pic>
+    </p:spTree>
+    <p:extLst>
+      <p:ext uri="{BB962C8B-B14F-4D97-AF65-F5344CB8AC3E}">
+        <p14:creationId xmlns:p14="http://schemas.microsoft.com/office/powerpoint/2010/main" val="143345285"/>
       </p:ext>
     </p:extLst>
   </p:cSld>
@@ -7663,6 +9049,826 @@
     <p:extLst>
       <p:ext uri="{BB962C8B-B14F-4D97-AF65-F5344CB8AC3E}">
         <p14:creationId xmlns:p14="http://schemas.microsoft.com/office/powerpoint/2010/main" val="1662472812"/>
+      </p:ext>
+    </p:extLst>
+  </p:cSld>
+  <p:clrMapOvr>
+    <a:masterClrMapping/>
+  </p:clrMapOvr>
+</p:sld>
+</file>
+
+<file path=ppt/slides/slide20.xml><?xml version="1.0" encoding="utf-8"?>
+<p:sld xmlns:a="http://schemas.openxmlformats.org/drawingml/2006/main" xmlns:r="http://schemas.openxmlformats.org/officeDocument/2006/relationships" xmlns:p="http://schemas.openxmlformats.org/presentationml/2006/main">
+  <p:cSld>
+    <p:spTree>
+      <p:nvGrpSpPr>
+        <p:cNvPr id="1" name=""/>
+        <p:cNvGrpSpPr/>
+        <p:nvPr/>
+      </p:nvGrpSpPr>
+      <p:grpSpPr>
+        <a:xfrm>
+          <a:off x="0" y="0"/>
+          <a:ext cx="0" cy="0"/>
+          <a:chOff x="0" y="0"/>
+          <a:chExt cx="0" cy="0"/>
+        </a:xfrm>
+      </p:grpSpPr>
+      <p:sp>
+        <p:nvSpPr>
+          <p:cNvPr id="2" name="Title 1">
+            <a:extLst>
+              <a:ext uri="{FF2B5EF4-FFF2-40B4-BE49-F238E27FC236}">
+                <a16:creationId xmlns:a16="http://schemas.microsoft.com/office/drawing/2014/main" id="{95764765-A406-AB71-4EE6-2668D7D50077}"/>
+              </a:ext>
+            </a:extLst>
+          </p:cNvPr>
+          <p:cNvSpPr>
+            <a:spLocks noGrp="1"/>
+          </p:cNvSpPr>
+          <p:nvPr>
+            <p:ph type="title"/>
+          </p:nvPr>
+        </p:nvSpPr>
+        <p:spPr/>
+        <p:txBody>
+          <a:bodyPr/>
+          <a:lstStyle/>
+          <a:p>
+            <a:r>
+              <a:rPr lang="pt-PT" dirty="0" err="1"/>
+              <a:t>Scalers</a:t>
+            </a:r>
+            <a:r>
+              <a:rPr lang="pt-PT" dirty="0"/>
+              <a:t> </a:t>
+            </a:r>
+            <a:r>
+              <a:rPr lang="pt-PT" dirty="0" err="1"/>
+              <a:t>exploration</a:t>
+            </a:r>
+            <a:r>
+              <a:rPr lang="pt-PT" dirty="0"/>
+              <a:t> </a:t>
+            </a:r>
+            <a:r>
+              <a:rPr lang="pt-PT" dirty="0" err="1"/>
+              <a:t>results</a:t>
+            </a:r>
+            <a:endParaRPr lang="pt-PT" dirty="0"/>
+          </a:p>
+        </p:txBody>
+      </p:sp>
+      <p:pic>
+        <p:nvPicPr>
+          <p:cNvPr id="9" name="Picture 8" descr="A graph with lines and text&#10;&#10;Description automatically generated with medium confidence">
+            <a:extLst>
+              <a:ext uri="{FF2B5EF4-FFF2-40B4-BE49-F238E27FC236}">
+                <a16:creationId xmlns:a16="http://schemas.microsoft.com/office/drawing/2014/main" id="{C8E35AA7-9A96-DD31-A50C-CEBAF96F4EBD}"/>
+              </a:ext>
+            </a:extLst>
+          </p:cNvPr>
+          <p:cNvPicPr>
+            <a:picLocks noChangeAspect="1"/>
+          </p:cNvPicPr>
+          <p:nvPr/>
+        </p:nvPicPr>
+        <p:blipFill>
+          <a:blip r:embed="rId2">
+            <a:extLst>
+              <a:ext uri="{28A0092B-C50C-407E-A947-70E740481C1C}">
+                <a14:useLocalDpi xmlns:a14="http://schemas.microsoft.com/office/drawing/2010/main" val="0"/>
+              </a:ext>
+            </a:extLst>
+          </a:blip>
+          <a:stretch>
+            <a:fillRect/>
+          </a:stretch>
+        </p:blipFill>
+        <p:spPr>
+          <a:xfrm>
+            <a:off x="1413065" y="3983674"/>
+            <a:ext cx="3644660" cy="2874326"/>
+          </a:xfrm>
+          <a:prstGeom prst="rect">
+            <a:avLst/>
+          </a:prstGeom>
+        </p:spPr>
+      </p:pic>
+      <p:pic>
+        <p:nvPicPr>
+          <p:cNvPr id="11" name="Picture 10" descr="A graph with numbers and letters&#10;&#10;Description automatically generated with medium confidence">
+            <a:extLst>
+              <a:ext uri="{FF2B5EF4-FFF2-40B4-BE49-F238E27FC236}">
+                <a16:creationId xmlns:a16="http://schemas.microsoft.com/office/drawing/2014/main" id="{3A8BBEA1-A425-5DF2-A1C5-1989D06E9F17}"/>
+              </a:ext>
+            </a:extLst>
+          </p:cNvPr>
+          <p:cNvPicPr>
+            <a:picLocks noChangeAspect="1"/>
+          </p:cNvPicPr>
+          <p:nvPr/>
+        </p:nvPicPr>
+        <p:blipFill>
+          <a:blip r:embed="rId3">
+            <a:extLst>
+              <a:ext uri="{28A0092B-C50C-407E-A947-70E740481C1C}">
+                <a14:useLocalDpi xmlns:a14="http://schemas.microsoft.com/office/drawing/2010/main" val="0"/>
+              </a:ext>
+            </a:extLst>
+          </a:blip>
+          <a:stretch>
+            <a:fillRect/>
+          </a:stretch>
+        </p:blipFill>
+        <p:spPr>
+          <a:xfrm>
+            <a:off x="7243544" y="3983674"/>
+            <a:ext cx="3644659" cy="2874326"/>
+          </a:xfrm>
+          <a:prstGeom prst="rect">
+            <a:avLst/>
+          </a:prstGeom>
+        </p:spPr>
+      </p:pic>
+      <p:pic>
+        <p:nvPicPr>
+          <p:cNvPr id="5" name="Picture 4" descr="A graph with lines and text&#10;&#10;Description automatically generated with medium confidence">
+            <a:extLst>
+              <a:ext uri="{FF2B5EF4-FFF2-40B4-BE49-F238E27FC236}">
+                <a16:creationId xmlns:a16="http://schemas.microsoft.com/office/drawing/2014/main" id="{01804335-B5CD-989F-8FDE-EB28A72A711B}"/>
+              </a:ext>
+            </a:extLst>
+          </p:cNvPr>
+          <p:cNvPicPr>
+            <a:picLocks noChangeAspect="1"/>
+          </p:cNvPicPr>
+          <p:nvPr/>
+        </p:nvPicPr>
+        <p:blipFill>
+          <a:blip r:embed="rId4">
+            <a:extLst>
+              <a:ext uri="{28A0092B-C50C-407E-A947-70E740481C1C}">
+                <a14:useLocalDpi xmlns:a14="http://schemas.microsoft.com/office/drawing/2010/main" val="0"/>
+              </a:ext>
+            </a:extLst>
+          </a:blip>
+          <a:stretch>
+            <a:fillRect/>
+          </a:stretch>
+        </p:blipFill>
+        <p:spPr>
+          <a:xfrm>
+            <a:off x="1413065" y="1052543"/>
+            <a:ext cx="3644660" cy="2874325"/>
+          </a:xfrm>
+          <a:prstGeom prst="rect">
+            <a:avLst/>
+          </a:prstGeom>
+        </p:spPr>
+      </p:pic>
+      <p:pic>
+        <p:nvPicPr>
+          <p:cNvPr id="7" name="Picture 6" descr="A graph with lines and numbers&#10;&#10;Description automatically generated with medium confidence">
+            <a:extLst>
+              <a:ext uri="{FF2B5EF4-FFF2-40B4-BE49-F238E27FC236}">
+                <a16:creationId xmlns:a16="http://schemas.microsoft.com/office/drawing/2014/main" id="{821DBE6A-6FE3-6F2F-BA92-28A6E3A80597}"/>
+              </a:ext>
+            </a:extLst>
+          </p:cNvPr>
+          <p:cNvPicPr>
+            <a:picLocks noChangeAspect="1"/>
+          </p:cNvPicPr>
+          <p:nvPr/>
+        </p:nvPicPr>
+        <p:blipFill>
+          <a:blip r:embed="rId5">
+            <a:extLst>
+              <a:ext uri="{28A0092B-C50C-407E-A947-70E740481C1C}">
+                <a14:useLocalDpi xmlns:a14="http://schemas.microsoft.com/office/drawing/2010/main" val="0"/>
+              </a:ext>
+            </a:extLst>
+          </a:blip>
+          <a:stretch>
+            <a:fillRect/>
+          </a:stretch>
+        </p:blipFill>
+        <p:spPr>
+          <a:xfrm>
+            <a:off x="7243543" y="1052543"/>
+            <a:ext cx="3644659" cy="2874326"/>
+          </a:xfrm>
+          <a:prstGeom prst="rect">
+            <a:avLst/>
+          </a:prstGeom>
+        </p:spPr>
+      </p:pic>
+    </p:spTree>
+    <p:extLst>
+      <p:ext uri="{BB962C8B-B14F-4D97-AF65-F5344CB8AC3E}">
+        <p14:creationId xmlns:p14="http://schemas.microsoft.com/office/powerpoint/2010/main" val="2306707148"/>
+      </p:ext>
+    </p:extLst>
+  </p:cSld>
+  <p:clrMapOvr>
+    <a:masterClrMapping/>
+  </p:clrMapOvr>
+</p:sld>
+</file>
+
+<file path=ppt/slides/slide21.xml><?xml version="1.0" encoding="utf-8"?>
+<p:sld xmlns:a="http://schemas.openxmlformats.org/drawingml/2006/main" xmlns:r="http://schemas.openxmlformats.org/officeDocument/2006/relationships" xmlns:p="http://schemas.openxmlformats.org/presentationml/2006/main">
+  <p:cSld>
+    <p:spTree>
+      <p:nvGrpSpPr>
+        <p:cNvPr id="1" name=""/>
+        <p:cNvGrpSpPr/>
+        <p:nvPr/>
+      </p:nvGrpSpPr>
+      <p:grpSpPr>
+        <a:xfrm>
+          <a:off x="0" y="0"/>
+          <a:ext cx="0" cy="0"/>
+          <a:chOff x="0" y="0"/>
+          <a:chExt cx="0" cy="0"/>
+        </a:xfrm>
+      </p:grpSpPr>
+      <p:sp>
+        <p:nvSpPr>
+          <p:cNvPr id="2" name="Title 1">
+            <a:extLst>
+              <a:ext uri="{FF2B5EF4-FFF2-40B4-BE49-F238E27FC236}">
+                <a16:creationId xmlns:a16="http://schemas.microsoft.com/office/drawing/2014/main" id="{95764765-A406-AB71-4EE6-2668D7D50077}"/>
+              </a:ext>
+            </a:extLst>
+          </p:cNvPr>
+          <p:cNvSpPr>
+            <a:spLocks noGrp="1"/>
+          </p:cNvSpPr>
+          <p:nvPr>
+            <p:ph type="title"/>
+          </p:nvPr>
+        </p:nvSpPr>
+        <p:spPr/>
+        <p:txBody>
+          <a:bodyPr/>
+          <a:lstStyle/>
+          <a:p>
+            <a:r>
+              <a:rPr lang="pt-PT" dirty="0" err="1"/>
+              <a:t>Scalers</a:t>
+            </a:r>
+            <a:r>
+              <a:rPr lang="pt-PT" dirty="0"/>
+              <a:t> </a:t>
+            </a:r>
+            <a:r>
+              <a:rPr lang="pt-PT" dirty="0" err="1"/>
+              <a:t>exploration</a:t>
+            </a:r>
+            <a:r>
+              <a:rPr lang="pt-PT" dirty="0"/>
+              <a:t> </a:t>
+            </a:r>
+            <a:r>
+              <a:rPr lang="pt-PT" dirty="0" err="1"/>
+              <a:t>results</a:t>
+            </a:r>
+            <a:endParaRPr lang="pt-PT" dirty="0"/>
+          </a:p>
+        </p:txBody>
+      </p:sp>
+      <p:pic>
+        <p:nvPicPr>
+          <p:cNvPr id="4" name="Picture 3" descr="A graph with lines and numbers&#10;&#10;Description automatically generated with medium confidence">
+            <a:extLst>
+              <a:ext uri="{FF2B5EF4-FFF2-40B4-BE49-F238E27FC236}">
+                <a16:creationId xmlns:a16="http://schemas.microsoft.com/office/drawing/2014/main" id="{5FDBEECE-8141-7DDF-D7FD-C9AF6754DF49}"/>
+              </a:ext>
+            </a:extLst>
+          </p:cNvPr>
+          <p:cNvPicPr>
+            <a:picLocks noChangeAspect="1"/>
+          </p:cNvPicPr>
+          <p:nvPr/>
+        </p:nvPicPr>
+        <p:blipFill>
+          <a:blip r:embed="rId2">
+            <a:extLst>
+              <a:ext uri="{28A0092B-C50C-407E-A947-70E740481C1C}">
+                <a14:useLocalDpi xmlns:a14="http://schemas.microsoft.com/office/drawing/2010/main" val="0"/>
+              </a:ext>
+            </a:extLst>
+          </a:blip>
+          <a:stretch>
+            <a:fillRect/>
+          </a:stretch>
+        </p:blipFill>
+        <p:spPr>
+          <a:xfrm>
+            <a:off x="1395554" y="1040340"/>
+            <a:ext cx="3644660" cy="2874324"/>
+          </a:xfrm>
+          <a:prstGeom prst="rect">
+            <a:avLst/>
+          </a:prstGeom>
+        </p:spPr>
+      </p:pic>
+      <p:pic>
+        <p:nvPicPr>
+          <p:cNvPr id="8" name="Picture 7" descr="A graph with blue lines and green dots&#10;&#10;Description automatically generated">
+            <a:extLst>
+              <a:ext uri="{FF2B5EF4-FFF2-40B4-BE49-F238E27FC236}">
+                <a16:creationId xmlns:a16="http://schemas.microsoft.com/office/drawing/2014/main" id="{D5495653-E877-3F89-8164-00033A37C17D}"/>
+              </a:ext>
+            </a:extLst>
+          </p:cNvPr>
+          <p:cNvPicPr>
+            <a:picLocks noChangeAspect="1"/>
+          </p:cNvPicPr>
+          <p:nvPr/>
+        </p:nvPicPr>
+        <p:blipFill>
+          <a:blip r:embed="rId3">
+            <a:extLst>
+              <a:ext uri="{28A0092B-C50C-407E-A947-70E740481C1C}">
+                <a14:useLocalDpi xmlns:a14="http://schemas.microsoft.com/office/drawing/2010/main" val="0"/>
+              </a:ext>
+            </a:extLst>
+          </a:blip>
+          <a:stretch>
+            <a:fillRect/>
+          </a:stretch>
+        </p:blipFill>
+        <p:spPr>
+          <a:xfrm>
+            <a:off x="1395554" y="3983675"/>
+            <a:ext cx="3644660" cy="2874325"/>
+          </a:xfrm>
+          <a:prstGeom prst="rect">
+            <a:avLst/>
+          </a:prstGeom>
+        </p:spPr>
+      </p:pic>
+      <p:pic>
+        <p:nvPicPr>
+          <p:cNvPr id="12" name="Picture 11" descr="A graph with blue lines and green lines&#10;&#10;Description automatically generated">
+            <a:extLst>
+              <a:ext uri="{FF2B5EF4-FFF2-40B4-BE49-F238E27FC236}">
+                <a16:creationId xmlns:a16="http://schemas.microsoft.com/office/drawing/2014/main" id="{974B382A-C968-EC65-3091-EEB7062D7DCD}"/>
+              </a:ext>
+            </a:extLst>
+          </p:cNvPr>
+          <p:cNvPicPr>
+            <a:picLocks noChangeAspect="1"/>
+          </p:cNvPicPr>
+          <p:nvPr/>
+        </p:nvPicPr>
+        <p:blipFill>
+          <a:blip r:embed="rId4">
+            <a:extLst>
+              <a:ext uri="{28A0092B-C50C-407E-A947-70E740481C1C}">
+                <a14:useLocalDpi xmlns:a14="http://schemas.microsoft.com/office/drawing/2010/main" val="0"/>
+              </a:ext>
+            </a:extLst>
+          </a:blip>
+          <a:stretch>
+            <a:fillRect/>
+          </a:stretch>
+        </p:blipFill>
+        <p:spPr>
+          <a:xfrm>
+            <a:off x="7151786" y="1040340"/>
+            <a:ext cx="3644660" cy="2874324"/>
+          </a:xfrm>
+          <a:prstGeom prst="rect">
+            <a:avLst/>
+          </a:prstGeom>
+        </p:spPr>
+      </p:pic>
+      <p:pic>
+        <p:nvPicPr>
+          <p:cNvPr id="14" name="Picture 13" descr="A graph with lines and numbers&#10;&#10;Description automatically generated with medium confidence">
+            <a:extLst>
+              <a:ext uri="{FF2B5EF4-FFF2-40B4-BE49-F238E27FC236}">
+                <a16:creationId xmlns:a16="http://schemas.microsoft.com/office/drawing/2014/main" id="{4CB65B91-70D3-080F-3813-F6FBD0927A72}"/>
+              </a:ext>
+            </a:extLst>
+          </p:cNvPr>
+          <p:cNvPicPr>
+            <a:picLocks noChangeAspect="1"/>
+          </p:cNvPicPr>
+          <p:nvPr/>
+        </p:nvPicPr>
+        <p:blipFill>
+          <a:blip r:embed="rId5">
+            <a:extLst>
+              <a:ext uri="{28A0092B-C50C-407E-A947-70E740481C1C}">
+                <a14:useLocalDpi xmlns:a14="http://schemas.microsoft.com/office/drawing/2010/main" val="0"/>
+              </a:ext>
+            </a:extLst>
+          </a:blip>
+          <a:stretch>
+            <a:fillRect/>
+          </a:stretch>
+        </p:blipFill>
+        <p:spPr>
+          <a:xfrm>
+            <a:off x="7151786" y="4002775"/>
+            <a:ext cx="3644660" cy="2863580"/>
+          </a:xfrm>
+          <a:prstGeom prst="rect">
+            <a:avLst/>
+          </a:prstGeom>
+        </p:spPr>
+      </p:pic>
+    </p:spTree>
+    <p:extLst>
+      <p:ext uri="{BB962C8B-B14F-4D97-AF65-F5344CB8AC3E}">
+        <p14:creationId xmlns:p14="http://schemas.microsoft.com/office/powerpoint/2010/main" val="2691965564"/>
+      </p:ext>
+    </p:extLst>
+  </p:cSld>
+  <p:clrMapOvr>
+    <a:masterClrMapping/>
+  </p:clrMapOvr>
+</p:sld>
+</file>
+
+<file path=ppt/slides/slide22.xml><?xml version="1.0" encoding="utf-8"?>
+<p:sld xmlns:a="http://schemas.openxmlformats.org/drawingml/2006/main" xmlns:r="http://schemas.openxmlformats.org/officeDocument/2006/relationships" xmlns:p="http://schemas.openxmlformats.org/presentationml/2006/main">
+  <p:cSld>
+    <p:spTree>
+      <p:nvGrpSpPr>
+        <p:cNvPr id="1" name=""/>
+        <p:cNvGrpSpPr/>
+        <p:nvPr/>
+      </p:nvGrpSpPr>
+      <p:grpSpPr>
+        <a:xfrm>
+          <a:off x="0" y="0"/>
+          <a:ext cx="0" cy="0"/>
+          <a:chOff x="0" y="0"/>
+          <a:chExt cx="0" cy="0"/>
+        </a:xfrm>
+      </p:grpSpPr>
+      <p:sp>
+        <p:nvSpPr>
+          <p:cNvPr id="2" name="Title 1">
+            <a:extLst>
+              <a:ext uri="{FF2B5EF4-FFF2-40B4-BE49-F238E27FC236}">
+                <a16:creationId xmlns:a16="http://schemas.microsoft.com/office/drawing/2014/main" id="{B8BD9D67-41A4-F6F3-0509-17A7799B4FEC}"/>
+              </a:ext>
+            </a:extLst>
+          </p:cNvPr>
+          <p:cNvSpPr>
+            <a:spLocks noGrp="1"/>
+          </p:cNvSpPr>
+          <p:nvPr>
+            <p:ph type="title"/>
+          </p:nvPr>
+        </p:nvSpPr>
+        <p:spPr/>
+        <p:txBody>
+          <a:bodyPr/>
+          <a:lstStyle/>
+          <a:p>
+            <a:r>
+              <a:rPr lang="en-US" dirty="0"/>
+              <a:t>SCALERS EXPLORED: ANALYSIS</a:t>
+            </a:r>
+          </a:p>
+        </p:txBody>
+      </p:sp>
+      <p:sp>
+        <p:nvSpPr>
+          <p:cNvPr id="3" name="Content Placeholder 2">
+            <a:extLst>
+              <a:ext uri="{FF2B5EF4-FFF2-40B4-BE49-F238E27FC236}">
+                <a16:creationId xmlns:a16="http://schemas.microsoft.com/office/drawing/2014/main" id="{0A964835-9983-B0C3-2536-7BBBAD168774}"/>
+              </a:ext>
+            </a:extLst>
+          </p:cNvPr>
+          <p:cNvSpPr>
+            <a:spLocks noGrp="1"/>
+          </p:cNvSpPr>
+          <p:nvPr>
+            <p:ph idx="1"/>
+          </p:nvPr>
+        </p:nvSpPr>
+        <p:spPr>
+          <a:xfrm>
+            <a:off x="1174040" y="1406106"/>
+            <a:ext cx="10178322" cy="5365629"/>
+          </a:xfrm>
+        </p:spPr>
+        <p:txBody>
+          <a:bodyPr>
+            <a:normAutofit/>
+          </a:bodyPr>
+          <a:lstStyle/>
+          <a:p>
+            <a:pPr algn="just"/>
+            <a:r>
+              <a:rPr lang="en-US" dirty="0"/>
+              <a:t>Linear Regression, Support Vector Regressor, and Ridge Regression consistently achieve high scores across all Scalers, with accuracy, recall, precision, and F1 score of 0.625 or higher.</a:t>
+            </a:r>
+          </a:p>
+          <a:p>
+            <a:pPr algn="just"/>
+            <a:endParaRPr lang="en-US" dirty="0"/>
+          </a:p>
+          <a:p>
+            <a:pPr algn="just"/>
+            <a:r>
+              <a:rPr lang="en-US" dirty="0"/>
+              <a:t>Random Forest Regressor and MLP Regressor exhibit less consistent performance, with scores varying depending on the Scaler used. However, the overall scores are lower than the results mentioned in the previous topic.</a:t>
+            </a:r>
+          </a:p>
+          <a:p>
+            <a:pPr algn="just"/>
+            <a:endParaRPr lang="en-US" dirty="0"/>
+          </a:p>
+          <a:p>
+            <a:pPr algn="just"/>
+            <a:r>
+              <a:rPr lang="en-US" dirty="0"/>
+              <a:t>Lasso Regression achieves the highest accuracy and F1 score among all regression models, indicating strong overall predictive capability. Furthermore, the best result was obtained without using a Scaler.</a:t>
+            </a:r>
+          </a:p>
+          <a:p>
+            <a:pPr algn="just"/>
+            <a:endParaRPr lang="en-US" dirty="0"/>
+          </a:p>
+          <a:p>
+            <a:pPr algn="just"/>
+            <a:r>
+              <a:rPr lang="en-US" dirty="0"/>
+              <a:t>Gradient Boosting Regressor demonstrates competitive performance with high accuracy, recall, precision, and F1 score under the Normalizer Scaler.</a:t>
+            </a:r>
+          </a:p>
+          <a:p>
+            <a:pPr algn="just"/>
+            <a:endParaRPr lang="en-US" dirty="0"/>
+          </a:p>
+          <a:p>
+            <a:pPr marL="0" indent="0" algn="just">
+              <a:buNone/>
+            </a:pPr>
+            <a:endParaRPr lang="en-US" dirty="0"/>
+          </a:p>
+        </p:txBody>
+      </p:sp>
+    </p:spTree>
+    <p:extLst>
+      <p:ext uri="{BB962C8B-B14F-4D97-AF65-F5344CB8AC3E}">
+        <p14:creationId xmlns:p14="http://schemas.microsoft.com/office/powerpoint/2010/main" val="802536844"/>
+      </p:ext>
+    </p:extLst>
+  </p:cSld>
+  <p:clrMapOvr>
+    <a:masterClrMapping/>
+  </p:clrMapOvr>
+</p:sld>
+</file>
+
+<file path=ppt/slides/slide23.xml><?xml version="1.0" encoding="utf-8"?>
+<p:sld xmlns:a="http://schemas.openxmlformats.org/drawingml/2006/main" xmlns:r="http://schemas.openxmlformats.org/officeDocument/2006/relationships" xmlns:p="http://schemas.openxmlformats.org/presentationml/2006/main">
+  <p:cSld>
+    <p:spTree>
+      <p:nvGrpSpPr>
+        <p:cNvPr id="1" name=""/>
+        <p:cNvGrpSpPr/>
+        <p:nvPr/>
+      </p:nvGrpSpPr>
+      <p:grpSpPr>
+        <a:xfrm>
+          <a:off x="0" y="0"/>
+          <a:ext cx="0" cy="0"/>
+          <a:chOff x="0" y="0"/>
+          <a:chExt cx="0" cy="0"/>
+        </a:xfrm>
+      </p:grpSpPr>
+      <p:sp>
+        <p:nvSpPr>
+          <p:cNvPr id="2" name="Title 1">
+            <a:extLst>
+              <a:ext uri="{FF2B5EF4-FFF2-40B4-BE49-F238E27FC236}">
+                <a16:creationId xmlns:a16="http://schemas.microsoft.com/office/drawing/2014/main" id="{B8BD9D67-41A4-F6F3-0509-17A7799B4FEC}"/>
+              </a:ext>
+            </a:extLst>
+          </p:cNvPr>
+          <p:cNvSpPr>
+            <a:spLocks noGrp="1"/>
+          </p:cNvSpPr>
+          <p:nvPr>
+            <p:ph type="title"/>
+          </p:nvPr>
+        </p:nvSpPr>
+        <p:spPr/>
+        <p:txBody>
+          <a:bodyPr/>
+          <a:lstStyle/>
+          <a:p>
+            <a:r>
+              <a:rPr lang="en-US" dirty="0"/>
+              <a:t>SCALERS EXPLORED: ANALYSIS</a:t>
+            </a:r>
+          </a:p>
+        </p:txBody>
+      </p:sp>
+      <p:sp>
+        <p:nvSpPr>
+          <p:cNvPr id="3" name="Content Placeholder 2">
+            <a:extLst>
+              <a:ext uri="{FF2B5EF4-FFF2-40B4-BE49-F238E27FC236}">
+                <a16:creationId xmlns:a16="http://schemas.microsoft.com/office/drawing/2014/main" id="{0A964835-9983-B0C3-2536-7BBBAD168774}"/>
+              </a:ext>
+            </a:extLst>
+          </p:cNvPr>
+          <p:cNvSpPr>
+            <a:spLocks noGrp="1"/>
+          </p:cNvSpPr>
+          <p:nvPr>
+            <p:ph idx="1"/>
+          </p:nvPr>
+        </p:nvSpPr>
+        <p:spPr>
+          <a:xfrm>
+            <a:off x="1174040" y="1406106"/>
+            <a:ext cx="10178322" cy="5365629"/>
+          </a:xfrm>
+        </p:spPr>
+        <p:txBody>
+          <a:bodyPr>
+            <a:normAutofit fontScale="77500" lnSpcReduction="20000"/>
+          </a:bodyPr>
+          <a:lstStyle/>
+          <a:p>
+            <a:pPr algn="just"/>
+            <a:r>
+              <a:rPr lang="en-US" dirty="0"/>
+              <a:t>The choice of Scaler significantly impacts the performance of most regression models, as scores vary across different Scalers.</a:t>
+            </a:r>
+          </a:p>
+          <a:p>
+            <a:pPr algn="just"/>
+            <a:endParaRPr lang="en-US" dirty="0"/>
+          </a:p>
+          <a:p>
+            <a:pPr algn="just"/>
+            <a:r>
+              <a:rPr lang="en-US" dirty="0"/>
+              <a:t>The "None" Scaler is used for some models, indicating that no data scaling was applied.  These models achieve mixed results, highlighting the potential benefit of data scaling in certain cases.</a:t>
+            </a:r>
+          </a:p>
+          <a:p>
+            <a:pPr algn="just"/>
+            <a:endParaRPr lang="en-US" dirty="0"/>
+          </a:p>
+          <a:p>
+            <a:pPr algn="just"/>
+            <a:r>
+              <a:rPr lang="en-US" dirty="0"/>
+              <a:t>It is important to highlight that the testing process used to collect this data closely mirrors the conditions of the final Kaggle evaluation. However, this similarity gives rise to a specific challenge: in each season, an average of 13 teams competes, but only 8 secure a spot in the playoffs. Consequently, any misjudgment carries a substantial impact on the evaluation metrics. </a:t>
+            </a:r>
+          </a:p>
+          <a:p>
+            <a:pPr algn="just"/>
+            <a:endParaRPr lang="en-US" dirty="0"/>
+          </a:p>
+          <a:p>
+            <a:pPr algn="just"/>
+            <a:r>
+              <a:rPr lang="en-US" dirty="0"/>
+              <a:t>For example, if the model anticipates the qualification of a team that does not make it, this single error accounts for 2/13 </a:t>
+            </a:r>
+            <a:r>
+              <a:rPr lang="en-US"/>
+              <a:t>or 15,4% </a:t>
+            </a:r>
+            <a:r>
+              <a:rPr lang="en-US" dirty="0"/>
+              <a:t>of the final accuracy value. This is because an erroneous prediction of a team's qualification implies the incorrect prediction that another team did not qualify when it should have, effectively doubling the impact of the mistake.</a:t>
+            </a:r>
+          </a:p>
+          <a:p>
+            <a:pPr algn="just"/>
+            <a:endParaRPr lang="en-US" dirty="0"/>
+          </a:p>
+          <a:p>
+            <a:pPr marL="0" indent="0" algn="just">
+              <a:buNone/>
+            </a:pPr>
+            <a:r>
+              <a:rPr lang="en-US" dirty="0"/>
+              <a:t>In summary, the data obtained offers valuable insights into the performance of various machine learning models across different data scaling techniques. It highlights the importance of selecting appropriate Scalers for different models and tasks. Additionally, it indicates that some models are more robust across different Scalers, while others exhibit sensitivity to the choice of scaling method. </a:t>
+            </a:r>
+            <a:endParaRPr lang="pt-PT" dirty="0"/>
+          </a:p>
+        </p:txBody>
+      </p:sp>
+    </p:spTree>
+    <p:extLst>
+      <p:ext uri="{BB962C8B-B14F-4D97-AF65-F5344CB8AC3E}">
+        <p14:creationId xmlns:p14="http://schemas.microsoft.com/office/powerpoint/2010/main" val="3462444477"/>
+      </p:ext>
+    </p:extLst>
+  </p:cSld>
+  <p:clrMapOvr>
+    <a:masterClrMapping/>
+  </p:clrMapOvr>
+</p:sld>
+</file>
+
+<file path=ppt/slides/slide24.xml><?xml version="1.0" encoding="utf-8"?>
+<p:sld xmlns:a="http://schemas.openxmlformats.org/drawingml/2006/main" xmlns:r="http://schemas.openxmlformats.org/officeDocument/2006/relationships" xmlns:p="http://schemas.openxmlformats.org/presentationml/2006/main">
+  <p:cSld>
+    <p:spTree>
+      <p:nvGrpSpPr>
+        <p:cNvPr id="1" name=""/>
+        <p:cNvGrpSpPr/>
+        <p:nvPr/>
+      </p:nvGrpSpPr>
+      <p:grpSpPr>
+        <a:xfrm>
+          <a:off x="0" y="0"/>
+          <a:ext cx="0" cy="0"/>
+          <a:chOff x="0" y="0"/>
+          <a:chExt cx="0" cy="0"/>
+        </a:xfrm>
+      </p:grpSpPr>
+      <p:sp>
+        <p:nvSpPr>
+          <p:cNvPr id="2" name="Title 1">
+            <a:extLst>
+              <a:ext uri="{FF2B5EF4-FFF2-40B4-BE49-F238E27FC236}">
+                <a16:creationId xmlns:a16="http://schemas.microsoft.com/office/drawing/2014/main" id="{E4D34EBB-CC82-BC79-CBC7-04446F22178E}"/>
+              </a:ext>
+            </a:extLst>
+          </p:cNvPr>
+          <p:cNvSpPr>
+            <a:spLocks noGrp="1"/>
+          </p:cNvSpPr>
+          <p:nvPr>
+            <p:ph type="title"/>
+          </p:nvPr>
+        </p:nvSpPr>
+        <p:spPr/>
+        <p:txBody>
+          <a:bodyPr/>
+          <a:lstStyle/>
+          <a:p>
+            <a:r>
+              <a:rPr lang="pt-PT" dirty="0"/>
+              <a:t>Game </a:t>
+            </a:r>
+            <a:r>
+              <a:rPr lang="pt-PT" dirty="0" err="1"/>
+              <a:t>simulation</a:t>
+            </a:r>
+            <a:r>
+              <a:rPr lang="pt-PT" dirty="0"/>
+              <a:t> </a:t>
+            </a:r>
+            <a:r>
+              <a:rPr lang="pt-PT" dirty="0" err="1"/>
+              <a:t>alternative</a:t>
+            </a:r>
+            <a:endParaRPr lang="pt-PT" dirty="0"/>
+          </a:p>
+        </p:txBody>
+      </p:sp>
+      <p:sp>
+        <p:nvSpPr>
+          <p:cNvPr id="3" name="Content Placeholder 2">
+            <a:extLst>
+              <a:ext uri="{FF2B5EF4-FFF2-40B4-BE49-F238E27FC236}">
+                <a16:creationId xmlns:a16="http://schemas.microsoft.com/office/drawing/2014/main" id="{82023656-1E31-8B35-6B10-545D31AE2457}"/>
+              </a:ext>
+            </a:extLst>
+          </p:cNvPr>
+          <p:cNvSpPr>
+            <a:spLocks noGrp="1"/>
+          </p:cNvSpPr>
+          <p:nvPr>
+            <p:ph idx="1"/>
+          </p:nvPr>
+        </p:nvSpPr>
+        <p:spPr/>
+        <p:txBody>
+          <a:bodyPr/>
+          <a:lstStyle/>
+          <a:p>
+            <a:endParaRPr lang="pt-PT"/>
+          </a:p>
+        </p:txBody>
+      </p:sp>
+    </p:spTree>
+    <p:extLst>
+      <p:ext uri="{BB962C8B-B14F-4D97-AF65-F5344CB8AC3E}">
+        <p14:creationId xmlns:p14="http://schemas.microsoft.com/office/powerpoint/2010/main" val="3577035228"/>
       </p:ext>
     </p:extLst>
   </p:cSld>
@@ -9980,6 +12186,115 @@
       </p:grpSpPr>
       <p:sp>
         <p:nvSpPr>
+          <p:cNvPr id="2" name="Title 1">
+            <a:extLst>
+              <a:ext uri="{FF2B5EF4-FFF2-40B4-BE49-F238E27FC236}">
+                <a16:creationId xmlns:a16="http://schemas.microsoft.com/office/drawing/2014/main" id="{53D0A162-E17D-9858-45AB-ADE9A2F23D42}"/>
+              </a:ext>
+            </a:extLst>
+          </p:cNvPr>
+          <p:cNvSpPr>
+            <a:spLocks noGrp="1"/>
+          </p:cNvSpPr>
+          <p:nvPr>
+            <p:ph type="title"/>
+          </p:nvPr>
+        </p:nvSpPr>
+        <p:spPr>
+          <a:xfrm>
+            <a:off x="1109342" y="304747"/>
+            <a:ext cx="10462994" cy="1492132"/>
+          </a:xfrm>
+        </p:spPr>
+        <p:txBody>
+          <a:bodyPr/>
+          <a:lstStyle/>
+          <a:p>
+            <a:r>
+              <a:rPr lang="en-US" dirty="0"/>
+              <a:t>Main Steps for playoff prediction</a:t>
+            </a:r>
+          </a:p>
+        </p:txBody>
+      </p:sp>
+      <p:sp>
+        <p:nvSpPr>
+          <p:cNvPr id="3" name="Content Placeholder 2">
+            <a:extLst>
+              <a:ext uri="{FF2B5EF4-FFF2-40B4-BE49-F238E27FC236}">
+                <a16:creationId xmlns:a16="http://schemas.microsoft.com/office/drawing/2014/main" id="{4C5D09C2-DEF5-6B47-3806-442D1DCC28B5}"/>
+              </a:ext>
+            </a:extLst>
+          </p:cNvPr>
+          <p:cNvSpPr>
+            <a:spLocks noGrp="1"/>
+          </p:cNvSpPr>
+          <p:nvPr>
+            <p:ph idx="1"/>
+          </p:nvPr>
+        </p:nvSpPr>
+        <p:spPr/>
+        <p:txBody>
+          <a:bodyPr/>
+          <a:lstStyle/>
+          <a:p>
+            <a:r>
+              <a:rPr lang="en-US" dirty="0"/>
+              <a:t>Feature Engineering in the different tables</a:t>
+            </a:r>
+          </a:p>
+          <a:p>
+            <a:r>
+              <a:rPr lang="en-US" dirty="0"/>
+              <a:t>Prediction of some player evaluation metrics that reflect its performance in the upcoming season</a:t>
+            </a:r>
+          </a:p>
+          <a:p>
+            <a:r>
+              <a:rPr lang="en-US" dirty="0"/>
+              <a:t>Prediction of the team’s results, according to the statistics of the players that are part of it</a:t>
+            </a:r>
+          </a:p>
+          <a:p>
+            <a:r>
+              <a:rPr lang="en-US" dirty="0"/>
+              <a:t>Comparison between team’s results and choice of the best 8 teams for qualification</a:t>
+            </a:r>
+          </a:p>
+        </p:txBody>
+      </p:sp>
+    </p:spTree>
+    <p:extLst>
+      <p:ext uri="{BB962C8B-B14F-4D97-AF65-F5344CB8AC3E}">
+        <p14:creationId xmlns:p14="http://schemas.microsoft.com/office/powerpoint/2010/main" val="2780388935"/>
+      </p:ext>
+    </p:extLst>
+  </p:cSld>
+  <p:clrMapOvr>
+    <a:masterClrMapping/>
+  </p:clrMapOvr>
+</p:sld>
+</file>
+
+<file path=ppt/slides/slide7.xml><?xml version="1.0" encoding="utf-8"?>
+<p:sld xmlns:a="http://schemas.openxmlformats.org/drawingml/2006/main" xmlns:r="http://schemas.openxmlformats.org/officeDocument/2006/relationships" xmlns:p="http://schemas.openxmlformats.org/presentationml/2006/main">
+  <p:cSld>
+    <p:spTree>
+      <p:nvGrpSpPr>
+        <p:cNvPr id="1" name=""/>
+        <p:cNvGrpSpPr/>
+        <p:nvPr/>
+      </p:nvGrpSpPr>
+      <p:grpSpPr>
+        <a:xfrm>
+          <a:off x="0" y="0"/>
+          <a:ext cx="0" cy="0"/>
+          <a:chOff x="0" y="0"/>
+          <a:chExt cx="0" cy="0"/>
+        </a:xfrm>
+      </p:grpSpPr>
+      <p:sp>
+        <p:nvSpPr>
           <p:cNvPr id="2" name="Título 1">
             <a:extLst>
               <a:ext uri="{FF2B5EF4-FFF2-40B4-BE49-F238E27FC236}">
@@ -10275,7 +12590,7 @@
 </p:sld>
 </file>
 
-<file path=ppt/slides/slide7.xml><?xml version="1.0" encoding="utf-8"?>
+<file path=ppt/slides/slide8.xml><?xml version="1.0" encoding="utf-8"?>
 <p:sld xmlns:a="http://schemas.openxmlformats.org/drawingml/2006/main" xmlns:r="http://schemas.openxmlformats.org/officeDocument/2006/relationships" xmlns:p="http://schemas.openxmlformats.org/presentationml/2006/main">
   <p:cSld>
     <p:spTree>
@@ -10435,7 +12750,7 @@
 </p:sld>
 </file>
 
-<file path=ppt/slides/slide8.xml><?xml version="1.0" encoding="utf-8"?>
+<file path=ppt/slides/slide9.xml><?xml version="1.0" encoding="utf-8"?>
 <p:sld xmlns:a="http://schemas.openxmlformats.org/drawingml/2006/main" xmlns:r="http://schemas.openxmlformats.org/officeDocument/2006/relationships" xmlns:p="http://schemas.openxmlformats.org/presentationml/2006/main">
   <p:cSld>
     <p:spTree>
@@ -10509,90 +12824,6 @@
     <p:extLst>
       <p:ext uri="{BB962C8B-B14F-4D97-AF65-F5344CB8AC3E}">
         <p14:creationId xmlns:p14="http://schemas.microsoft.com/office/powerpoint/2010/main" val="3387298468"/>
-      </p:ext>
-    </p:extLst>
-  </p:cSld>
-  <p:clrMapOvr>
-    <a:masterClrMapping/>
-  </p:clrMapOvr>
-</p:sld>
-</file>
-
-<file path=ppt/slides/slide9.xml><?xml version="1.0" encoding="utf-8"?>
-<p:sld xmlns:a="http://schemas.openxmlformats.org/drawingml/2006/main" xmlns:r="http://schemas.openxmlformats.org/officeDocument/2006/relationships" xmlns:p="http://schemas.openxmlformats.org/presentationml/2006/main">
-  <p:cSld>
-    <p:spTree>
-      <p:nvGrpSpPr>
-        <p:cNvPr id="1" name=""/>
-        <p:cNvGrpSpPr/>
-        <p:nvPr/>
-      </p:nvGrpSpPr>
-      <p:grpSpPr>
-        <a:xfrm>
-          <a:off x="0" y="0"/>
-          <a:ext cx="0" cy="0"/>
-          <a:chOff x="0" y="0"/>
-          <a:chExt cx="0" cy="0"/>
-        </a:xfrm>
-      </p:grpSpPr>
-      <p:sp>
-        <p:nvSpPr>
-          <p:cNvPr id="2" name="Título 1">
-            <a:extLst>
-              <a:ext uri="{FF2B5EF4-FFF2-40B4-BE49-F238E27FC236}">
-                <a16:creationId xmlns:a16="http://schemas.microsoft.com/office/drawing/2014/main" id="{AD4F8C47-E9F1-5A8E-98E4-BB381FC5CC1B}"/>
-              </a:ext>
-            </a:extLst>
-          </p:cNvPr>
-          <p:cNvSpPr>
-            <a:spLocks noGrp="1"/>
-          </p:cNvSpPr>
-          <p:nvPr>
-            <p:ph type="title"/>
-          </p:nvPr>
-        </p:nvSpPr>
-        <p:spPr/>
-        <p:txBody>
-          <a:bodyPr/>
-          <a:lstStyle/>
-          <a:p>
-            <a:r>
-              <a:rPr lang="pt-PT" dirty="0" err="1"/>
-              <a:t>Results</a:t>
-            </a:r>
-            <a:endParaRPr lang="pt-PT" dirty="0"/>
-          </a:p>
-        </p:txBody>
-      </p:sp>
-      <p:sp>
-        <p:nvSpPr>
-          <p:cNvPr id="3" name="Marcador de Posição de Conteúdo 2">
-            <a:extLst>
-              <a:ext uri="{FF2B5EF4-FFF2-40B4-BE49-F238E27FC236}">
-                <a16:creationId xmlns:a16="http://schemas.microsoft.com/office/drawing/2014/main" id="{74E874F6-0926-BCD5-0745-9366A2D607DA}"/>
-              </a:ext>
-            </a:extLst>
-          </p:cNvPr>
-          <p:cNvSpPr>
-            <a:spLocks noGrp="1"/>
-          </p:cNvSpPr>
-          <p:nvPr>
-            <p:ph idx="1"/>
-          </p:nvPr>
-        </p:nvSpPr>
-        <p:spPr/>
-        <p:txBody>
-          <a:bodyPr/>
-          <a:lstStyle/>
-          <a:p>
-            <a:endParaRPr lang="pt-PT"/>
-          </a:p>
-        </p:txBody>
-      </p:sp>
-    </p:spTree>
-    <p:extLst>
-      <p:ext uri="{BB962C8B-B14F-4D97-AF65-F5344CB8AC3E}">
-        <p14:creationId xmlns:p14="http://schemas.microsoft.com/office/powerpoint/2010/main" val="3698104424"/>
       </p:ext>
     </p:extLst>
   </p:cSld>

</xml_diff>

<commit_message>
changed ppt (added lagged features and game simulation)
</commit_message>
<xml_diff>
--- a/ppt projeto.pptx
+++ b/ppt projeto.pptx
@@ -13,22 +13,23 @@
     <p:sldId id="278" r:id="rId7"/>
     <p:sldId id="261" r:id="rId8"/>
     <p:sldId id="262" r:id="rId9"/>
-    <p:sldId id="263" r:id="rId10"/>
-    <p:sldId id="264" r:id="rId11"/>
-    <p:sldId id="265" r:id="rId12"/>
-    <p:sldId id="266" r:id="rId13"/>
-    <p:sldId id="276" r:id="rId14"/>
-    <p:sldId id="277" r:id="rId15"/>
-    <p:sldId id="275" r:id="rId16"/>
-    <p:sldId id="268" r:id="rId17"/>
-    <p:sldId id="267" r:id="rId18"/>
-    <p:sldId id="269" r:id="rId19"/>
-    <p:sldId id="270" r:id="rId20"/>
-    <p:sldId id="271" r:id="rId21"/>
-    <p:sldId id="273" r:id="rId22"/>
-    <p:sldId id="279" r:id="rId23"/>
-    <p:sldId id="280" r:id="rId24"/>
-    <p:sldId id="274" r:id="rId25"/>
+    <p:sldId id="281" r:id="rId10"/>
+    <p:sldId id="263" r:id="rId11"/>
+    <p:sldId id="264" r:id="rId12"/>
+    <p:sldId id="265" r:id="rId13"/>
+    <p:sldId id="266" r:id="rId14"/>
+    <p:sldId id="276" r:id="rId15"/>
+    <p:sldId id="277" r:id="rId16"/>
+    <p:sldId id="275" r:id="rId17"/>
+    <p:sldId id="268" r:id="rId18"/>
+    <p:sldId id="267" r:id="rId19"/>
+    <p:sldId id="269" r:id="rId20"/>
+    <p:sldId id="270" r:id="rId21"/>
+    <p:sldId id="271" r:id="rId22"/>
+    <p:sldId id="273" r:id="rId23"/>
+    <p:sldId id="279" r:id="rId24"/>
+    <p:sldId id="280" r:id="rId25"/>
+    <p:sldId id="274" r:id="rId26"/>
   </p:sldIdLst>
   <p:sldSz cx="12192000" cy="6858000"/>
   <p:notesSz cx="6858000" cy="9144000"/>
@@ -1346,7 +1347,7 @@
           <a:p>
             <a:fld id="{A73D0D99-86C5-4560-B8F4-5530516C9A59}" type="datetimeFigureOut">
               <a:rPr lang="pt-PT" smtClean="0"/>
-              <a:t>29/10/2023</a:t>
+              <a:t>30/10/23</a:t>
             </a:fld>
             <a:endParaRPr lang="pt-PT"/>
           </a:p>
@@ -1584,7 +1585,7 @@
           <a:p>
             <a:fld id="{A73D0D99-86C5-4560-B8F4-5530516C9A59}" type="datetimeFigureOut">
               <a:rPr lang="pt-PT" smtClean="0"/>
-              <a:t>29/10/2023</a:t>
+              <a:t>30/10/23</a:t>
             </a:fld>
             <a:endParaRPr lang="pt-PT"/>
           </a:p>
@@ -1764,7 +1765,7 @@
           <a:p>
             <a:fld id="{A73D0D99-86C5-4560-B8F4-5530516C9A59}" type="datetimeFigureOut">
               <a:rPr lang="pt-PT" smtClean="0"/>
-              <a:t>29/10/2023</a:t>
+              <a:t>30/10/23</a:t>
             </a:fld>
             <a:endParaRPr lang="pt-PT"/>
           </a:p>
@@ -1934,7 +1935,7 @@
           <a:p>
             <a:fld id="{A73D0D99-86C5-4560-B8F4-5530516C9A59}" type="datetimeFigureOut">
               <a:rPr lang="pt-PT" smtClean="0"/>
-              <a:t>29/10/2023</a:t>
+              <a:t>30/10/23</a:t>
             </a:fld>
             <a:endParaRPr lang="pt-PT"/>
           </a:p>
@@ -2210,7 +2211,7 @@
           <a:p>
             <a:fld id="{A73D0D99-86C5-4560-B8F4-5530516C9A59}" type="datetimeFigureOut">
               <a:rPr lang="pt-PT" smtClean="0"/>
-              <a:t>29/10/2023</a:t>
+              <a:t>30/10/23</a:t>
             </a:fld>
             <a:endParaRPr lang="pt-PT"/>
           </a:p>
@@ -3411,7 +3412,7 @@
           <a:p>
             <a:fld id="{A73D0D99-86C5-4560-B8F4-5530516C9A59}" type="datetimeFigureOut">
               <a:rPr lang="pt-PT" smtClean="0"/>
-              <a:t>29/10/2023</a:t>
+              <a:t>30/10/23</a:t>
             </a:fld>
             <a:endParaRPr lang="pt-PT"/>
           </a:p>
@@ -3801,7 +3802,7 @@
           <a:p>
             <a:fld id="{A73D0D99-86C5-4560-B8F4-5530516C9A59}" type="datetimeFigureOut">
               <a:rPr lang="pt-PT" smtClean="0"/>
-              <a:t>29/10/2023</a:t>
+              <a:t>30/10/23</a:t>
             </a:fld>
             <a:endParaRPr lang="pt-PT"/>
           </a:p>
@@ -3924,7 +3925,7 @@
           <a:p>
             <a:fld id="{A73D0D99-86C5-4560-B8F4-5530516C9A59}" type="datetimeFigureOut">
               <a:rPr lang="pt-PT" smtClean="0"/>
-              <a:t>29/10/2023</a:t>
+              <a:t>30/10/23</a:t>
             </a:fld>
             <a:endParaRPr lang="pt-PT"/>
           </a:p>
@@ -4019,7 +4020,7 @@
           <a:p>
             <a:fld id="{A73D0D99-86C5-4560-B8F4-5530516C9A59}" type="datetimeFigureOut">
               <a:rPr lang="pt-PT" smtClean="0"/>
-              <a:t>29/10/2023</a:t>
+              <a:t>30/10/23</a:t>
             </a:fld>
             <a:endParaRPr lang="pt-PT"/>
           </a:p>
@@ -4782,7 +4783,7 @@
           <a:p>
             <a:fld id="{A73D0D99-86C5-4560-B8F4-5530516C9A59}" type="datetimeFigureOut">
               <a:rPr lang="pt-PT" smtClean="0"/>
-              <a:t>29/10/2023</a:t>
+              <a:t>30/10/23</a:t>
             </a:fld>
             <a:endParaRPr lang="pt-PT"/>
           </a:p>
@@ -5622,7 +5623,7 @@
           <a:p>
             <a:fld id="{A73D0D99-86C5-4560-B8F4-5530516C9A59}" type="datetimeFigureOut">
               <a:rPr lang="pt-PT" smtClean="0"/>
-              <a:t>29/10/2023</a:t>
+              <a:t>30/10/23</a:t>
             </a:fld>
             <a:endParaRPr lang="pt-PT"/>
           </a:p>
@@ -5849,7 +5850,7 @@
           <a:p>
             <a:fld id="{A73D0D99-86C5-4560-B8F4-5530516C9A59}" type="datetimeFigureOut">
               <a:rPr lang="pt-PT" smtClean="0"/>
-              <a:t>29/10/2023</a:t>
+              <a:t>30/10/23</a:t>
             </a:fld>
             <a:endParaRPr lang="pt-PT"/>
           </a:p>
@@ -7276,6 +7277,89 @@
           <p:cNvPr id="2" name="Título 1">
             <a:extLst>
               <a:ext uri="{FF2B5EF4-FFF2-40B4-BE49-F238E27FC236}">
+                <a16:creationId xmlns:a16="http://schemas.microsoft.com/office/drawing/2014/main" id="{0F8D8DBC-06AA-2C5A-0A94-C370D62F102C}"/>
+              </a:ext>
+            </a:extLst>
+          </p:cNvPr>
+          <p:cNvSpPr>
+            <a:spLocks noGrp="1"/>
+          </p:cNvSpPr>
+          <p:nvPr>
+            <p:ph type="title"/>
+          </p:nvPr>
+        </p:nvSpPr>
+        <p:spPr/>
+        <p:txBody>
+          <a:bodyPr/>
+          <a:lstStyle/>
+          <a:p>
+            <a:r>
+              <a:rPr lang="pt-PT" dirty="0"/>
+              <a:t>Experimental Setup</a:t>
+            </a:r>
+          </a:p>
+        </p:txBody>
+      </p:sp>
+      <p:sp>
+        <p:nvSpPr>
+          <p:cNvPr id="3" name="Marcador de Posição de Conteúdo 2">
+            <a:extLst>
+              <a:ext uri="{FF2B5EF4-FFF2-40B4-BE49-F238E27FC236}">
+                <a16:creationId xmlns:a16="http://schemas.microsoft.com/office/drawing/2014/main" id="{4BF98680-B298-EC08-D2A1-C76F4720486C}"/>
+              </a:ext>
+            </a:extLst>
+          </p:cNvPr>
+          <p:cNvSpPr>
+            <a:spLocks noGrp="1"/>
+          </p:cNvSpPr>
+          <p:nvPr>
+            <p:ph idx="1"/>
+          </p:nvPr>
+        </p:nvSpPr>
+        <p:spPr/>
+        <p:txBody>
+          <a:bodyPr/>
+          <a:lstStyle/>
+          <a:p>
+            <a:endParaRPr lang="pt-PT"/>
+          </a:p>
+        </p:txBody>
+      </p:sp>
+    </p:spTree>
+    <p:extLst>
+      <p:ext uri="{BB962C8B-B14F-4D97-AF65-F5344CB8AC3E}">
+        <p14:creationId xmlns:p14="http://schemas.microsoft.com/office/powerpoint/2010/main" val="3387298468"/>
+      </p:ext>
+    </p:extLst>
+  </p:cSld>
+  <p:clrMapOvr>
+    <a:masterClrMapping/>
+  </p:clrMapOvr>
+</p:sld>
+</file>
+
+<file path=ppt/slides/slide11.xml><?xml version="1.0" encoding="utf-8"?>
+<p:sld xmlns:a="http://schemas.openxmlformats.org/drawingml/2006/main" xmlns:r="http://schemas.openxmlformats.org/officeDocument/2006/relationships" xmlns:p="http://schemas.openxmlformats.org/presentationml/2006/main">
+  <p:cSld>
+    <p:spTree>
+      <p:nvGrpSpPr>
+        <p:cNvPr id="1" name=""/>
+        <p:cNvGrpSpPr/>
+        <p:nvPr/>
+      </p:nvGrpSpPr>
+      <p:grpSpPr>
+        <a:xfrm>
+          <a:off x="0" y="0"/>
+          <a:ext cx="0" cy="0"/>
+          <a:chOff x="0" y="0"/>
+          <a:chExt cx="0" cy="0"/>
+        </a:xfrm>
+      </p:grpSpPr>
+      <p:sp>
+        <p:nvSpPr>
+          <p:cNvPr id="2" name="Título 1">
+            <a:extLst>
+              <a:ext uri="{FF2B5EF4-FFF2-40B4-BE49-F238E27FC236}">
                 <a16:creationId xmlns:a16="http://schemas.microsoft.com/office/drawing/2014/main" id="{AD4F8C47-E9F1-5A8E-98E4-BB381FC5CC1B}"/>
               </a:ext>
             </a:extLst>
@@ -7338,7 +7422,7 @@
 </p:sld>
 </file>
 
-<file path=ppt/slides/slide11.xml><?xml version="1.0" encoding="utf-8"?>
+<file path=ppt/slides/slide12.xml><?xml version="1.0" encoding="utf-8"?>
 <p:sld xmlns:a="http://schemas.openxmlformats.org/drawingml/2006/main" xmlns:r="http://schemas.openxmlformats.org/officeDocument/2006/relationships" xmlns:p="http://schemas.openxmlformats.org/presentationml/2006/main">
   <p:cSld>
     <p:spTree>
@@ -7422,7 +7506,7 @@
 </p:sld>
 </file>
 
-<file path=ppt/slides/slide12.xml><?xml version="1.0" encoding="utf-8"?>
+<file path=ppt/slides/slide13.xml><?xml version="1.0" encoding="utf-8"?>
 <p:sld xmlns:a="http://schemas.openxmlformats.org/drawingml/2006/main" xmlns:r="http://schemas.openxmlformats.org/officeDocument/2006/relationships" xmlns:p="http://schemas.openxmlformats.org/presentationml/2006/main">
   <p:cSld>
     <p:spTree>
@@ -7506,7 +7590,7 @@
 </p:sld>
 </file>
 
-<file path=ppt/slides/slide13.xml><?xml version="1.0" encoding="utf-8"?>
+<file path=ppt/slides/slide14.xml><?xml version="1.0" encoding="utf-8"?>
 <p:sld xmlns:a="http://schemas.openxmlformats.org/drawingml/2006/main" xmlns:r="http://schemas.openxmlformats.org/officeDocument/2006/relationships" xmlns:p="http://schemas.openxmlformats.org/presentationml/2006/main">
   <p:cSld>
     <p:spTree>
@@ -7603,7 +7687,7 @@
 </p:sld>
 </file>
 
-<file path=ppt/slides/slide14.xml><?xml version="1.0" encoding="utf-8"?>
+<file path=ppt/slides/slide15.xml><?xml version="1.0" encoding="utf-8"?>
 <p:sld xmlns:a="http://schemas.openxmlformats.org/drawingml/2006/main" xmlns:r="http://schemas.openxmlformats.org/officeDocument/2006/relationships" xmlns:p="http://schemas.openxmlformats.org/presentationml/2006/main">
   <p:cSld>
     <p:spTree>
@@ -7726,7 +7810,7 @@
 </p:sld>
 </file>
 
-<file path=ppt/slides/slide15.xml><?xml version="1.0" encoding="utf-8"?>
+<file path=ppt/slides/slide16.xml><?xml version="1.0" encoding="utf-8"?>
 <p:sld xmlns:a="http://schemas.openxmlformats.org/drawingml/2006/main" xmlns:r="http://schemas.openxmlformats.org/officeDocument/2006/relationships" xmlns:p="http://schemas.openxmlformats.org/presentationml/2006/main">
   <p:cSld>
     <p:spTree>
@@ -7863,7 +7947,7 @@
 </p:sld>
 </file>
 
-<file path=ppt/slides/slide16.xml><?xml version="1.0" encoding="utf-8"?>
+<file path=ppt/slides/slide17.xml><?xml version="1.0" encoding="utf-8"?>
 <p:sld xmlns:a="http://schemas.openxmlformats.org/drawingml/2006/main" xmlns:r="http://schemas.openxmlformats.org/officeDocument/2006/relationships" xmlns:p="http://schemas.openxmlformats.org/presentationml/2006/main">
   <p:cSld>
     <p:spTree>
@@ -7980,7 +8064,7 @@
 </p:sld>
 </file>
 
-<file path=ppt/slides/slide17.xml><?xml version="1.0" encoding="utf-8"?>
+<file path=ppt/slides/slide18.xml><?xml version="1.0" encoding="utf-8"?>
 <p:sld xmlns:a="http://schemas.openxmlformats.org/drawingml/2006/main" xmlns:r="http://schemas.openxmlformats.org/officeDocument/2006/relationships" xmlns:p="http://schemas.openxmlformats.org/presentationml/2006/main">
   <p:cSld>
     <p:spTree>
@@ -8432,7 +8516,7 @@
 </p:sld>
 </file>
 
-<file path=ppt/slides/slide18.xml><?xml version="1.0" encoding="utf-8"?>
+<file path=ppt/slides/slide19.xml><?xml version="1.0" encoding="utf-8"?>
 <p:sld xmlns:a="http://schemas.openxmlformats.org/drawingml/2006/main" xmlns:r="http://schemas.openxmlformats.org/officeDocument/2006/relationships" xmlns:p="http://schemas.openxmlformats.org/presentationml/2006/main">
   <p:cSld>
     <p:spTree>
@@ -8576,7 +8660,270 @@
 </p:sld>
 </file>
 
-<file path=ppt/slides/slide19.xml><?xml version="1.0" encoding="utf-8"?>
+<file path=ppt/slides/slide2.xml><?xml version="1.0" encoding="utf-8"?>
+<p:sld xmlns:a="http://schemas.openxmlformats.org/drawingml/2006/main" xmlns:r="http://schemas.openxmlformats.org/officeDocument/2006/relationships" xmlns:p="http://schemas.openxmlformats.org/presentationml/2006/main">
+  <p:cSld>
+    <p:spTree>
+      <p:nvGrpSpPr>
+        <p:cNvPr id="1" name=""/>
+        <p:cNvGrpSpPr/>
+        <p:nvPr/>
+      </p:nvGrpSpPr>
+      <p:grpSpPr>
+        <a:xfrm>
+          <a:off x="0" y="0"/>
+          <a:ext cx="0" cy="0"/>
+          <a:chOff x="0" y="0"/>
+          <a:chExt cx="0" cy="0"/>
+        </a:xfrm>
+      </p:grpSpPr>
+      <p:sp>
+        <p:nvSpPr>
+          <p:cNvPr id="2" name="Título 1">
+            <a:extLst>
+              <a:ext uri="{FF2B5EF4-FFF2-40B4-BE49-F238E27FC236}">
+                <a16:creationId xmlns:a16="http://schemas.microsoft.com/office/drawing/2014/main" id="{7D45C8BF-6D24-1EC9-AF02-6A7830A81A84}"/>
+              </a:ext>
+            </a:extLst>
+          </p:cNvPr>
+          <p:cNvSpPr>
+            <a:spLocks noGrp="1"/>
+          </p:cNvSpPr>
+          <p:nvPr>
+            <p:ph type="title"/>
+          </p:nvPr>
+        </p:nvSpPr>
+        <p:spPr/>
+        <p:txBody>
+          <a:bodyPr/>
+          <a:lstStyle/>
+          <a:p>
+            <a:r>
+              <a:rPr lang="pt-PT" dirty="0" err="1"/>
+              <a:t>Domain</a:t>
+            </a:r>
+            <a:r>
+              <a:rPr lang="pt-PT" dirty="0"/>
+              <a:t> </a:t>
+            </a:r>
+            <a:r>
+              <a:rPr lang="pt-PT" dirty="0" err="1"/>
+              <a:t>description</a:t>
+            </a:r>
+            <a:endParaRPr lang="pt-PT" dirty="0"/>
+          </a:p>
+        </p:txBody>
+      </p:sp>
+      <p:sp>
+        <p:nvSpPr>
+          <p:cNvPr id="3" name="Marcador de Posição de Conteúdo 2">
+            <a:extLst>
+              <a:ext uri="{FF2B5EF4-FFF2-40B4-BE49-F238E27FC236}">
+                <a16:creationId xmlns:a16="http://schemas.microsoft.com/office/drawing/2014/main" id="{FDB30777-F711-D17E-8B97-BB5AAC1ED375}"/>
+              </a:ext>
+            </a:extLst>
+          </p:cNvPr>
+          <p:cNvSpPr>
+            <a:spLocks noGrp="1"/>
+          </p:cNvSpPr>
+          <p:nvPr>
+            <p:ph idx="1"/>
+          </p:nvPr>
+        </p:nvSpPr>
+        <p:spPr>
+          <a:xfrm>
+            <a:off x="1615315" y="1846253"/>
+            <a:ext cx="3663767" cy="3101983"/>
+          </a:xfrm>
+        </p:spPr>
+        <p:txBody>
+          <a:bodyPr>
+            <a:normAutofit/>
+          </a:bodyPr>
+          <a:lstStyle/>
+          <a:p>
+            <a:r>
+              <a:rPr lang="en-US" sz="1800" dirty="0"/>
+              <a:t>For 10 seasons (years) data from players, teams, coaches, games, and several other metrics were gathered and arranged on this dataset.</a:t>
+            </a:r>
+          </a:p>
+          <a:p>
+            <a:r>
+              <a:rPr lang="pt-PT" sz="1800" dirty="0" err="1"/>
+              <a:t>Our</a:t>
+            </a:r>
+            <a:r>
+              <a:rPr lang="pt-PT" sz="1800" dirty="0"/>
+              <a:t> </a:t>
+            </a:r>
+            <a:r>
+              <a:rPr lang="pt-PT" sz="1800" dirty="0" err="1"/>
+              <a:t>main</a:t>
+            </a:r>
+            <a:r>
+              <a:rPr lang="pt-PT" sz="1800" dirty="0"/>
+              <a:t> </a:t>
+            </a:r>
+            <a:r>
+              <a:rPr lang="pt-PT" sz="1800" dirty="0" err="1"/>
+              <a:t>goal</a:t>
+            </a:r>
+            <a:r>
+              <a:rPr lang="pt-PT" sz="1800" dirty="0"/>
+              <a:t> </a:t>
+            </a:r>
+            <a:r>
+              <a:rPr lang="pt-PT" sz="1800" dirty="0" err="1"/>
+              <a:t>is</a:t>
+            </a:r>
+            <a:r>
+              <a:rPr lang="pt-PT" sz="1800" dirty="0"/>
+              <a:t>, </a:t>
+            </a:r>
+            <a:r>
+              <a:rPr lang="pt-PT" sz="1800" dirty="0" err="1"/>
+              <a:t>using</a:t>
+            </a:r>
+            <a:r>
+              <a:rPr lang="pt-PT" sz="1800" dirty="0"/>
+              <a:t> </a:t>
+            </a:r>
+            <a:r>
+              <a:rPr lang="pt-PT" sz="1800" dirty="0" err="1"/>
+              <a:t>this</a:t>
+            </a:r>
+            <a:r>
+              <a:rPr lang="pt-PT" sz="1800" dirty="0"/>
+              <a:t> data, to </a:t>
+            </a:r>
+            <a:r>
+              <a:rPr lang="pt-PT" sz="1800" dirty="0" err="1"/>
+              <a:t>develop</a:t>
+            </a:r>
+            <a:r>
+              <a:rPr lang="pt-PT" sz="1800" dirty="0"/>
+              <a:t> a </a:t>
+            </a:r>
+            <a:r>
+              <a:rPr lang="pt-PT" sz="1800" dirty="0" err="1"/>
+              <a:t>model</a:t>
+            </a:r>
+            <a:r>
+              <a:rPr lang="pt-PT" sz="1800" dirty="0"/>
+              <a:t> </a:t>
+            </a:r>
+            <a:r>
+              <a:rPr lang="pt-PT" sz="1800" dirty="0" err="1"/>
+              <a:t>that</a:t>
+            </a:r>
+            <a:r>
+              <a:rPr lang="pt-PT" sz="1800" dirty="0"/>
+              <a:t> can </a:t>
+            </a:r>
+            <a:r>
+              <a:rPr lang="pt-PT" sz="1800" dirty="0" err="1"/>
+              <a:t>predict</a:t>
+            </a:r>
+            <a:r>
+              <a:rPr lang="pt-PT" sz="1800" dirty="0"/>
+              <a:t> </a:t>
+            </a:r>
+            <a:r>
+              <a:rPr lang="pt-PT" sz="1800" dirty="0" err="1"/>
+              <a:t>which</a:t>
+            </a:r>
+            <a:r>
+              <a:rPr lang="pt-PT" sz="1800" dirty="0"/>
+              <a:t> teams </a:t>
+            </a:r>
+            <a:r>
+              <a:rPr lang="pt-PT" sz="1800" dirty="0" err="1"/>
+              <a:t>go</a:t>
+            </a:r>
+            <a:r>
+              <a:rPr lang="pt-PT" sz="1800" dirty="0"/>
+              <a:t> to </a:t>
+            </a:r>
+            <a:r>
+              <a:rPr lang="pt-PT" sz="1800" dirty="0" err="1"/>
+              <a:t>the</a:t>
+            </a:r>
+            <a:r>
+              <a:rPr lang="pt-PT" sz="1800" dirty="0"/>
+              <a:t> (8 </a:t>
+            </a:r>
+            <a:r>
+              <a:rPr lang="pt-PT" sz="1800" dirty="0" err="1"/>
+              <a:t>first</a:t>
+            </a:r>
+            <a:r>
+              <a:rPr lang="pt-PT" sz="1800" dirty="0"/>
+              <a:t> teams).</a:t>
+            </a:r>
+          </a:p>
+        </p:txBody>
+      </p:sp>
+      <p:pic>
+        <p:nvPicPr>
+          <p:cNvPr id="1030" name="Picture 6">
+            <a:extLst>
+              <a:ext uri="{FF2B5EF4-FFF2-40B4-BE49-F238E27FC236}">
+                <a16:creationId xmlns:a16="http://schemas.microsoft.com/office/drawing/2014/main" id="{735B204F-C64D-AA75-3628-5C77E50E081D}"/>
+              </a:ext>
+            </a:extLst>
+          </p:cNvPr>
+          <p:cNvPicPr>
+            <a:picLocks noChangeAspect="1" noChangeArrowheads="1"/>
+          </p:cNvPicPr>
+          <p:nvPr/>
+        </p:nvPicPr>
+        <p:blipFill>
+          <a:blip r:embed="rId2">
+            <a:extLst>
+              <a:ext uri="{28A0092B-C50C-407E-A947-70E740481C1C}">
+                <a14:useLocalDpi xmlns:a14="http://schemas.microsoft.com/office/drawing/2010/main" val="0"/>
+              </a:ext>
+            </a:extLst>
+          </a:blip>
+          <a:srcRect/>
+          <a:stretch>
+            <a:fillRect/>
+          </a:stretch>
+        </p:blipFill>
+        <p:spPr bwMode="auto">
+          <a:xfrm>
+            <a:off x="5948654" y="1203309"/>
+            <a:ext cx="5128363" cy="4451381"/>
+          </a:xfrm>
+          <a:prstGeom prst="rect">
+            <a:avLst/>
+          </a:prstGeom>
+          <a:noFill/>
+          <a:extLst>
+            <a:ext uri="{909E8E84-426E-40DD-AFC4-6F175D3DCCD1}">
+              <a14:hiddenFill xmlns:a14="http://schemas.microsoft.com/office/drawing/2010/main">
+                <a:solidFill>
+                  <a:srgbClr val="FFFFFF"/>
+                </a:solidFill>
+              </a14:hiddenFill>
+            </a:ext>
+          </a:extLst>
+        </p:spPr>
+      </p:pic>
+    </p:spTree>
+    <p:extLst>
+      <p:ext uri="{BB962C8B-B14F-4D97-AF65-F5344CB8AC3E}">
+        <p14:creationId xmlns:p14="http://schemas.microsoft.com/office/powerpoint/2010/main" val="1662472812"/>
+      </p:ext>
+    </p:extLst>
+  </p:cSld>
+  <p:clrMapOvr>
+    <a:masterClrMapping/>
+  </p:clrMapOvr>
+</p:sld>
+</file>
+
+<file path=ppt/slides/slide20.xml><?xml version="1.0" encoding="utf-8"?>
 <p:sld xmlns:a="http://schemas.openxmlformats.org/drawingml/2006/main" xmlns:r="http://schemas.openxmlformats.org/officeDocument/2006/relationships" xmlns:p="http://schemas.openxmlformats.org/presentationml/2006/main">
   <p:cSld>
     <p:spTree>
@@ -8795,270 +9142,7 @@
 </p:sld>
 </file>
 
-<file path=ppt/slides/slide2.xml><?xml version="1.0" encoding="utf-8"?>
-<p:sld xmlns:a="http://schemas.openxmlformats.org/drawingml/2006/main" xmlns:r="http://schemas.openxmlformats.org/officeDocument/2006/relationships" xmlns:p="http://schemas.openxmlformats.org/presentationml/2006/main">
-  <p:cSld>
-    <p:spTree>
-      <p:nvGrpSpPr>
-        <p:cNvPr id="1" name=""/>
-        <p:cNvGrpSpPr/>
-        <p:nvPr/>
-      </p:nvGrpSpPr>
-      <p:grpSpPr>
-        <a:xfrm>
-          <a:off x="0" y="0"/>
-          <a:ext cx="0" cy="0"/>
-          <a:chOff x="0" y="0"/>
-          <a:chExt cx="0" cy="0"/>
-        </a:xfrm>
-      </p:grpSpPr>
-      <p:sp>
-        <p:nvSpPr>
-          <p:cNvPr id="2" name="Título 1">
-            <a:extLst>
-              <a:ext uri="{FF2B5EF4-FFF2-40B4-BE49-F238E27FC236}">
-                <a16:creationId xmlns:a16="http://schemas.microsoft.com/office/drawing/2014/main" id="{7D45C8BF-6D24-1EC9-AF02-6A7830A81A84}"/>
-              </a:ext>
-            </a:extLst>
-          </p:cNvPr>
-          <p:cNvSpPr>
-            <a:spLocks noGrp="1"/>
-          </p:cNvSpPr>
-          <p:nvPr>
-            <p:ph type="title"/>
-          </p:nvPr>
-        </p:nvSpPr>
-        <p:spPr/>
-        <p:txBody>
-          <a:bodyPr/>
-          <a:lstStyle/>
-          <a:p>
-            <a:r>
-              <a:rPr lang="pt-PT" dirty="0" err="1"/>
-              <a:t>Domain</a:t>
-            </a:r>
-            <a:r>
-              <a:rPr lang="pt-PT" dirty="0"/>
-              <a:t> </a:t>
-            </a:r>
-            <a:r>
-              <a:rPr lang="pt-PT" dirty="0" err="1"/>
-              <a:t>description</a:t>
-            </a:r>
-            <a:endParaRPr lang="pt-PT" dirty="0"/>
-          </a:p>
-        </p:txBody>
-      </p:sp>
-      <p:sp>
-        <p:nvSpPr>
-          <p:cNvPr id="3" name="Marcador de Posição de Conteúdo 2">
-            <a:extLst>
-              <a:ext uri="{FF2B5EF4-FFF2-40B4-BE49-F238E27FC236}">
-                <a16:creationId xmlns:a16="http://schemas.microsoft.com/office/drawing/2014/main" id="{FDB30777-F711-D17E-8B97-BB5AAC1ED375}"/>
-              </a:ext>
-            </a:extLst>
-          </p:cNvPr>
-          <p:cNvSpPr>
-            <a:spLocks noGrp="1"/>
-          </p:cNvSpPr>
-          <p:nvPr>
-            <p:ph idx="1"/>
-          </p:nvPr>
-        </p:nvSpPr>
-        <p:spPr>
-          <a:xfrm>
-            <a:off x="1615315" y="1846253"/>
-            <a:ext cx="3663767" cy="3101983"/>
-          </a:xfrm>
-        </p:spPr>
-        <p:txBody>
-          <a:bodyPr>
-            <a:normAutofit/>
-          </a:bodyPr>
-          <a:lstStyle/>
-          <a:p>
-            <a:r>
-              <a:rPr lang="en-US" sz="1800" dirty="0"/>
-              <a:t>For 10 seasons (years) data from players, teams, coaches, games, and several other metrics were gathered and arranged on this dataset.</a:t>
-            </a:r>
-          </a:p>
-          <a:p>
-            <a:r>
-              <a:rPr lang="pt-PT" sz="1800" dirty="0" err="1"/>
-              <a:t>Our</a:t>
-            </a:r>
-            <a:r>
-              <a:rPr lang="pt-PT" sz="1800" dirty="0"/>
-              <a:t> </a:t>
-            </a:r>
-            <a:r>
-              <a:rPr lang="pt-PT" sz="1800" dirty="0" err="1"/>
-              <a:t>main</a:t>
-            </a:r>
-            <a:r>
-              <a:rPr lang="pt-PT" sz="1800" dirty="0"/>
-              <a:t> </a:t>
-            </a:r>
-            <a:r>
-              <a:rPr lang="pt-PT" sz="1800" dirty="0" err="1"/>
-              <a:t>goal</a:t>
-            </a:r>
-            <a:r>
-              <a:rPr lang="pt-PT" sz="1800" dirty="0"/>
-              <a:t> </a:t>
-            </a:r>
-            <a:r>
-              <a:rPr lang="pt-PT" sz="1800" dirty="0" err="1"/>
-              <a:t>is</a:t>
-            </a:r>
-            <a:r>
-              <a:rPr lang="pt-PT" sz="1800" dirty="0"/>
-              <a:t>, </a:t>
-            </a:r>
-            <a:r>
-              <a:rPr lang="pt-PT" sz="1800" dirty="0" err="1"/>
-              <a:t>using</a:t>
-            </a:r>
-            <a:r>
-              <a:rPr lang="pt-PT" sz="1800" dirty="0"/>
-              <a:t> </a:t>
-            </a:r>
-            <a:r>
-              <a:rPr lang="pt-PT" sz="1800" dirty="0" err="1"/>
-              <a:t>this</a:t>
-            </a:r>
-            <a:r>
-              <a:rPr lang="pt-PT" sz="1800" dirty="0"/>
-              <a:t> data, to </a:t>
-            </a:r>
-            <a:r>
-              <a:rPr lang="pt-PT" sz="1800" dirty="0" err="1"/>
-              <a:t>develop</a:t>
-            </a:r>
-            <a:r>
-              <a:rPr lang="pt-PT" sz="1800" dirty="0"/>
-              <a:t> a </a:t>
-            </a:r>
-            <a:r>
-              <a:rPr lang="pt-PT" sz="1800" dirty="0" err="1"/>
-              <a:t>model</a:t>
-            </a:r>
-            <a:r>
-              <a:rPr lang="pt-PT" sz="1800" dirty="0"/>
-              <a:t> </a:t>
-            </a:r>
-            <a:r>
-              <a:rPr lang="pt-PT" sz="1800" dirty="0" err="1"/>
-              <a:t>that</a:t>
-            </a:r>
-            <a:r>
-              <a:rPr lang="pt-PT" sz="1800" dirty="0"/>
-              <a:t> can </a:t>
-            </a:r>
-            <a:r>
-              <a:rPr lang="pt-PT" sz="1800" dirty="0" err="1"/>
-              <a:t>predict</a:t>
-            </a:r>
-            <a:r>
-              <a:rPr lang="pt-PT" sz="1800" dirty="0"/>
-              <a:t> </a:t>
-            </a:r>
-            <a:r>
-              <a:rPr lang="pt-PT" sz="1800" dirty="0" err="1"/>
-              <a:t>which</a:t>
-            </a:r>
-            <a:r>
-              <a:rPr lang="pt-PT" sz="1800" dirty="0"/>
-              <a:t> teams </a:t>
-            </a:r>
-            <a:r>
-              <a:rPr lang="pt-PT" sz="1800" dirty="0" err="1"/>
-              <a:t>go</a:t>
-            </a:r>
-            <a:r>
-              <a:rPr lang="pt-PT" sz="1800" dirty="0"/>
-              <a:t> to </a:t>
-            </a:r>
-            <a:r>
-              <a:rPr lang="pt-PT" sz="1800" dirty="0" err="1"/>
-              <a:t>the</a:t>
-            </a:r>
-            <a:r>
-              <a:rPr lang="pt-PT" sz="1800" dirty="0"/>
-              <a:t> (8 </a:t>
-            </a:r>
-            <a:r>
-              <a:rPr lang="pt-PT" sz="1800" dirty="0" err="1"/>
-              <a:t>first</a:t>
-            </a:r>
-            <a:r>
-              <a:rPr lang="pt-PT" sz="1800" dirty="0"/>
-              <a:t> teams).</a:t>
-            </a:r>
-          </a:p>
-        </p:txBody>
-      </p:sp>
-      <p:pic>
-        <p:nvPicPr>
-          <p:cNvPr id="1030" name="Picture 6">
-            <a:extLst>
-              <a:ext uri="{FF2B5EF4-FFF2-40B4-BE49-F238E27FC236}">
-                <a16:creationId xmlns:a16="http://schemas.microsoft.com/office/drawing/2014/main" id="{735B204F-C64D-AA75-3628-5C77E50E081D}"/>
-              </a:ext>
-            </a:extLst>
-          </p:cNvPr>
-          <p:cNvPicPr>
-            <a:picLocks noChangeAspect="1" noChangeArrowheads="1"/>
-          </p:cNvPicPr>
-          <p:nvPr/>
-        </p:nvPicPr>
-        <p:blipFill>
-          <a:blip r:embed="rId2">
-            <a:extLst>
-              <a:ext uri="{28A0092B-C50C-407E-A947-70E740481C1C}">
-                <a14:useLocalDpi xmlns:a14="http://schemas.microsoft.com/office/drawing/2010/main" val="0"/>
-              </a:ext>
-            </a:extLst>
-          </a:blip>
-          <a:srcRect/>
-          <a:stretch>
-            <a:fillRect/>
-          </a:stretch>
-        </p:blipFill>
-        <p:spPr bwMode="auto">
-          <a:xfrm>
-            <a:off x="5948654" y="1203309"/>
-            <a:ext cx="5128363" cy="4451381"/>
-          </a:xfrm>
-          <a:prstGeom prst="rect">
-            <a:avLst/>
-          </a:prstGeom>
-          <a:noFill/>
-          <a:extLst>
-            <a:ext uri="{909E8E84-426E-40DD-AFC4-6F175D3DCCD1}">
-              <a14:hiddenFill xmlns:a14="http://schemas.microsoft.com/office/drawing/2010/main">
-                <a:solidFill>
-                  <a:srgbClr val="FFFFFF"/>
-                </a:solidFill>
-              </a14:hiddenFill>
-            </a:ext>
-          </a:extLst>
-        </p:spPr>
-      </p:pic>
-    </p:spTree>
-    <p:extLst>
-      <p:ext uri="{BB962C8B-B14F-4D97-AF65-F5344CB8AC3E}">
-        <p14:creationId xmlns:p14="http://schemas.microsoft.com/office/powerpoint/2010/main" val="1662472812"/>
-      </p:ext>
-    </p:extLst>
-  </p:cSld>
-  <p:clrMapOvr>
-    <a:masterClrMapping/>
-  </p:clrMapOvr>
-</p:sld>
-</file>
-
-<file path=ppt/slides/slide20.xml><?xml version="1.0" encoding="utf-8"?>
+<file path=ppt/slides/slide21.xml><?xml version="1.0" encoding="utf-8"?>
 <p:sld xmlns:a="http://schemas.openxmlformats.org/drawingml/2006/main" xmlns:r="http://schemas.openxmlformats.org/officeDocument/2006/relationships" xmlns:p="http://schemas.openxmlformats.org/presentationml/2006/main">
   <p:cSld>
     <p:spTree>
@@ -9277,7 +9361,7 @@
 </p:sld>
 </file>
 
-<file path=ppt/slides/slide21.xml><?xml version="1.0" encoding="utf-8"?>
+<file path=ppt/slides/slide22.xml><?xml version="1.0" encoding="utf-8"?>
 <p:sld xmlns:a="http://schemas.openxmlformats.org/drawingml/2006/main" xmlns:r="http://schemas.openxmlformats.org/officeDocument/2006/relationships" xmlns:p="http://schemas.openxmlformats.org/presentationml/2006/main">
   <p:cSld>
     <p:spTree>
@@ -9496,149 +9580,6 @@
 </p:sld>
 </file>
 
-<file path=ppt/slides/slide22.xml><?xml version="1.0" encoding="utf-8"?>
-<p:sld xmlns:a="http://schemas.openxmlformats.org/drawingml/2006/main" xmlns:r="http://schemas.openxmlformats.org/officeDocument/2006/relationships" xmlns:p="http://schemas.openxmlformats.org/presentationml/2006/main">
-  <p:cSld>
-    <p:spTree>
-      <p:nvGrpSpPr>
-        <p:cNvPr id="1" name=""/>
-        <p:cNvGrpSpPr/>
-        <p:nvPr/>
-      </p:nvGrpSpPr>
-      <p:grpSpPr>
-        <a:xfrm>
-          <a:off x="0" y="0"/>
-          <a:ext cx="0" cy="0"/>
-          <a:chOff x="0" y="0"/>
-          <a:chExt cx="0" cy="0"/>
-        </a:xfrm>
-      </p:grpSpPr>
-      <p:sp>
-        <p:nvSpPr>
-          <p:cNvPr id="2" name="Title 1">
-            <a:extLst>
-              <a:ext uri="{FF2B5EF4-FFF2-40B4-BE49-F238E27FC236}">
-                <a16:creationId xmlns:a16="http://schemas.microsoft.com/office/drawing/2014/main" id="{B8BD9D67-41A4-F6F3-0509-17A7799B4FEC}"/>
-              </a:ext>
-            </a:extLst>
-          </p:cNvPr>
-          <p:cNvSpPr>
-            <a:spLocks noGrp="1"/>
-          </p:cNvSpPr>
-          <p:nvPr>
-            <p:ph type="title"/>
-          </p:nvPr>
-        </p:nvSpPr>
-        <p:spPr/>
-        <p:txBody>
-          <a:bodyPr/>
-          <a:lstStyle/>
-          <a:p>
-            <a:r>
-              <a:rPr lang="en-US" dirty="0"/>
-              <a:t>SCALERS EXPLORED: ANALYSIS</a:t>
-            </a:r>
-          </a:p>
-        </p:txBody>
-      </p:sp>
-      <p:sp>
-        <p:nvSpPr>
-          <p:cNvPr id="3" name="Content Placeholder 2">
-            <a:extLst>
-              <a:ext uri="{FF2B5EF4-FFF2-40B4-BE49-F238E27FC236}">
-                <a16:creationId xmlns:a16="http://schemas.microsoft.com/office/drawing/2014/main" id="{0A964835-9983-B0C3-2536-7BBBAD168774}"/>
-              </a:ext>
-            </a:extLst>
-          </p:cNvPr>
-          <p:cNvSpPr>
-            <a:spLocks noGrp="1"/>
-          </p:cNvSpPr>
-          <p:nvPr>
-            <p:ph idx="1"/>
-          </p:nvPr>
-        </p:nvSpPr>
-        <p:spPr>
-          <a:xfrm>
-            <a:off x="1174040" y="1406106"/>
-            <a:ext cx="10178322" cy="5365629"/>
-          </a:xfrm>
-        </p:spPr>
-        <p:txBody>
-          <a:bodyPr>
-            <a:normAutofit fontScale="85000" lnSpcReduction="10000"/>
-          </a:bodyPr>
-          <a:lstStyle/>
-          <a:p>
-            <a:pPr algn="just"/>
-            <a:r>
-              <a:rPr lang="en-US" dirty="0"/>
-              <a:t>Linear Regression, Support Vector Regressor, and Ridge Regression consistently achieve high scores across all Scalers, with accuracy, recall, precision, and F1 score of 0.625 or higher.</a:t>
-            </a:r>
-          </a:p>
-          <a:p>
-            <a:pPr algn="just"/>
-            <a:endParaRPr lang="en-US" dirty="0"/>
-          </a:p>
-          <a:p>
-            <a:pPr algn="just"/>
-            <a:r>
-              <a:rPr lang="en-US" dirty="0"/>
-              <a:t>Random Forest Regressor and MLP Regressor exhibit less consistent performance, with scores varying depending on the Scaler used. However, the overall scores are lower than the results mentioned in the previous topic.</a:t>
-            </a:r>
-          </a:p>
-          <a:p>
-            <a:pPr algn="just"/>
-            <a:endParaRPr lang="en-US" dirty="0"/>
-          </a:p>
-          <a:p>
-            <a:pPr algn="just"/>
-            <a:r>
-              <a:rPr lang="en-US" dirty="0"/>
-              <a:t>Lasso Regression achieves the highest accuracy and F1 score among all regression models, indicating strong overall predictive capability. Furthermore, the best result was obtained without using a Scaler.</a:t>
-            </a:r>
-          </a:p>
-          <a:p>
-            <a:pPr algn="just"/>
-            <a:endParaRPr lang="en-US" dirty="0"/>
-          </a:p>
-          <a:p>
-            <a:pPr algn="just"/>
-            <a:r>
-              <a:rPr lang="en-US" dirty="0"/>
-              <a:t>Gradient Boosting Regressor demonstrates competitive performance with high accuracy, recall, precision, and F1 score under the Normalizer Scaler.</a:t>
-            </a:r>
-          </a:p>
-          <a:p>
-            <a:pPr algn="just"/>
-            <a:endParaRPr lang="en-US" dirty="0"/>
-          </a:p>
-          <a:p>
-            <a:pPr algn="just"/>
-            <a:r>
-              <a:rPr lang="en-US" dirty="0"/>
-              <a:t>As expected, Naïve Bayes did not perform well in this problem.  </a:t>
-            </a:r>
-            <a:r>
-              <a:rPr lang="en-US"/>
-              <a:t>We were counting on this outcome, because this algorithm assumes that all the features are completely independent, however, as displayed in the confusion matrices, the columns have some correlation among them, therefore invalidating the assumption made by Naïve Bayes and leading to poor performance.</a:t>
-            </a:r>
-            <a:endParaRPr lang="en-US" dirty="0"/>
-          </a:p>
-        </p:txBody>
-      </p:sp>
-    </p:spTree>
-    <p:extLst>
-      <p:ext uri="{BB962C8B-B14F-4D97-AF65-F5344CB8AC3E}">
-        <p14:creationId xmlns:p14="http://schemas.microsoft.com/office/powerpoint/2010/main" val="802536844"/>
-      </p:ext>
-    </p:extLst>
-  </p:cSld>
-  <p:clrMapOvr>
-    <a:masterClrMapping/>
-  </p:clrMapOvr>
-</p:sld>
-</file>
-
 <file path=ppt/slides/slide23.xml><?xml version="1.0" encoding="utf-8"?>
 <p:sld xmlns:a="http://schemas.openxmlformats.org/drawingml/2006/main" xmlns:r="http://schemas.openxmlformats.org/officeDocument/2006/relationships" xmlns:p="http://schemas.openxmlformats.org/presentationml/2006/main">
   <p:cSld>
@@ -9708,6 +9649,149 @@
         </p:spPr>
         <p:txBody>
           <a:bodyPr>
+            <a:normAutofit fontScale="85000" lnSpcReduction="10000"/>
+          </a:bodyPr>
+          <a:lstStyle/>
+          <a:p>
+            <a:pPr algn="just"/>
+            <a:r>
+              <a:rPr lang="en-US" dirty="0"/>
+              <a:t>Linear Regression, Support Vector Regressor, and Ridge Regression consistently achieve high scores across all Scalers, with accuracy, recall, precision, and F1 score of 0.625 or higher.</a:t>
+            </a:r>
+          </a:p>
+          <a:p>
+            <a:pPr algn="just"/>
+            <a:endParaRPr lang="en-US" dirty="0"/>
+          </a:p>
+          <a:p>
+            <a:pPr algn="just"/>
+            <a:r>
+              <a:rPr lang="en-US" dirty="0"/>
+              <a:t>Random Forest Regressor and MLP Regressor exhibit less consistent performance, with scores varying depending on the Scaler used. However, the overall scores are lower than the results mentioned in the previous topic.</a:t>
+            </a:r>
+          </a:p>
+          <a:p>
+            <a:pPr algn="just"/>
+            <a:endParaRPr lang="en-US" dirty="0"/>
+          </a:p>
+          <a:p>
+            <a:pPr algn="just"/>
+            <a:r>
+              <a:rPr lang="en-US" dirty="0"/>
+              <a:t>Lasso Regression achieves the highest accuracy and F1 score among all regression models, indicating strong overall predictive capability. Furthermore, the best result was obtained without using a Scaler.</a:t>
+            </a:r>
+          </a:p>
+          <a:p>
+            <a:pPr algn="just"/>
+            <a:endParaRPr lang="en-US" dirty="0"/>
+          </a:p>
+          <a:p>
+            <a:pPr algn="just"/>
+            <a:r>
+              <a:rPr lang="en-US" dirty="0"/>
+              <a:t>Gradient Boosting Regressor demonstrates competitive performance with high accuracy, recall, precision, and F1 score under the Normalizer Scaler.</a:t>
+            </a:r>
+          </a:p>
+          <a:p>
+            <a:pPr algn="just"/>
+            <a:endParaRPr lang="en-US" dirty="0"/>
+          </a:p>
+          <a:p>
+            <a:pPr algn="just"/>
+            <a:r>
+              <a:rPr lang="en-US" dirty="0"/>
+              <a:t>As expected, Naïve Bayes did not perform well in this problem.  </a:t>
+            </a:r>
+            <a:r>
+              <a:rPr lang="en-US"/>
+              <a:t>We were counting on this outcome, because this algorithm assumes that all the features are completely independent, however, as displayed in the confusion matrices, the columns have some correlation among them, therefore invalidating the assumption made by Naïve Bayes and leading to poor performance.</a:t>
+            </a:r>
+            <a:endParaRPr lang="en-US" dirty="0"/>
+          </a:p>
+        </p:txBody>
+      </p:sp>
+    </p:spTree>
+    <p:extLst>
+      <p:ext uri="{BB962C8B-B14F-4D97-AF65-F5344CB8AC3E}">
+        <p14:creationId xmlns:p14="http://schemas.microsoft.com/office/powerpoint/2010/main" val="802536844"/>
+      </p:ext>
+    </p:extLst>
+  </p:cSld>
+  <p:clrMapOvr>
+    <a:masterClrMapping/>
+  </p:clrMapOvr>
+</p:sld>
+</file>
+
+<file path=ppt/slides/slide24.xml><?xml version="1.0" encoding="utf-8"?>
+<p:sld xmlns:a="http://schemas.openxmlformats.org/drawingml/2006/main" xmlns:r="http://schemas.openxmlformats.org/officeDocument/2006/relationships" xmlns:p="http://schemas.openxmlformats.org/presentationml/2006/main">
+  <p:cSld>
+    <p:spTree>
+      <p:nvGrpSpPr>
+        <p:cNvPr id="1" name=""/>
+        <p:cNvGrpSpPr/>
+        <p:nvPr/>
+      </p:nvGrpSpPr>
+      <p:grpSpPr>
+        <a:xfrm>
+          <a:off x="0" y="0"/>
+          <a:ext cx="0" cy="0"/>
+          <a:chOff x="0" y="0"/>
+          <a:chExt cx="0" cy="0"/>
+        </a:xfrm>
+      </p:grpSpPr>
+      <p:sp>
+        <p:nvSpPr>
+          <p:cNvPr id="2" name="Title 1">
+            <a:extLst>
+              <a:ext uri="{FF2B5EF4-FFF2-40B4-BE49-F238E27FC236}">
+                <a16:creationId xmlns:a16="http://schemas.microsoft.com/office/drawing/2014/main" id="{B8BD9D67-41A4-F6F3-0509-17A7799B4FEC}"/>
+              </a:ext>
+            </a:extLst>
+          </p:cNvPr>
+          <p:cNvSpPr>
+            <a:spLocks noGrp="1"/>
+          </p:cNvSpPr>
+          <p:nvPr>
+            <p:ph type="title"/>
+          </p:nvPr>
+        </p:nvSpPr>
+        <p:spPr/>
+        <p:txBody>
+          <a:bodyPr/>
+          <a:lstStyle/>
+          <a:p>
+            <a:r>
+              <a:rPr lang="en-US" dirty="0"/>
+              <a:t>SCALERS EXPLORED: ANALYSIS</a:t>
+            </a:r>
+          </a:p>
+        </p:txBody>
+      </p:sp>
+      <p:sp>
+        <p:nvSpPr>
+          <p:cNvPr id="3" name="Content Placeholder 2">
+            <a:extLst>
+              <a:ext uri="{FF2B5EF4-FFF2-40B4-BE49-F238E27FC236}">
+                <a16:creationId xmlns:a16="http://schemas.microsoft.com/office/drawing/2014/main" id="{0A964835-9983-B0C3-2536-7BBBAD168774}"/>
+              </a:ext>
+            </a:extLst>
+          </p:cNvPr>
+          <p:cNvSpPr>
+            <a:spLocks noGrp="1"/>
+          </p:cNvSpPr>
+          <p:nvPr>
+            <p:ph idx="1"/>
+          </p:nvPr>
+        </p:nvSpPr>
+        <p:spPr>
+          <a:xfrm>
+            <a:off x="1174040" y="1406106"/>
+            <a:ext cx="10178322" cy="5365629"/>
+          </a:xfrm>
+        </p:spPr>
+        <p:txBody>
+          <a:bodyPr>
             <a:normAutofit fontScale="77500" lnSpcReduction="20000"/>
           </a:bodyPr>
           <a:lstStyle/>
@@ -9788,7 +9872,7 @@
 </p:sld>
 </file>
 
-<file path=ppt/slides/slide24.xml><?xml version="1.0" encoding="utf-8"?>
+<file path=ppt/slides/slide25.xml><?xml version="1.0" encoding="utf-8"?>
 <p:sld xmlns:a="http://schemas.openxmlformats.org/drawingml/2006/main" xmlns:r="http://schemas.openxmlformats.org/officeDocument/2006/relationships" xmlns:p="http://schemas.openxmlformats.org/presentationml/2006/main">
   <p:cSld>
     <p:spTree>
@@ -9862,12 +9946,788 @@
             <p:ph idx="1"/>
           </p:nvPr>
         </p:nvSpPr>
-        <p:spPr/>
+        <p:spPr>
+          <a:xfrm>
+            <a:off x="1251678" y="2286001"/>
+            <a:ext cx="10178322" cy="4284920"/>
+          </a:xfrm>
+        </p:spPr>
         <p:txBody>
-          <a:bodyPr/>
+          <a:bodyPr>
+            <a:normAutofit lnSpcReduction="10000"/>
+          </a:bodyPr>
           <a:lstStyle/>
           <a:p>
-            <a:endParaRPr lang="pt-PT"/>
+            <a:r>
+              <a:rPr lang="pt-PT" dirty="0" err="1"/>
+              <a:t>Using</a:t>
+            </a:r>
+            <a:r>
+              <a:rPr lang="pt-PT" dirty="0"/>
+              <a:t> </a:t>
+            </a:r>
+            <a:r>
+              <a:rPr lang="pt-PT" dirty="0" err="1"/>
+              <a:t>the</a:t>
+            </a:r>
+            <a:r>
+              <a:rPr lang="pt-PT" dirty="0"/>
+              <a:t> </a:t>
+            </a:r>
+            <a:r>
+              <a:rPr lang="pt-PT" dirty="0" err="1"/>
+              <a:t>series_post</a:t>
+            </a:r>
+            <a:r>
+              <a:rPr lang="pt-PT" dirty="0"/>
+              <a:t> </a:t>
+            </a:r>
+            <a:r>
+              <a:rPr lang="pt-PT" dirty="0" err="1"/>
+              <a:t>dataframe</a:t>
+            </a:r>
+            <a:r>
+              <a:rPr lang="pt-PT" dirty="0"/>
+              <a:t> </a:t>
+            </a:r>
+            <a:r>
+              <a:rPr lang="pt-PT" dirty="0" err="1"/>
+              <a:t>we</a:t>
+            </a:r>
+            <a:r>
+              <a:rPr lang="pt-PT" dirty="0"/>
+              <a:t> </a:t>
+            </a:r>
+            <a:r>
+              <a:rPr lang="pt-PT" dirty="0" err="1"/>
+              <a:t>were</a:t>
+            </a:r>
+            <a:r>
+              <a:rPr lang="pt-PT" dirty="0"/>
+              <a:t> </a:t>
+            </a:r>
+            <a:r>
+              <a:rPr lang="pt-PT" dirty="0" err="1"/>
+              <a:t>able</a:t>
+            </a:r>
+            <a:r>
+              <a:rPr lang="pt-PT" dirty="0"/>
+              <a:t> to </a:t>
+            </a:r>
+            <a:r>
+              <a:rPr lang="pt-PT" dirty="0" err="1"/>
+              <a:t>create</a:t>
+            </a:r>
+            <a:r>
+              <a:rPr lang="pt-PT" dirty="0"/>
+              <a:t> na </a:t>
+            </a:r>
+            <a:r>
+              <a:rPr lang="pt-PT" dirty="0" err="1"/>
+              <a:t>alternative</a:t>
+            </a:r>
+            <a:r>
+              <a:rPr lang="pt-PT" dirty="0"/>
+              <a:t> </a:t>
+            </a:r>
+            <a:r>
+              <a:rPr lang="pt-PT" dirty="0" err="1"/>
+              <a:t>method</a:t>
+            </a:r>
+            <a:r>
+              <a:rPr lang="pt-PT" dirty="0"/>
+              <a:t> </a:t>
+            </a:r>
+            <a:r>
+              <a:rPr lang="pt-PT" dirty="0" err="1"/>
+              <a:t>of</a:t>
+            </a:r>
+            <a:r>
+              <a:rPr lang="pt-PT" dirty="0"/>
+              <a:t> </a:t>
+            </a:r>
+            <a:r>
+              <a:rPr lang="pt-PT" dirty="0" err="1"/>
+              <a:t>determining</a:t>
+            </a:r>
+            <a:r>
+              <a:rPr lang="pt-PT" dirty="0"/>
+              <a:t> </a:t>
+            </a:r>
+            <a:r>
+              <a:rPr lang="pt-PT" dirty="0" err="1"/>
+              <a:t>the</a:t>
+            </a:r>
+            <a:r>
+              <a:rPr lang="pt-PT" dirty="0"/>
+              <a:t> teams </a:t>
+            </a:r>
+            <a:r>
+              <a:rPr lang="pt-PT" dirty="0" err="1"/>
+              <a:t>going</a:t>
+            </a:r>
+            <a:r>
+              <a:rPr lang="pt-PT" dirty="0"/>
+              <a:t> to </a:t>
+            </a:r>
+            <a:r>
+              <a:rPr lang="pt-PT" dirty="0" err="1"/>
+              <a:t>the</a:t>
+            </a:r>
+            <a:r>
+              <a:rPr lang="pt-PT" dirty="0"/>
+              <a:t> </a:t>
+            </a:r>
+            <a:r>
+              <a:rPr lang="pt-PT" dirty="0" err="1"/>
+              <a:t>playoffs</a:t>
+            </a:r>
+            <a:r>
+              <a:rPr lang="pt-PT" dirty="0"/>
+              <a:t>.</a:t>
+            </a:r>
+          </a:p>
+          <a:p>
+            <a:r>
+              <a:rPr lang="pt-PT" dirty="0" err="1"/>
+              <a:t>By</a:t>
+            </a:r>
+            <a:r>
+              <a:rPr lang="pt-PT" dirty="0"/>
+              <a:t> </a:t>
+            </a:r>
+            <a:r>
+              <a:rPr lang="pt-PT" dirty="0" err="1"/>
+              <a:t>using</a:t>
+            </a:r>
+            <a:r>
+              <a:rPr lang="pt-PT" dirty="0"/>
+              <a:t> </a:t>
+            </a:r>
+            <a:r>
+              <a:rPr lang="pt-PT" dirty="0" err="1"/>
+              <a:t>the</a:t>
+            </a:r>
+            <a:r>
+              <a:rPr lang="pt-PT" dirty="0"/>
+              <a:t> individual games in </a:t>
+            </a:r>
+            <a:r>
+              <a:rPr lang="pt-PT" dirty="0" err="1"/>
+              <a:t>the</a:t>
+            </a:r>
+            <a:r>
+              <a:rPr lang="pt-PT" dirty="0"/>
+              <a:t> </a:t>
+            </a:r>
+            <a:r>
+              <a:rPr lang="pt-PT" dirty="0" err="1"/>
+              <a:t>series_post</a:t>
+            </a:r>
+            <a:r>
+              <a:rPr lang="pt-PT" dirty="0"/>
+              <a:t> </a:t>
+            </a:r>
+            <a:r>
+              <a:rPr lang="pt-PT" dirty="0" err="1"/>
+              <a:t>we</a:t>
+            </a:r>
+            <a:r>
+              <a:rPr lang="pt-PT" dirty="0"/>
+              <a:t> </a:t>
+            </a:r>
+            <a:r>
+              <a:rPr lang="pt-PT" dirty="0" err="1"/>
+              <a:t>were</a:t>
+            </a:r>
+            <a:r>
+              <a:rPr lang="pt-PT" dirty="0"/>
+              <a:t> </a:t>
+            </a:r>
+            <a:r>
+              <a:rPr lang="pt-PT" dirty="0" err="1"/>
+              <a:t>able</a:t>
+            </a:r>
+            <a:r>
+              <a:rPr lang="pt-PT" dirty="0"/>
+              <a:t> to </a:t>
+            </a:r>
+            <a:r>
+              <a:rPr lang="pt-PT" dirty="0" err="1"/>
+              <a:t>create</a:t>
+            </a:r>
+            <a:r>
+              <a:rPr lang="pt-PT" dirty="0"/>
+              <a:t> </a:t>
+            </a:r>
+            <a:r>
+              <a:rPr lang="pt-PT" dirty="0" err="1"/>
+              <a:t>model</a:t>
+            </a:r>
+            <a:r>
+              <a:rPr lang="pt-PT" dirty="0"/>
+              <a:t> </a:t>
+            </a:r>
+            <a:r>
+              <a:rPr lang="pt-PT" dirty="0" err="1"/>
+              <a:t>capable</a:t>
+            </a:r>
+            <a:r>
+              <a:rPr lang="pt-PT" dirty="0"/>
+              <a:t> </a:t>
+            </a:r>
+            <a:r>
+              <a:rPr lang="pt-PT" dirty="0" err="1"/>
+              <a:t>of</a:t>
+            </a:r>
+            <a:r>
+              <a:rPr lang="pt-PT" dirty="0"/>
+              <a:t> </a:t>
+            </a:r>
+            <a:r>
+              <a:rPr lang="pt-PT" dirty="0" err="1"/>
+              <a:t>predicting</a:t>
+            </a:r>
+            <a:r>
+              <a:rPr lang="pt-PT" dirty="0"/>
+              <a:t> </a:t>
+            </a:r>
+            <a:r>
+              <a:rPr lang="pt-PT" dirty="0" err="1"/>
+              <a:t>the</a:t>
+            </a:r>
+            <a:r>
+              <a:rPr lang="pt-PT" dirty="0"/>
+              <a:t> </a:t>
+            </a:r>
+            <a:r>
+              <a:rPr lang="pt-PT" dirty="0" err="1"/>
+              <a:t>odds</a:t>
+            </a:r>
+            <a:r>
+              <a:rPr lang="pt-PT" dirty="0"/>
+              <a:t> </a:t>
+            </a:r>
+            <a:r>
+              <a:rPr lang="pt-PT" dirty="0" err="1"/>
+              <a:t>of</a:t>
+            </a:r>
+            <a:r>
+              <a:rPr lang="pt-PT" dirty="0"/>
+              <a:t> a particular team </a:t>
+            </a:r>
+            <a:r>
+              <a:rPr lang="pt-PT" dirty="0" err="1"/>
+              <a:t>winning</a:t>
+            </a:r>
+            <a:r>
+              <a:rPr lang="pt-PT" dirty="0"/>
+              <a:t>.</a:t>
+            </a:r>
+          </a:p>
+          <a:p>
+            <a:pPr lvl="1"/>
+            <a:r>
+              <a:rPr lang="pt-PT" dirty="0"/>
+              <a:t>Data </a:t>
+            </a:r>
+            <a:r>
+              <a:rPr lang="pt-PT" dirty="0" err="1"/>
+              <a:t>passed</a:t>
+            </a:r>
+            <a:r>
+              <a:rPr lang="pt-PT" dirty="0"/>
+              <a:t> to </a:t>
+            </a:r>
+            <a:r>
+              <a:rPr lang="pt-PT" dirty="0" err="1"/>
+              <a:t>the</a:t>
+            </a:r>
+            <a:r>
+              <a:rPr lang="pt-PT" dirty="0"/>
+              <a:t> </a:t>
+            </a:r>
+            <a:r>
+              <a:rPr lang="pt-PT" dirty="0" err="1"/>
+              <a:t>model</a:t>
+            </a:r>
+            <a:r>
+              <a:rPr lang="pt-PT" dirty="0"/>
+              <a:t>: </a:t>
+            </a:r>
+          </a:p>
+          <a:p>
+            <a:pPr lvl="2"/>
+            <a:r>
+              <a:rPr lang="pt-PT" dirty="0" err="1"/>
+              <a:t>Lagged</a:t>
+            </a:r>
+            <a:r>
+              <a:rPr lang="pt-PT" dirty="0"/>
+              <a:t>: </a:t>
+            </a:r>
+            <a:r>
+              <a:rPr lang="en-GB" dirty="0">
+                <a:solidFill>
+                  <a:srgbClr val="6AAB73"/>
+                </a:solidFill>
+                <a:effectLst/>
+              </a:rPr>
+              <a:t>'</a:t>
+            </a:r>
+            <a:r>
+              <a:rPr lang="en-GB" dirty="0" err="1">
+                <a:solidFill>
+                  <a:srgbClr val="6AAB73"/>
+                </a:solidFill>
+                <a:effectLst/>
+              </a:rPr>
+              <a:t>RealTeamScore</a:t>
+            </a:r>
+            <a:r>
+              <a:rPr lang="en-GB" dirty="0">
+                <a:solidFill>
+                  <a:srgbClr val="6AAB73"/>
+                </a:solidFill>
+                <a:effectLst/>
+              </a:rPr>
+              <a:t>'</a:t>
+            </a:r>
+            <a:r>
+              <a:rPr lang="en-GB" dirty="0">
+                <a:solidFill>
+                  <a:srgbClr val="BCBEC4"/>
+                </a:solidFill>
+                <a:effectLst/>
+              </a:rPr>
+              <a:t>, </a:t>
+            </a:r>
+            <a:r>
+              <a:rPr lang="en-GB" dirty="0">
+                <a:solidFill>
+                  <a:srgbClr val="6AAB73"/>
+                </a:solidFill>
+                <a:effectLst/>
+              </a:rPr>
+              <a:t>'</a:t>
+            </a:r>
+            <a:r>
+              <a:rPr lang="en-GB" dirty="0" err="1">
+                <a:solidFill>
+                  <a:srgbClr val="6AAB73"/>
+                </a:solidFill>
+                <a:effectLst/>
+              </a:rPr>
+              <a:t>defensive_performance</a:t>
+            </a:r>
+            <a:r>
+              <a:rPr lang="en-GB" dirty="0">
+                <a:solidFill>
+                  <a:srgbClr val="6AAB73"/>
+                </a:solidFill>
+                <a:effectLst/>
+              </a:rPr>
+              <a:t>'</a:t>
+            </a:r>
+            <a:r>
+              <a:rPr lang="en-GB" dirty="0">
+                <a:solidFill>
+                  <a:srgbClr val="BCBEC4"/>
+                </a:solidFill>
+                <a:effectLst/>
+              </a:rPr>
+              <a:t>, </a:t>
+            </a:r>
+            <a:r>
+              <a:rPr lang="en-GB" dirty="0">
+                <a:solidFill>
+                  <a:srgbClr val="6AAB73"/>
+                </a:solidFill>
+                <a:effectLst/>
+              </a:rPr>
+              <a:t>'</a:t>
+            </a:r>
+            <a:r>
+              <a:rPr lang="en-GB" dirty="0" err="1">
+                <a:solidFill>
+                  <a:srgbClr val="6AAB73"/>
+                </a:solidFill>
+                <a:effectLst/>
+              </a:rPr>
+              <a:t>offensive_performance</a:t>
+            </a:r>
+            <a:r>
+              <a:rPr lang="en-GB" dirty="0">
+                <a:solidFill>
+                  <a:srgbClr val="6AAB73"/>
+                </a:solidFill>
+                <a:effectLst/>
+              </a:rPr>
+              <a:t>'</a:t>
+            </a:r>
+            <a:r>
+              <a:rPr lang="en-GB" dirty="0">
+                <a:solidFill>
+                  <a:srgbClr val="BCBEC4"/>
+                </a:solidFill>
+                <a:effectLst/>
+              </a:rPr>
+              <a:t>, </a:t>
+            </a:r>
+            <a:r>
+              <a:rPr lang="en-GB" dirty="0">
+                <a:solidFill>
+                  <a:srgbClr val="6AAB73"/>
+                </a:solidFill>
+                <a:effectLst/>
+              </a:rPr>
+              <a:t>'</a:t>
+            </a:r>
+            <a:r>
+              <a:rPr lang="en-GB" dirty="0" err="1">
+                <a:solidFill>
+                  <a:srgbClr val="6AAB73"/>
+                </a:solidFill>
+                <a:effectLst/>
+              </a:rPr>
+              <a:t>gamesWLRatio</a:t>
+            </a:r>
+            <a:r>
+              <a:rPr lang="en-GB" dirty="0">
+                <a:solidFill>
+                  <a:srgbClr val="6AAB73"/>
+                </a:solidFill>
+                <a:effectLst/>
+              </a:rPr>
+              <a:t>'</a:t>
+            </a:r>
+            <a:r>
+              <a:rPr lang="en-GB" dirty="0">
+                <a:solidFill>
+                  <a:srgbClr val="BCBEC4"/>
+                </a:solidFill>
+                <a:effectLst/>
+              </a:rPr>
+              <a:t>,</a:t>
+            </a:r>
+            <a:br>
+              <a:rPr lang="en-GB" dirty="0">
+                <a:solidFill>
+                  <a:srgbClr val="BCBEC4"/>
+                </a:solidFill>
+                <a:effectLst/>
+              </a:rPr>
+            </a:br>
+            <a:r>
+              <a:rPr lang="en-GB" dirty="0">
+                <a:solidFill>
+                  <a:srgbClr val="BCBEC4"/>
+                </a:solidFill>
+                <a:effectLst/>
+              </a:rPr>
+              <a:t>                         </a:t>
+            </a:r>
+            <a:r>
+              <a:rPr lang="en-GB" dirty="0">
+                <a:solidFill>
+                  <a:srgbClr val="6AAB73"/>
+                </a:solidFill>
+                <a:effectLst/>
+              </a:rPr>
+              <a:t>'</a:t>
+            </a:r>
+            <a:r>
+              <a:rPr lang="en-GB" dirty="0" err="1">
+                <a:solidFill>
+                  <a:srgbClr val="6AAB73"/>
+                </a:solidFill>
+                <a:effectLst/>
+              </a:rPr>
+              <a:t>homeWLRatio</a:t>
+            </a:r>
+            <a:r>
+              <a:rPr lang="en-GB" dirty="0">
+                <a:solidFill>
+                  <a:srgbClr val="6AAB73"/>
+                </a:solidFill>
+                <a:effectLst/>
+              </a:rPr>
+              <a:t>'</a:t>
+            </a:r>
+            <a:r>
+              <a:rPr lang="en-GB" dirty="0">
+                <a:solidFill>
+                  <a:srgbClr val="BCBEC4"/>
+                </a:solidFill>
+                <a:effectLst/>
+              </a:rPr>
+              <a:t>, </a:t>
+            </a:r>
+            <a:r>
+              <a:rPr lang="en-GB" dirty="0">
+                <a:solidFill>
+                  <a:srgbClr val="6AAB73"/>
+                </a:solidFill>
+                <a:effectLst/>
+              </a:rPr>
+              <a:t>'</a:t>
+            </a:r>
+            <a:r>
+              <a:rPr lang="en-GB" dirty="0" err="1">
+                <a:solidFill>
+                  <a:srgbClr val="6AAB73"/>
+                </a:solidFill>
+                <a:effectLst/>
+              </a:rPr>
+              <a:t>awayWLRatio</a:t>
+            </a:r>
+            <a:r>
+              <a:rPr lang="en-GB" dirty="0">
+                <a:solidFill>
+                  <a:srgbClr val="6AAB73"/>
+                </a:solidFill>
+                <a:effectLst/>
+              </a:rPr>
+              <a:t>'</a:t>
+            </a:r>
+            <a:r>
+              <a:rPr lang="en-GB" dirty="0">
+                <a:solidFill>
+                  <a:srgbClr val="BCBEC4"/>
+                </a:solidFill>
+                <a:effectLst/>
+              </a:rPr>
+              <a:t>, </a:t>
+            </a:r>
+            <a:r>
+              <a:rPr lang="en-GB" dirty="0">
+                <a:solidFill>
+                  <a:srgbClr val="6AAB73"/>
+                </a:solidFill>
+                <a:effectLst/>
+              </a:rPr>
+              <a:t>'</a:t>
+            </a:r>
+            <a:r>
+              <a:rPr lang="en-GB" dirty="0" err="1">
+                <a:solidFill>
+                  <a:srgbClr val="6AAB73"/>
+                </a:solidFill>
+                <a:effectLst/>
+              </a:rPr>
+              <a:t>confWLRatio</a:t>
+            </a:r>
+            <a:r>
+              <a:rPr lang="en-GB" dirty="0">
+                <a:solidFill>
+                  <a:srgbClr val="6AAB73"/>
+                </a:solidFill>
+                <a:effectLst/>
+              </a:rPr>
+              <a:t>'</a:t>
+            </a:r>
+            <a:r>
+              <a:rPr lang="en-GB" dirty="0">
+                <a:solidFill>
+                  <a:srgbClr val="BCBEC4"/>
+                </a:solidFill>
+                <a:effectLst/>
+              </a:rPr>
+              <a:t>, </a:t>
+            </a:r>
+            <a:r>
+              <a:rPr lang="en-GB" dirty="0">
+                <a:solidFill>
+                  <a:srgbClr val="6AAB73"/>
+                </a:solidFill>
+                <a:effectLst/>
+              </a:rPr>
+              <a:t>'progress'</a:t>
+            </a:r>
+            <a:r>
+              <a:rPr lang="en-GB" dirty="0">
+                <a:solidFill>
+                  <a:srgbClr val="BCBEC4"/>
+                </a:solidFill>
+                <a:effectLst/>
+              </a:rPr>
+              <a:t>, </a:t>
+            </a:r>
+            <a:r>
+              <a:rPr lang="en-GB" dirty="0">
+                <a:solidFill>
+                  <a:srgbClr val="6AAB73"/>
+                </a:solidFill>
+                <a:effectLst/>
+              </a:rPr>
+              <a:t>'playoff’</a:t>
+            </a:r>
+          </a:p>
+          <a:p>
+            <a:pPr lvl="2"/>
+            <a:r>
+              <a:rPr lang="en-GB" dirty="0"/>
+              <a:t>Current: </a:t>
+            </a:r>
+            <a:r>
+              <a:rPr lang="en-GB" dirty="0">
+                <a:solidFill>
+                  <a:srgbClr val="6AAB73"/>
+                </a:solidFill>
+                <a:effectLst/>
+              </a:rPr>
+              <a:t>‘</a:t>
+            </a:r>
+            <a:r>
+              <a:rPr lang="en-GB" dirty="0" err="1">
+                <a:solidFill>
+                  <a:srgbClr val="6AAB73"/>
+                </a:solidFill>
+                <a:effectLst/>
+              </a:rPr>
+              <a:t>PredictedTeamScore</a:t>
+            </a:r>
+            <a:r>
+              <a:rPr lang="en-GB" dirty="0">
+                <a:solidFill>
+                  <a:srgbClr val="6AAB73"/>
+                </a:solidFill>
+                <a:effectLst/>
+              </a:rPr>
+              <a:t>’</a:t>
+            </a:r>
+          </a:p>
+          <a:p>
+            <a:r>
+              <a:rPr lang="pt-PT" dirty="0" err="1"/>
+              <a:t>With</a:t>
+            </a:r>
+            <a:r>
+              <a:rPr lang="pt-PT" dirty="0"/>
+              <a:t> </a:t>
+            </a:r>
+            <a:r>
+              <a:rPr lang="pt-PT" dirty="0" err="1"/>
+              <a:t>this</a:t>
+            </a:r>
+            <a:r>
+              <a:rPr lang="pt-PT" dirty="0"/>
+              <a:t> </a:t>
+            </a:r>
+            <a:r>
+              <a:rPr lang="pt-PT" dirty="0" err="1"/>
+              <a:t>model</a:t>
+            </a:r>
+            <a:r>
+              <a:rPr lang="pt-PT" dirty="0"/>
+              <a:t>, </a:t>
+            </a:r>
+            <a:r>
+              <a:rPr lang="pt-PT" dirty="0" err="1"/>
+              <a:t>we</a:t>
+            </a:r>
+            <a:r>
+              <a:rPr lang="pt-PT" dirty="0"/>
+              <a:t> </a:t>
+            </a:r>
+            <a:r>
+              <a:rPr lang="pt-PT" dirty="0" err="1"/>
+              <a:t>then</a:t>
+            </a:r>
+            <a:r>
+              <a:rPr lang="pt-PT" dirty="0"/>
+              <a:t> </a:t>
+            </a:r>
+            <a:r>
+              <a:rPr lang="pt-PT" dirty="0" err="1"/>
+              <a:t>made</a:t>
+            </a:r>
+            <a:r>
+              <a:rPr lang="pt-PT" dirty="0"/>
+              <a:t> </a:t>
+            </a:r>
+            <a:r>
+              <a:rPr lang="pt-PT" dirty="0" err="1"/>
+              <a:t>ran</a:t>
+            </a:r>
+            <a:r>
+              <a:rPr lang="pt-PT" dirty="0"/>
+              <a:t> </a:t>
+            </a:r>
+            <a:r>
+              <a:rPr lang="pt-PT" dirty="0" err="1"/>
+              <a:t>simulations</a:t>
+            </a:r>
+            <a:r>
+              <a:rPr lang="pt-PT" dirty="0"/>
+              <a:t> </a:t>
+            </a:r>
+            <a:r>
+              <a:rPr lang="pt-PT" dirty="0" err="1"/>
+              <a:t>of</a:t>
+            </a:r>
+            <a:r>
+              <a:rPr lang="pt-PT" dirty="0"/>
+              <a:t> </a:t>
+            </a:r>
+            <a:r>
+              <a:rPr lang="pt-PT" dirty="0" err="1"/>
+              <a:t>the</a:t>
+            </a:r>
+            <a:r>
+              <a:rPr lang="pt-PT" dirty="0"/>
+              <a:t> games for </a:t>
+            </a:r>
+            <a:r>
+              <a:rPr lang="pt-PT" dirty="0" err="1"/>
+              <a:t>the</a:t>
+            </a:r>
+            <a:r>
+              <a:rPr lang="pt-PT" dirty="0"/>
+              <a:t> standard-</a:t>
+            </a:r>
+            <a:r>
+              <a:rPr lang="pt-PT" dirty="0" err="1"/>
+              <a:t>season</a:t>
+            </a:r>
+            <a:r>
+              <a:rPr lang="pt-PT" dirty="0"/>
+              <a:t> in </a:t>
+            </a:r>
+            <a:r>
+              <a:rPr lang="pt-PT" dirty="0" err="1"/>
+              <a:t>order</a:t>
+            </a:r>
+            <a:r>
+              <a:rPr lang="pt-PT" dirty="0"/>
+              <a:t> to determine </a:t>
+            </a:r>
+            <a:r>
+              <a:rPr lang="pt-PT" dirty="0" err="1"/>
+              <a:t>the</a:t>
+            </a:r>
+            <a:r>
+              <a:rPr lang="pt-PT" dirty="0"/>
+              <a:t> </a:t>
+            </a:r>
+            <a:r>
+              <a:rPr lang="pt-PT" dirty="0" err="1"/>
+              <a:t>best</a:t>
+            </a:r>
+            <a:r>
+              <a:rPr lang="pt-PT" dirty="0"/>
+              <a:t> teams.</a:t>
+            </a:r>
+          </a:p>
+          <a:p>
+            <a:r>
+              <a:rPr lang="en-GB" dirty="0"/>
+              <a:t>Right from the start, we had doubts about this model due to the lack of individual game data (only 70 games to train and test on)</a:t>
+            </a:r>
+          </a:p>
+          <a:p>
+            <a:pPr lvl="1"/>
+            <a:endParaRPr lang="pt-PT" dirty="0"/>
           </a:p>
         </p:txBody>
       </p:sp>
@@ -12775,10 +13635,10 @@
       </p:grpSpPr>
       <p:sp>
         <p:nvSpPr>
-          <p:cNvPr id="2" name="Título 1">
+          <p:cNvPr id="2" name="Title 1">
             <a:extLst>
               <a:ext uri="{FF2B5EF4-FFF2-40B4-BE49-F238E27FC236}">
-                <a16:creationId xmlns:a16="http://schemas.microsoft.com/office/drawing/2014/main" id="{0F8D8DBC-06AA-2C5A-0A94-C370D62F102C}"/>
+                <a16:creationId xmlns:a16="http://schemas.microsoft.com/office/drawing/2014/main" id="{EFAF7086-DB07-583F-CBC4-4D88E0EC545D}"/>
               </a:ext>
             </a:extLst>
           </p:cNvPr>
@@ -12795,18 +13655,18 @@
           <a:lstStyle/>
           <a:p>
             <a:r>
-              <a:rPr lang="pt-PT" dirty="0"/>
-              <a:t>Experimental Setup</a:t>
+              <a:rPr lang="en-PT" dirty="0"/>
+              <a:t>LAGGED FEATURES</a:t>
             </a:r>
           </a:p>
         </p:txBody>
       </p:sp>
       <p:sp>
         <p:nvSpPr>
-          <p:cNvPr id="3" name="Marcador de Posição de Conteúdo 2">
+          <p:cNvPr id="3" name="Content Placeholder 2">
             <a:extLst>
               <a:ext uri="{FF2B5EF4-FFF2-40B4-BE49-F238E27FC236}">
-                <a16:creationId xmlns:a16="http://schemas.microsoft.com/office/drawing/2014/main" id="{4BF98680-B298-EC08-D2A1-C76F4720486C}"/>
+                <a16:creationId xmlns:a16="http://schemas.microsoft.com/office/drawing/2014/main" id="{0AA3EB1F-8678-8AC6-B2DA-4918368B3A53}"/>
               </a:ext>
             </a:extLst>
           </p:cNvPr>
@@ -12822,14 +13682,493 @@
           <a:bodyPr/>
           <a:lstStyle/>
           <a:p>
-            <a:endParaRPr lang="pt-PT"/>
+            <a:r>
+              <a:rPr lang="en-PT" dirty="0"/>
+              <a:t>Including historic context in our data allows our models to catch trends and improve accuracy in the forecasting of variables.</a:t>
+            </a:r>
+          </a:p>
+          <a:p>
+            <a:r>
+              <a:rPr lang="en-PT" dirty="0"/>
+              <a:t>Used in:</a:t>
+            </a:r>
+          </a:p>
+          <a:p>
+            <a:pPr lvl="1"/>
+            <a:r>
+              <a:rPr lang="en-GB" dirty="0"/>
+              <a:t>p</a:t>
+            </a:r>
+            <a:r>
+              <a:rPr lang="en-PT" dirty="0"/>
+              <a:t>layers_teams - </a:t>
+            </a:r>
+            <a:r>
+              <a:rPr lang="en-GB" dirty="0">
+                <a:solidFill>
+                  <a:srgbClr val="6AAB73"/>
+                </a:solidFill>
+                <a:effectLst/>
+              </a:rPr>
+              <a:t>'</a:t>
+            </a:r>
+            <a:r>
+              <a:rPr lang="en-GB" dirty="0" err="1">
+                <a:solidFill>
+                  <a:srgbClr val="6AAB73"/>
+                </a:solidFill>
+                <a:effectLst/>
+              </a:rPr>
+              <a:t>FG_Percentage</a:t>
+            </a:r>
+            <a:r>
+              <a:rPr lang="en-GB" dirty="0">
+                <a:solidFill>
+                  <a:srgbClr val="6AAB73"/>
+                </a:solidFill>
+                <a:effectLst/>
+              </a:rPr>
+              <a:t>'</a:t>
+            </a:r>
+            <a:r>
+              <a:rPr lang="en-GB" dirty="0">
+                <a:solidFill>
+                  <a:srgbClr val="BCBEC4"/>
+                </a:solidFill>
+                <a:effectLst/>
+              </a:rPr>
+              <a:t>, </a:t>
+            </a:r>
+            <a:r>
+              <a:rPr lang="en-GB" dirty="0">
+                <a:solidFill>
+                  <a:srgbClr val="6AAB73"/>
+                </a:solidFill>
+                <a:effectLst/>
+              </a:rPr>
+              <a:t>'</a:t>
+            </a:r>
+            <a:r>
+              <a:rPr lang="en-GB" dirty="0" err="1">
+                <a:solidFill>
+                  <a:srgbClr val="6AAB73"/>
+                </a:solidFill>
+                <a:effectLst/>
+              </a:rPr>
+              <a:t>FT_Percentage</a:t>
+            </a:r>
+            <a:r>
+              <a:rPr lang="en-GB" dirty="0">
+                <a:solidFill>
+                  <a:srgbClr val="6AAB73"/>
+                </a:solidFill>
+                <a:effectLst/>
+              </a:rPr>
+              <a:t>'</a:t>
+            </a:r>
+            <a:r>
+              <a:rPr lang="en-GB" dirty="0">
+                <a:solidFill>
+                  <a:srgbClr val="BCBEC4"/>
+                </a:solidFill>
+                <a:effectLst/>
+              </a:rPr>
+              <a:t>, </a:t>
+            </a:r>
+            <a:r>
+              <a:rPr lang="en-GB" dirty="0">
+                <a:solidFill>
+                  <a:srgbClr val="6AAB73"/>
+                </a:solidFill>
+                <a:effectLst/>
+              </a:rPr>
+              <a:t>'PPG'</a:t>
+            </a:r>
+            <a:r>
+              <a:rPr lang="en-GB" dirty="0">
+                <a:solidFill>
+                  <a:srgbClr val="BCBEC4"/>
+                </a:solidFill>
+                <a:effectLst/>
+              </a:rPr>
+              <a:t>, </a:t>
+            </a:r>
+            <a:r>
+              <a:rPr lang="en-GB" dirty="0">
+                <a:solidFill>
+                  <a:srgbClr val="6AAB73"/>
+                </a:solidFill>
+                <a:effectLst/>
+              </a:rPr>
+              <a:t>'EFF'</a:t>
+            </a:r>
+            <a:r>
+              <a:rPr lang="en-GB" dirty="0">
+                <a:solidFill>
+                  <a:srgbClr val="BCBEC4"/>
+                </a:solidFill>
+                <a:effectLst/>
+              </a:rPr>
+              <a:t>, </a:t>
+            </a:r>
+            <a:r>
+              <a:rPr lang="en-GB" dirty="0">
+                <a:solidFill>
+                  <a:srgbClr val="6AAB73"/>
+                </a:solidFill>
+                <a:effectLst/>
+              </a:rPr>
+              <a:t>'DPR’</a:t>
+            </a:r>
+            <a:r>
+              <a:rPr lang="en-PT" dirty="0"/>
+              <a:t>;</a:t>
+            </a:r>
+          </a:p>
+          <a:p>
+            <a:pPr lvl="1"/>
+            <a:r>
+              <a:rPr lang="en-GB" dirty="0"/>
+              <a:t>t</a:t>
+            </a:r>
+            <a:r>
+              <a:rPr lang="en-PT" dirty="0"/>
+              <a:t>eams - </a:t>
+            </a:r>
+            <a:r>
+              <a:rPr lang="en-GB" dirty="0">
+                <a:solidFill>
+                  <a:srgbClr val="6AAB73"/>
+                </a:solidFill>
+                <a:effectLst/>
+              </a:rPr>
+              <a:t>'</a:t>
+            </a:r>
+            <a:r>
+              <a:rPr lang="en-GB" dirty="0" err="1">
+                <a:solidFill>
+                  <a:srgbClr val="6AAB73"/>
+                </a:solidFill>
+                <a:effectLst/>
+              </a:rPr>
+              <a:t>RealTeamScore</a:t>
+            </a:r>
+            <a:r>
+              <a:rPr lang="en-GB" dirty="0">
+                <a:solidFill>
+                  <a:srgbClr val="6AAB73"/>
+                </a:solidFill>
+                <a:effectLst/>
+              </a:rPr>
+              <a:t>'</a:t>
+            </a:r>
+            <a:r>
+              <a:rPr lang="en-GB" dirty="0">
+                <a:solidFill>
+                  <a:srgbClr val="BCBEC4"/>
+                </a:solidFill>
+                <a:effectLst/>
+              </a:rPr>
+              <a:t>, </a:t>
+            </a:r>
+            <a:r>
+              <a:rPr lang="en-GB" dirty="0">
+                <a:solidFill>
+                  <a:srgbClr val="6AAB73"/>
+                </a:solidFill>
+                <a:effectLst/>
+              </a:rPr>
+              <a:t>'</a:t>
+            </a:r>
+            <a:r>
+              <a:rPr lang="en-GB" dirty="0" err="1">
+                <a:solidFill>
+                  <a:srgbClr val="6AAB73"/>
+                </a:solidFill>
+                <a:effectLst/>
+              </a:rPr>
+              <a:t>defensive_performance</a:t>
+            </a:r>
+            <a:r>
+              <a:rPr lang="en-GB" dirty="0">
+                <a:solidFill>
+                  <a:srgbClr val="6AAB73"/>
+                </a:solidFill>
+                <a:effectLst/>
+              </a:rPr>
+              <a:t>'</a:t>
+            </a:r>
+            <a:r>
+              <a:rPr lang="en-GB" dirty="0">
+                <a:solidFill>
+                  <a:srgbClr val="BCBEC4"/>
+                </a:solidFill>
+                <a:effectLst/>
+              </a:rPr>
+              <a:t>, </a:t>
+            </a:r>
+            <a:r>
+              <a:rPr lang="en-GB" dirty="0">
+                <a:solidFill>
+                  <a:srgbClr val="6AAB73"/>
+                </a:solidFill>
+                <a:effectLst/>
+              </a:rPr>
+              <a:t>'</a:t>
+            </a:r>
+            <a:r>
+              <a:rPr lang="en-GB" dirty="0" err="1">
+                <a:solidFill>
+                  <a:srgbClr val="6AAB73"/>
+                </a:solidFill>
+                <a:effectLst/>
+              </a:rPr>
+              <a:t>offensive_performance</a:t>
+            </a:r>
+            <a:r>
+              <a:rPr lang="en-GB" dirty="0">
+                <a:solidFill>
+                  <a:srgbClr val="6AAB73"/>
+                </a:solidFill>
+                <a:effectLst/>
+              </a:rPr>
+              <a:t>'</a:t>
+            </a:r>
+            <a:r>
+              <a:rPr lang="en-GB" dirty="0">
+                <a:solidFill>
+                  <a:srgbClr val="BCBEC4"/>
+                </a:solidFill>
+                <a:effectLst/>
+              </a:rPr>
+              <a:t>, </a:t>
+            </a:r>
+            <a:r>
+              <a:rPr lang="en-GB" dirty="0">
+                <a:solidFill>
+                  <a:srgbClr val="6AAB73"/>
+                </a:solidFill>
+                <a:effectLst/>
+              </a:rPr>
+              <a:t>'</a:t>
+            </a:r>
+            <a:r>
+              <a:rPr lang="en-GB" dirty="0" err="1">
+                <a:solidFill>
+                  <a:srgbClr val="6AAB73"/>
+                </a:solidFill>
+                <a:effectLst/>
+              </a:rPr>
+              <a:t>gamesWLRatio</a:t>
+            </a:r>
+            <a:r>
+              <a:rPr lang="en-GB" dirty="0">
+                <a:solidFill>
+                  <a:srgbClr val="6AAB73"/>
+                </a:solidFill>
+                <a:effectLst/>
+              </a:rPr>
+              <a:t>’</a:t>
+            </a:r>
+            <a:r>
+              <a:rPr lang="en-GB" dirty="0">
+                <a:solidFill>
+                  <a:srgbClr val="BCBEC4"/>
+                </a:solidFill>
+                <a:effectLst/>
+              </a:rPr>
+              <a:t>,</a:t>
+            </a:r>
+            <a:r>
+              <a:rPr lang="en-GB" dirty="0">
+                <a:solidFill>
+                  <a:srgbClr val="BCBEC4"/>
+                </a:solidFill>
+              </a:rPr>
+              <a:t> </a:t>
+            </a:r>
+            <a:r>
+              <a:rPr lang="en-GB" dirty="0">
+                <a:solidFill>
+                  <a:srgbClr val="6AAB73"/>
+                </a:solidFill>
+                <a:effectLst/>
+              </a:rPr>
+              <a:t>'</a:t>
+            </a:r>
+            <a:r>
+              <a:rPr lang="en-GB" dirty="0" err="1">
+                <a:solidFill>
+                  <a:srgbClr val="6AAB73"/>
+                </a:solidFill>
+                <a:effectLst/>
+              </a:rPr>
+              <a:t>homeWLRatio</a:t>
+            </a:r>
+            <a:r>
+              <a:rPr lang="en-GB" dirty="0">
+                <a:solidFill>
+                  <a:srgbClr val="6AAB73"/>
+                </a:solidFill>
+                <a:effectLst/>
+              </a:rPr>
+              <a:t>'</a:t>
+            </a:r>
+            <a:r>
+              <a:rPr lang="en-GB" dirty="0">
+                <a:solidFill>
+                  <a:srgbClr val="BCBEC4"/>
+                </a:solidFill>
+                <a:effectLst/>
+              </a:rPr>
+              <a:t>, </a:t>
+            </a:r>
+            <a:r>
+              <a:rPr lang="en-GB" dirty="0">
+                <a:solidFill>
+                  <a:srgbClr val="6AAB73"/>
+                </a:solidFill>
+                <a:effectLst/>
+              </a:rPr>
+              <a:t>'</a:t>
+            </a:r>
+            <a:r>
+              <a:rPr lang="en-GB" dirty="0" err="1">
+                <a:solidFill>
+                  <a:srgbClr val="6AAB73"/>
+                </a:solidFill>
+                <a:effectLst/>
+              </a:rPr>
+              <a:t>awayWLRatio</a:t>
+            </a:r>
+            <a:r>
+              <a:rPr lang="en-GB" dirty="0">
+                <a:solidFill>
+                  <a:srgbClr val="6AAB73"/>
+                </a:solidFill>
+                <a:effectLst/>
+              </a:rPr>
+              <a:t>'</a:t>
+            </a:r>
+            <a:r>
+              <a:rPr lang="en-GB" dirty="0">
+                <a:solidFill>
+                  <a:srgbClr val="BCBEC4"/>
+                </a:solidFill>
+                <a:effectLst/>
+              </a:rPr>
+              <a:t>, </a:t>
+            </a:r>
+            <a:r>
+              <a:rPr lang="en-GB" dirty="0">
+                <a:solidFill>
+                  <a:srgbClr val="6AAB73"/>
+                </a:solidFill>
+                <a:effectLst/>
+              </a:rPr>
+              <a:t>'</a:t>
+            </a:r>
+            <a:r>
+              <a:rPr lang="en-GB" dirty="0" err="1">
+                <a:solidFill>
+                  <a:srgbClr val="6AAB73"/>
+                </a:solidFill>
+                <a:effectLst/>
+              </a:rPr>
+              <a:t>confWLRatio</a:t>
+            </a:r>
+            <a:r>
+              <a:rPr lang="en-GB" dirty="0">
+                <a:solidFill>
+                  <a:srgbClr val="6AAB73"/>
+                </a:solidFill>
+                <a:effectLst/>
+              </a:rPr>
+              <a:t>'</a:t>
+            </a:r>
+            <a:r>
+              <a:rPr lang="en-GB" dirty="0">
+                <a:solidFill>
+                  <a:srgbClr val="BCBEC4"/>
+                </a:solidFill>
+                <a:effectLst/>
+              </a:rPr>
+              <a:t>, </a:t>
+            </a:r>
+            <a:r>
+              <a:rPr lang="en-GB" dirty="0">
+                <a:solidFill>
+                  <a:srgbClr val="6AAB73"/>
+                </a:solidFill>
+                <a:effectLst/>
+              </a:rPr>
+              <a:t>'progress'</a:t>
+            </a:r>
+            <a:r>
+              <a:rPr lang="en-GB" dirty="0">
+                <a:solidFill>
+                  <a:srgbClr val="BCBEC4"/>
+                </a:solidFill>
+                <a:effectLst/>
+              </a:rPr>
+              <a:t>, </a:t>
+            </a:r>
+            <a:r>
+              <a:rPr lang="en-GB" dirty="0">
+                <a:solidFill>
+                  <a:srgbClr val="6AAB73"/>
+                </a:solidFill>
+                <a:effectLst/>
+              </a:rPr>
+              <a:t>'playoff’</a:t>
+            </a:r>
+            <a:r>
+              <a:rPr lang="en-PT" dirty="0"/>
+              <a:t>;</a:t>
+            </a:r>
+          </a:p>
+          <a:p>
+            <a:r>
+              <a:rPr lang="en-PT" dirty="0"/>
+              <a:t>For each year we added the information of the previous 3 years.</a:t>
+            </a:r>
+          </a:p>
+          <a:p>
+            <a:r>
+              <a:rPr lang="en-PT" dirty="0"/>
+              <a:t>In case of none existent values (happens when there is less that 3 prior years) we define the values as -1 except for playoff where we define them as 0.5 (represents incertainty).</a:t>
+            </a:r>
+            <a:endParaRPr lang="en-GB" dirty="0">
+              <a:solidFill>
+                <a:srgbClr val="BCBEC4"/>
+              </a:solidFill>
+              <a:effectLst/>
+            </a:endParaRPr>
+          </a:p>
+          <a:p>
+            <a:pPr lvl="1"/>
+            <a:endParaRPr lang="en-GB" dirty="0">
+              <a:solidFill>
+                <a:srgbClr val="6AAB73"/>
+              </a:solidFill>
+              <a:effectLst/>
+            </a:endParaRPr>
+          </a:p>
+          <a:p>
+            <a:pPr lvl="1"/>
+            <a:endParaRPr lang="en-GB" dirty="0">
+              <a:solidFill>
+                <a:srgbClr val="BCBEC4"/>
+              </a:solidFill>
+              <a:effectLst/>
+            </a:endParaRPr>
           </a:p>
         </p:txBody>
       </p:sp>
     </p:spTree>
     <p:extLst>
       <p:ext uri="{BB962C8B-B14F-4D97-AF65-F5344CB8AC3E}">
-        <p14:creationId xmlns:p14="http://schemas.microsoft.com/office/powerpoint/2010/main" val="3387298468"/>
+        <p14:creationId xmlns:p14="http://schemas.microsoft.com/office/powerpoint/2010/main" val="2520301881"/>
       </p:ext>
     </p:extLst>
   </p:cSld>

</xml_diff>

<commit_message>
Changed the whole ppt
</commit_message>
<xml_diff>
--- a/ppt projeto.pptx
+++ b/ppt projeto.pptx
@@ -1356,7 +1356,7 @@
           <a:p>
             <a:fld id="{A73D0D99-86C5-4560-B8F4-5530516C9A59}" type="datetimeFigureOut">
               <a:rPr lang="pt-PT" smtClean="0"/>
-              <a:t>05/11/2023</a:t>
+              <a:t>05/11/23</a:t>
             </a:fld>
             <a:endParaRPr lang="pt-PT"/>
           </a:p>
@@ -1594,7 +1594,7 @@
           <a:p>
             <a:fld id="{A73D0D99-86C5-4560-B8F4-5530516C9A59}" type="datetimeFigureOut">
               <a:rPr lang="pt-PT" smtClean="0"/>
-              <a:t>05/11/2023</a:t>
+              <a:t>05/11/23</a:t>
             </a:fld>
             <a:endParaRPr lang="pt-PT"/>
           </a:p>
@@ -1774,7 +1774,7 @@
           <a:p>
             <a:fld id="{A73D0D99-86C5-4560-B8F4-5530516C9A59}" type="datetimeFigureOut">
               <a:rPr lang="pt-PT" smtClean="0"/>
-              <a:t>05/11/2023</a:t>
+              <a:t>05/11/23</a:t>
             </a:fld>
             <a:endParaRPr lang="pt-PT"/>
           </a:p>
@@ -1944,7 +1944,7 @@
           <a:p>
             <a:fld id="{A73D0D99-86C5-4560-B8F4-5530516C9A59}" type="datetimeFigureOut">
               <a:rPr lang="pt-PT" smtClean="0"/>
-              <a:t>05/11/2023</a:t>
+              <a:t>05/11/23</a:t>
             </a:fld>
             <a:endParaRPr lang="pt-PT"/>
           </a:p>
@@ -2220,7 +2220,7 @@
           <a:p>
             <a:fld id="{A73D0D99-86C5-4560-B8F4-5530516C9A59}" type="datetimeFigureOut">
               <a:rPr lang="pt-PT" smtClean="0"/>
-              <a:t>05/11/2023</a:t>
+              <a:t>05/11/23</a:t>
             </a:fld>
             <a:endParaRPr lang="pt-PT"/>
           </a:p>
@@ -3421,7 +3421,7 @@
           <a:p>
             <a:fld id="{A73D0D99-86C5-4560-B8F4-5530516C9A59}" type="datetimeFigureOut">
               <a:rPr lang="pt-PT" smtClean="0"/>
-              <a:t>05/11/2023</a:t>
+              <a:t>05/11/23</a:t>
             </a:fld>
             <a:endParaRPr lang="pt-PT"/>
           </a:p>
@@ -3811,7 +3811,7 @@
           <a:p>
             <a:fld id="{A73D0D99-86C5-4560-B8F4-5530516C9A59}" type="datetimeFigureOut">
               <a:rPr lang="pt-PT" smtClean="0"/>
-              <a:t>05/11/2023</a:t>
+              <a:t>05/11/23</a:t>
             </a:fld>
             <a:endParaRPr lang="pt-PT"/>
           </a:p>
@@ -3934,7 +3934,7 @@
           <a:p>
             <a:fld id="{A73D0D99-86C5-4560-B8F4-5530516C9A59}" type="datetimeFigureOut">
               <a:rPr lang="pt-PT" smtClean="0"/>
-              <a:t>05/11/2023</a:t>
+              <a:t>05/11/23</a:t>
             </a:fld>
             <a:endParaRPr lang="pt-PT"/>
           </a:p>
@@ -4029,7 +4029,7 @@
           <a:p>
             <a:fld id="{A73D0D99-86C5-4560-B8F4-5530516C9A59}" type="datetimeFigureOut">
               <a:rPr lang="pt-PT" smtClean="0"/>
-              <a:t>05/11/2023</a:t>
+              <a:t>05/11/23</a:t>
             </a:fld>
             <a:endParaRPr lang="pt-PT"/>
           </a:p>
@@ -4792,7 +4792,7 @@
           <a:p>
             <a:fld id="{A73D0D99-86C5-4560-B8F4-5530516C9A59}" type="datetimeFigureOut">
               <a:rPr lang="pt-PT" smtClean="0"/>
-              <a:t>05/11/2023</a:t>
+              <a:t>05/11/23</a:t>
             </a:fld>
             <a:endParaRPr lang="pt-PT"/>
           </a:p>
@@ -5632,7 +5632,7 @@
           <a:p>
             <a:fld id="{A73D0D99-86C5-4560-B8F4-5530516C9A59}" type="datetimeFigureOut">
               <a:rPr lang="pt-PT" smtClean="0"/>
-              <a:t>05/11/2023</a:t>
+              <a:t>05/11/23</a:t>
             </a:fld>
             <a:endParaRPr lang="pt-PT"/>
           </a:p>
@@ -5859,7 +5859,7 @@
           <a:p>
             <a:fld id="{A73D0D99-86C5-4560-B8F4-5530516C9A59}" type="datetimeFigureOut">
               <a:rPr lang="pt-PT" smtClean="0"/>
-              <a:t>05/11/2023</a:t>
+              <a:t>05/11/23</a:t>
             </a:fld>
             <a:endParaRPr lang="pt-PT"/>
           </a:p>
@@ -6876,7 +6876,7 @@
         </p:nvSpPr>
         <p:spPr>
           <a:xfrm>
-            <a:off x="4128041" y="1925266"/>
+            <a:off x="3931739" y="1776411"/>
             <a:ext cx="4510513" cy="2425959"/>
           </a:xfrm>
         </p:spPr>
@@ -6886,23 +6886,43 @@
           </a:bodyPr>
           <a:lstStyle/>
           <a:p>
-            <a:pPr algn="l"/>
-            <a:r>
-              <a:rPr lang="pt-PT" sz="3600" dirty="0" err="1"/>
+            <a:r>
+              <a:rPr lang="pt-PT" sz="2800" dirty="0" err="1">
+                <a:solidFill>
+                  <a:srgbClr val="784A00"/>
+                </a:solidFill>
+              </a:rPr>
               <a:t>Predictive</a:t>
             </a:r>
-            <a:r>
+            <a:br>
+              <a:rPr lang="pt-PT" sz="2800" dirty="0">
+                <a:solidFill>
+                  <a:srgbClr val="784A00"/>
+                </a:solidFill>
+              </a:rPr>
+            </a:br>
+            <a:r>
+              <a:rPr lang="pt-PT" sz="2800" dirty="0">
+                <a:solidFill>
+                  <a:srgbClr val="784A00"/>
+                </a:solidFill>
+              </a:rPr>
+              <a:t>Data </a:t>
+            </a:r>
+            <a:r>
+              <a:rPr lang="pt-PT" sz="2800" dirty="0" err="1">
+                <a:solidFill>
+                  <a:srgbClr val="784A00"/>
+                </a:solidFill>
+              </a:rPr>
+              <a:t>MininG</a:t>
+            </a:r>
+            <a:br>
               <a:rPr lang="pt-PT" sz="3600" dirty="0"/>
-              <a:t> Data </a:t>
-            </a:r>
-            <a:r>
-              <a:rPr lang="pt-PT" sz="3600" dirty="0" err="1"/>
-              <a:t>Mining</a:t>
-            </a:r>
-            <a:r>
+            </a:br>
+            <a:br>
               <a:rPr lang="pt-PT" sz="3600" dirty="0"/>
-              <a:t> – </a:t>
-            </a:r>
+            </a:br>
             <a:r>
               <a:rPr lang="pt-PT" sz="3600" dirty="0" err="1"/>
               <a:t>basketball</a:t>
@@ -6945,8 +6965,8 @@
         </p:nvSpPr>
         <p:spPr>
           <a:xfrm>
-            <a:off x="301484" y="5747373"/>
-            <a:ext cx="6801612" cy="1239894"/>
+            <a:off x="294396" y="5824812"/>
+            <a:ext cx="3455353" cy="915697"/>
           </a:xfrm>
         </p:spPr>
         <p:txBody>
@@ -6957,33 +6977,33 @@
           <a:p>
             <a:pPr algn="l"/>
             <a:r>
-              <a:rPr lang="pt-PT" sz="1600" dirty="0"/>
+              <a:rPr lang="pt-PT" sz="1300" spc="0" dirty="0"/>
               <a:t>André Sousa (</a:t>
             </a:r>
             <a:r>
-              <a:rPr lang="pt-PT" sz="1600" b="1" dirty="0"/>
+              <a:rPr lang="pt-PT" sz="1300" b="1" spc="0" dirty="0"/>
               <a:t>up202005277) IF:1</a:t>
             </a:r>
           </a:p>
           <a:p>
             <a:pPr algn="l"/>
             <a:r>
-              <a:rPr lang="pt-PT" sz="1600" dirty="0"/>
+              <a:rPr lang="pt-PT" sz="1300" spc="0" dirty="0"/>
               <a:t>Pedro Fonseca (</a:t>
             </a:r>
             <a:r>
-              <a:rPr lang="pt-PT" sz="1600" b="1" dirty="0"/>
+              <a:rPr lang="pt-PT" sz="1300" b="1" spc="0" dirty="0"/>
               <a:t>up202008307) IF:1</a:t>
             </a:r>
           </a:p>
           <a:p>
             <a:pPr algn="l"/>
             <a:r>
-              <a:rPr lang="pt-PT" sz="1600" dirty="0"/>
+              <a:rPr lang="pt-PT" sz="1300" spc="0" dirty="0"/>
               <a:t>Tomás Maciel (</a:t>
             </a:r>
             <a:r>
-              <a:rPr lang="pt-PT" sz="1600" b="1" dirty="0"/>
+              <a:rPr lang="pt-PT" sz="1300" b="1" spc="0" dirty="0"/>
               <a:t>up202006845) IF:1</a:t>
             </a:r>
           </a:p>
@@ -7005,8 +7025,8 @@
         </p:nvSpPr>
         <p:spPr>
           <a:xfrm>
-            <a:off x="6226793" y="5662714"/>
-            <a:ext cx="6801612" cy="1239894"/>
+            <a:off x="8442252" y="6417874"/>
+            <a:ext cx="3749747" cy="322635"/>
           </a:xfrm>
           <a:prstGeom prst="rect">
             <a:avLst/>
@@ -7224,25 +7244,14 @@
             </a:lvl9pPr>
           </a:lstStyle>
           <a:p>
-            <a:r>
-              <a:rPr lang="pt-PT" sz="2400" b="1" dirty="0"/>
-              <a:t>AC – </a:t>
-            </a:r>
-            <a:r>
-              <a:rPr lang="pt-PT" sz="2400" b="1" dirty="0" err="1"/>
-              <a:t>Machine</a:t>
-            </a:r>
-            <a:r>
-              <a:rPr lang="pt-PT" sz="2400" b="1" dirty="0"/>
-              <a:t> </a:t>
-            </a:r>
-            <a:r>
-              <a:rPr lang="pt-PT" sz="2400" b="1" dirty="0" err="1"/>
-              <a:t>Learning</a:t>
-            </a:r>
-            <a:r>
-              <a:rPr lang="pt-PT" sz="2400" b="1" dirty="0"/>
-              <a:t> 2023/2024</a:t>
+            <a:pPr algn="r"/>
+            <a:r>
+              <a:rPr lang="pt-PT" sz="1300" b="1" dirty="0">
+                <a:solidFill>
+                  <a:srgbClr val="2A1A00"/>
+                </a:solidFill>
+              </a:rPr>
+              <a:t>AC – MACHINE LEARNING 2023/2024</a:t>
             </a:r>
           </a:p>
         </p:txBody>
@@ -7465,43 +7474,53 @@
           </a:xfrm>
         </p:spPr>
         <p:txBody>
-          <a:bodyPr/>
+          <a:bodyPr>
+            <a:normAutofit/>
+          </a:bodyPr>
           <a:lstStyle/>
           <a:p>
             <a:pPr algn="just"/>
             <a:r>
-              <a:rPr lang="en-US" dirty="0"/>
-              <a:t>We will present the results of the 4 columns we tried to predict being 2 of them intermediaries to the final goal of predicting the final result.</a:t>
+              <a:rPr lang="en-GB" dirty="0"/>
+              <a:t>We explored predictions for four columns, with two acting as intermediaries toward the final result analysis.</a:t>
             </a:r>
           </a:p>
           <a:p>
             <a:pPr algn="just"/>
             <a:r>
-              <a:rPr lang="en-US" dirty="0"/>
-              <a:t>For predicting the players’ EFF,  from all the models present before that we tested, the one we used was the ‘Random Forest Regressor’, with the ‘</a:t>
-            </a:r>
-            <a:r>
-              <a:rPr lang="en-US" dirty="0" err="1"/>
+              <a:rPr lang="en-GB" dirty="0"/>
+              <a:t>To predict players' EFF, we utilized the 'Random Forest Regressor' model, which was selected from our previous testing.</a:t>
+            </a:r>
+          </a:p>
+          <a:p>
+            <a:pPr algn="just"/>
+            <a:r>
+              <a:rPr lang="en-GB" dirty="0"/>
+              <a:t>The '</a:t>
+            </a:r>
+            <a:r>
+              <a:rPr lang="en-GB" dirty="0" err="1"/>
               <a:t>RobustScaler</a:t>
             </a:r>
             <a:r>
-              <a:rPr lang="en-US" dirty="0"/>
-              <a:t>’.</a:t>
+              <a:rPr lang="en-GB" dirty="0"/>
+              <a:t>' was applied to enhance the accuracy of the EFF predictions.</a:t>
             </a:r>
           </a:p>
           <a:p>
             <a:pPr algn="just"/>
             <a:r>
-              <a:rPr lang="en-US" dirty="0"/>
-              <a:t>The same happened to predict the players’ DPR, in which we used the same exact model to predict the future DPRs.</a:t>
-            </a:r>
-            <a:endParaRPr lang="en-US" b="0" dirty="0">
-              <a:solidFill>
-                <a:schemeClr val="tx1"/>
-              </a:solidFill>
-              <a:effectLst/>
-              <a:latin typeface="Gill Sans MT" panose="020B0502020104020203" pitchFamily="34" charset="0"/>
-            </a:endParaRPr>
+              <a:rPr lang="en-GB" dirty="0"/>
+              <a:t>For forecasting players' DPR, we maintained consistency by using the same 'Random Forest Regressor' model and '</a:t>
+            </a:r>
+            <a:r>
+              <a:rPr lang="en-GB" dirty="0" err="1"/>
+              <a:t>RobustScaler</a:t>
+            </a:r>
+            <a:r>
+              <a:rPr lang="en-GB" dirty="0"/>
+              <a:t>' approach.</a:t>
+            </a:r>
           </a:p>
         </p:txBody>
       </p:sp>
@@ -7856,7 +7875,7 @@
           <a:p>
             <a:r>
               <a:rPr lang="en-US" dirty="0"/>
-              <a:t>This accuracy is very good, given that we must predict the first 8 teams of 12, and one wrong prediction has a big amount of effect on the final accuracy, as explained previously.</a:t>
+              <a:t>This accuracy is very good, given that we must predict the first 8 teams of 12, and one wrong prediction has a large effect on the final accuracy, as explained previously.</a:t>
             </a:r>
             <a:endParaRPr lang="pt-PT" dirty="0"/>
           </a:p>
@@ -7977,24 +7996,26 @@
         </p:nvSpPr>
         <p:spPr/>
         <p:txBody>
-          <a:bodyPr/>
+          <a:bodyPr>
+            <a:normAutofit lnSpcReduction="10000"/>
+          </a:bodyPr>
           <a:lstStyle/>
           <a:p>
             <a:r>
               <a:rPr lang="en-US" dirty="0"/>
-              <a:t>At the end of this phase, we think that the project went very well.  We started by making a robust and complete analysis of the data, which allowed us to understand early what would be useful for the final prediction, and we were able to perform a data cleaning in the first weeks. </a:t>
+              <a:t>At this stage, we believe that the project was a success.  We started by making a robust and complete analysis of the data, which allowed us to understand early on what would be useful for our prediction models, which led to a efficient data cleaning in the first few weeks of the project. </a:t>
+            </a:r>
+          </a:p>
+          <a:p>
+            <a:r>
+              <a:rPr lang="en-GB" dirty="0"/>
+              <a:t>As a team, we conducted research to identify and choose specific metrics that formed the foundation for the prediction models we developed. These metrics are commonly utilized by the NBA to assess players' performance.</a:t>
             </a:r>
           </a:p>
           <a:p>
             <a:r>
               <a:rPr lang="en-US" dirty="0"/>
-              <a:t>Then, as a team, we discussed and searched some metrics that the NBA itself uses to evaluate players and, with that as a basis, we defined that those metrics would be the base of the predictions we would make.</a:t>
-            </a:r>
-          </a:p>
-          <a:p>
-            <a:r>
-              <a:rPr lang="en-US" dirty="0"/>
-              <a:t>Thanks to our work organization, we were able to test a lot of models and choose the best one as our ‘official’ model, and that gave us an idea of the pros and cons of each model.</a:t>
+              <a:t>We tested a variety of models and chose the most accurate as our ‘official’ model. By evaluating different machine learning algorithms, we were able to identify the weaknesses and strengths of each.</a:t>
             </a:r>
           </a:p>
         </p:txBody>
@@ -8047,8 +8068,8 @@
         </p:nvSpPr>
         <p:spPr>
           <a:xfrm>
-            <a:off x="4403182" y="2982550"/>
-            <a:ext cx="10178322" cy="1492132"/>
+            <a:off x="4877451" y="2863695"/>
+            <a:ext cx="2437097" cy="1130610"/>
           </a:xfrm>
         </p:spPr>
         <p:txBody>
@@ -8057,11 +8078,11 @@
           </a:bodyPr>
           <a:lstStyle/>
           <a:p>
-            <a:r>
-              <a:rPr lang="pt-PT" sz="4500" dirty="0" err="1"/>
-              <a:t>Annexes</a:t>
-            </a:r>
-            <a:endParaRPr lang="pt-PT" sz="4500" dirty="0"/>
+            <a:pPr algn="ctr"/>
+            <a:r>
+              <a:rPr lang="pt-PT" sz="4500" dirty="0"/>
+              <a:t>Anexes</a:t>
+            </a:r>
           </a:p>
         </p:txBody>
       </p:sp>
@@ -8154,43 +8175,67 @@
           <a:bodyPr/>
           <a:lstStyle/>
           <a:p>
-            <a:r>
-              <a:rPr lang="en-US" dirty="0"/>
-              <a:t>When performing the data analysis, besides the plots that we presented, we also made a less visual analysis, using functions from Pandas, such as describe(), info(), </a:t>
-            </a:r>
-            <a:r>
-              <a:rPr lang="en-US" dirty="0" err="1"/>
+            <a:pPr algn="l">
+              <a:buFont typeface="Arial" panose="020B0604020202020204" pitchFamily="34" charset="0"/>
+              <a:buChar char="•"/>
+            </a:pPr>
+            <a:r>
+              <a:rPr lang="en-GB" dirty="0"/>
+              <a:t>Utilized Pandas functions such as describe(), info(), </a:t>
+            </a:r>
+            <a:r>
+              <a:rPr lang="en-GB" dirty="0" err="1"/>
               <a:t>isnull</a:t>
             </a:r>
             <a:r>
-              <a:rPr lang="en-US" dirty="0"/>
-              <a:t>(), etc.</a:t>
-            </a:r>
-          </a:p>
-          <a:p>
-            <a:r>
-              <a:rPr lang="en-US" dirty="0"/>
-              <a:t>With that, we obtained more details about the data we were provided, its columns and their types, which gave us a deeper knowledge of the problems we had and the initial data.</a:t>
-            </a:r>
-          </a:p>
-          <a:p>
-            <a:r>
-              <a:rPr lang="en-US" dirty="0"/>
-              <a:t>Also, with this type of analysis, we detected some columns that had a significant number of null values and didn’t add relevant information to our problem.</a:t>
-            </a:r>
-          </a:p>
-          <a:p>
-            <a:r>
-              <a:rPr lang="en-US" dirty="0"/>
-              <a:t>We detected on ‘teams’ that the column ‘</a:t>
-            </a:r>
-            <a:r>
-              <a:rPr lang="en-US" dirty="0" err="1"/>
+              <a:rPr lang="en-GB" dirty="0"/>
+              <a:t>(), etc., during data analysis for comprehensive insights into the provided data.</a:t>
+            </a:r>
+          </a:p>
+          <a:p>
+            <a:pPr algn="l">
+              <a:buFont typeface="Arial" panose="020B0604020202020204" pitchFamily="34" charset="0"/>
+              <a:buChar char="•"/>
+            </a:pPr>
+            <a:r>
+              <a:rPr lang="en-GB" dirty="0"/>
+              <a:t>Gained detailed understanding of the data, including its columns, data types, and potential issues.</a:t>
+            </a:r>
+          </a:p>
+          <a:p>
+            <a:pPr algn="l">
+              <a:buFont typeface="Arial" panose="020B0604020202020204" pitchFamily="34" charset="0"/>
+              <a:buChar char="•"/>
+            </a:pPr>
+            <a:r>
+              <a:rPr lang="en-GB" dirty="0"/>
+              <a:t>Identified columns with a substantial number of null values that didn't contribute relevant information to our problem.</a:t>
+            </a:r>
+          </a:p>
+          <a:p>
+            <a:pPr algn="l">
+              <a:buFont typeface="Arial" panose="020B0604020202020204" pitchFamily="34" charset="0"/>
+              <a:buChar char="•"/>
+            </a:pPr>
+            <a:r>
+              <a:rPr lang="en-GB" dirty="0"/>
+              <a:t>Discovered that the '</a:t>
+            </a:r>
+            <a:r>
+              <a:rPr lang="en-GB" dirty="0" err="1"/>
               <a:t>divID</a:t>
             </a:r>
             <a:r>
-              <a:rPr lang="en-US" dirty="0"/>
-              <a:t>’ was all filled with Nan values, which made us remove it.</a:t>
+              <a:rPr lang="en-GB" dirty="0"/>
+              <a:t>' column in the 'teams' dataset was entirely filled with </a:t>
+            </a:r>
+            <a:r>
+              <a:rPr lang="en-GB" dirty="0" err="1"/>
+              <a:t>NaN</a:t>
+            </a:r>
+            <a:r>
+              <a:rPr lang="en-GB" dirty="0"/>
+              <a:t> values, leading to its removal for analysis.</a:t>
             </a:r>
           </a:p>
         </p:txBody>
@@ -8286,7 +8331,23 @@
           <a:p>
             <a:r>
               <a:rPr lang="en-US" dirty="0"/>
-              <a:t>We also observed that in the table ‘players’ there were many columns with Nan values.</a:t>
+              <a:t>We also observed that in the table ‘</a:t>
+            </a:r>
+            <a:r>
+              <a:rPr lang="en-US" i="1" dirty="0"/>
+              <a:t>players</a:t>
+            </a:r>
+            <a:r>
+              <a:rPr lang="en-US" dirty="0"/>
+              <a:t>’ there were many columns with </a:t>
+            </a:r>
+            <a:r>
+              <a:rPr lang="en-US" dirty="0" err="1"/>
+              <a:t>NaN</a:t>
+            </a:r>
+            <a:r>
+              <a:rPr lang="en-US" dirty="0"/>
+              <a:t> values.</a:t>
             </a:r>
           </a:p>
         </p:txBody>
@@ -9006,19 +9067,21 @@
           <a:p>
             <a:r>
               <a:rPr lang="en-US" dirty="0"/>
-              <a:t>Of course,  given this scenario, we started thinking of what we could do to deal with it. </a:t>
-            </a:r>
-          </a:p>
-          <a:p>
+              <a:t>Our solution:</a:t>
+            </a:r>
+          </a:p>
+          <a:p>
+            <a:pPr lvl="1"/>
             <a:r>
               <a:rPr lang="en-US" dirty="0"/>
               <a:t>For the ‘pos’ column, we dropped the Nan values and kept the others, not Nan.</a:t>
             </a:r>
           </a:p>
           <a:p>
+            <a:pPr lvl="1"/>
             <a:r>
               <a:rPr lang="en-US" dirty="0"/>
-              <a:t>For the columns related to the colleges, the solution we found was to make a mapping, giving each college an index, and like that, we dealt with this problem.</a:t>
+              <a:t>For the columns related to the colleges, the solution we found was to make a mapping, giving each college an index.</a:t>
             </a:r>
             <a:endParaRPr lang="pt-PT" dirty="0"/>
           </a:p>
@@ -11188,7 +11251,7 @@
             </a:r>
             <a:r>
               <a:rPr lang="pt-PT" dirty="0" err="1"/>
-              <a:t>all</a:t>
+              <a:t>these</a:t>
             </a:r>
             <a:r>
               <a:rPr lang="pt-PT" dirty="0"/>
@@ -11196,7 +11259,7 @@
             </a:r>
             <a:r>
               <a:rPr lang="pt-PT" dirty="0" err="1"/>
-              <a:t>of</a:t>
+              <a:t>new</a:t>
             </a:r>
             <a:r>
               <a:rPr lang="pt-PT" dirty="0"/>
@@ -11204,7 +11267,7 @@
             </a:r>
             <a:r>
               <a:rPr lang="pt-PT" dirty="0" err="1"/>
-              <a:t>these</a:t>
+              <a:t>features</a:t>
             </a:r>
             <a:r>
               <a:rPr lang="pt-PT" dirty="0"/>
@@ -11212,7 +11275,15 @@
             </a:r>
             <a:r>
               <a:rPr lang="pt-PT" dirty="0" err="1"/>
-              <a:t>features</a:t>
+              <a:t>allowed</a:t>
+            </a:r>
+            <a:r>
+              <a:rPr lang="pt-PT" dirty="0"/>
+              <a:t> a complete </a:t>
+            </a:r>
+            <a:r>
+              <a:rPr lang="pt-PT" dirty="0" err="1"/>
+              <a:t>analysis</a:t>
             </a:r>
             <a:r>
               <a:rPr lang="pt-PT" dirty="0"/>
@@ -11220,7 +11291,7 @@
             </a:r>
             <a:r>
               <a:rPr lang="pt-PT" dirty="0" err="1"/>
-              <a:t>created</a:t>
+              <a:t>of</a:t>
             </a:r>
             <a:r>
               <a:rPr lang="pt-PT" dirty="0"/>
@@ -11228,7 +11299,7 @@
             </a:r>
             <a:r>
               <a:rPr lang="pt-PT" dirty="0" err="1"/>
-              <a:t>by</a:t>
+              <a:t>several</a:t>
             </a:r>
             <a:r>
               <a:rPr lang="pt-PT" dirty="0"/>
@@ -11236,7 +11307,15 @@
             </a:r>
             <a:r>
               <a:rPr lang="pt-PT" dirty="0" err="1"/>
-              <a:t>us</a:t>
+              <a:t>statistics</a:t>
+            </a:r>
+            <a:r>
+              <a:rPr lang="pt-PT" dirty="0"/>
+              <a:t> (</a:t>
+            </a:r>
+            <a:r>
+              <a:rPr lang="pt-PT" dirty="0" err="1"/>
+              <a:t>both</a:t>
             </a:r>
             <a:r>
               <a:rPr lang="pt-PT" dirty="0"/>
@@ -11244,15 +11323,7 @@
             </a:r>
             <a:r>
               <a:rPr lang="pt-PT" dirty="0" err="1"/>
-              <a:t>allowed</a:t>
-            </a:r>
-            <a:r>
-              <a:rPr lang="pt-PT" dirty="0"/>
-              <a:t> a complete </a:t>
-            </a:r>
-            <a:r>
-              <a:rPr lang="pt-PT" dirty="0" err="1"/>
-              <a:t>analysis</a:t>
+              <a:t>individually</a:t>
             </a:r>
             <a:r>
               <a:rPr lang="pt-PT" dirty="0"/>
@@ -11260,7 +11331,23 @@
             </a:r>
             <a:r>
               <a:rPr lang="pt-PT" dirty="0" err="1"/>
-              <a:t>of</a:t>
+              <a:t>and</a:t>
+            </a:r>
+            <a:r>
+              <a:rPr lang="pt-PT" dirty="0"/>
+              <a:t> team </a:t>
+            </a:r>
+            <a:r>
+              <a:rPr lang="pt-PT" dirty="0" err="1"/>
+              <a:t>level</a:t>
+            </a:r>
+            <a:r>
+              <a:rPr lang="pt-PT" dirty="0"/>
+              <a:t>), </a:t>
+            </a:r>
+            <a:r>
+              <a:rPr lang="pt-PT" dirty="0" err="1"/>
+              <a:t>which</a:t>
             </a:r>
             <a:r>
               <a:rPr lang="pt-PT" dirty="0"/>
@@ -11268,7 +11355,7 @@
             </a:r>
             <a:r>
               <a:rPr lang="pt-PT" dirty="0" err="1"/>
-              <a:t>several</a:t>
+              <a:t>gave</a:t>
             </a:r>
             <a:r>
               <a:rPr lang="pt-PT" dirty="0"/>
@@ -11276,15 +11363,7 @@
             </a:r>
             <a:r>
               <a:rPr lang="pt-PT" dirty="0" err="1"/>
-              <a:t>statistics</a:t>
-            </a:r>
-            <a:r>
-              <a:rPr lang="pt-PT" dirty="0"/>
-              <a:t> (</a:t>
-            </a:r>
-            <a:r>
-              <a:rPr lang="pt-PT" dirty="0" err="1"/>
-              <a:t>both</a:t>
+              <a:t>us</a:t>
             </a:r>
             <a:r>
               <a:rPr lang="pt-PT" dirty="0"/>
@@ -11292,7 +11371,7 @@
             </a:r>
             <a:r>
               <a:rPr lang="pt-PT" dirty="0" err="1"/>
-              <a:t>individually</a:t>
+              <a:t>the</a:t>
             </a:r>
             <a:r>
               <a:rPr lang="pt-PT" dirty="0"/>
@@ -11300,23 +11379,15 @@
             </a:r>
             <a:r>
               <a:rPr lang="pt-PT" dirty="0" err="1"/>
-              <a:t>and</a:t>
+              <a:t>best</a:t>
             </a:r>
             <a:r>
               <a:rPr lang="pt-PT" dirty="0"/>
-              <a:t> team </a:t>
+              <a:t> chance </a:t>
             </a:r>
             <a:r>
               <a:rPr lang="pt-PT" dirty="0" err="1"/>
-              <a:t>level</a:t>
-            </a:r>
-            <a:r>
-              <a:rPr lang="pt-PT" dirty="0"/>
-              <a:t>), </a:t>
-            </a:r>
-            <a:r>
-              <a:rPr lang="pt-PT" dirty="0" err="1"/>
-              <a:t>which</a:t>
+              <a:t>at</a:t>
             </a:r>
             <a:r>
               <a:rPr lang="pt-PT" dirty="0"/>
@@ -11324,7 +11395,15 @@
             </a:r>
             <a:r>
               <a:rPr lang="pt-PT" dirty="0" err="1"/>
-              <a:t>allowed</a:t>
+              <a:t>creating</a:t>
+            </a:r>
+            <a:r>
+              <a:rPr lang="pt-PT" dirty="0"/>
+              <a:t> a </a:t>
+            </a:r>
+            <a:r>
+              <a:rPr lang="pt-PT" dirty="0" err="1"/>
+              <a:t>robust</a:t>
             </a:r>
             <a:r>
               <a:rPr lang="pt-PT" dirty="0"/>
@@ -11332,15 +11411,7 @@
             </a:r>
             <a:r>
               <a:rPr lang="pt-PT" dirty="0" err="1"/>
-              <a:t>us</a:t>
-            </a:r>
-            <a:r>
-              <a:rPr lang="pt-PT" dirty="0"/>
-              <a:t> to </a:t>
-            </a:r>
-            <a:r>
-              <a:rPr lang="pt-PT" dirty="0" err="1"/>
-              <a:t>perform</a:t>
+              <a:t>and</a:t>
             </a:r>
             <a:r>
               <a:rPr lang="pt-PT" dirty="0"/>
@@ -11348,7 +11419,7 @@
             </a:r>
             <a:r>
               <a:rPr lang="pt-PT" dirty="0" err="1"/>
-              <a:t>the</a:t>
+              <a:t>efficient</a:t>
             </a:r>
             <a:r>
               <a:rPr lang="pt-PT" dirty="0"/>
@@ -11356,115 +11427,11 @@
             </a:r>
             <a:r>
               <a:rPr lang="pt-PT" dirty="0" err="1"/>
-              <a:t>best</a:t>
+              <a:t>model</a:t>
             </a:r>
             <a:r>
               <a:rPr lang="pt-PT" dirty="0"/>
-              <a:t> </a:t>
-            </a:r>
-            <a:r>
-              <a:rPr lang="pt-PT" dirty="0" err="1"/>
-              <a:t>prediction</a:t>
-            </a:r>
-            <a:r>
-              <a:rPr lang="pt-PT" dirty="0"/>
-              <a:t> </a:t>
-            </a:r>
-            <a:r>
-              <a:rPr lang="pt-PT" dirty="0" err="1"/>
-              <a:t>we</a:t>
-            </a:r>
-            <a:r>
-              <a:rPr lang="pt-PT" dirty="0"/>
-              <a:t> </a:t>
-            </a:r>
-            <a:r>
-              <a:rPr lang="pt-PT" dirty="0" err="1"/>
-              <a:t>could</a:t>
-            </a:r>
-            <a:r>
-              <a:rPr lang="pt-PT" dirty="0"/>
-              <a:t> </a:t>
-            </a:r>
-            <a:r>
-              <a:rPr lang="pt-PT" dirty="0" err="1"/>
-              <a:t>by</a:t>
-            </a:r>
-            <a:r>
-              <a:rPr lang="pt-PT" dirty="0"/>
-              <a:t> </a:t>
-            </a:r>
-            <a:r>
-              <a:rPr lang="pt-PT" dirty="0" err="1"/>
-              <a:t>taking</a:t>
-            </a:r>
-            <a:r>
-              <a:rPr lang="pt-PT" dirty="0"/>
-              <a:t> </a:t>
-            </a:r>
-            <a:r>
-              <a:rPr lang="pt-PT" dirty="0" err="1"/>
-              <a:t>into</a:t>
-            </a:r>
-            <a:r>
-              <a:rPr lang="pt-PT" dirty="0"/>
-              <a:t> account </a:t>
-            </a:r>
-            <a:r>
-              <a:rPr lang="pt-PT" dirty="0" err="1"/>
-              <a:t>many</a:t>
-            </a:r>
-            <a:r>
-              <a:rPr lang="pt-PT" dirty="0"/>
-              <a:t> </a:t>
-            </a:r>
-            <a:r>
-              <a:rPr lang="pt-PT" dirty="0" err="1"/>
-              <a:t>types</a:t>
-            </a:r>
-            <a:r>
-              <a:rPr lang="pt-PT" dirty="0"/>
-              <a:t> </a:t>
-            </a:r>
-            <a:r>
-              <a:rPr lang="pt-PT" dirty="0" err="1"/>
-              <a:t>of</a:t>
-            </a:r>
-            <a:r>
-              <a:rPr lang="pt-PT" dirty="0"/>
-              <a:t> </a:t>
-            </a:r>
-            <a:r>
-              <a:rPr lang="pt-PT" dirty="0" err="1"/>
-              <a:t>statistics</a:t>
-            </a:r>
-            <a:r>
-              <a:rPr lang="pt-PT" dirty="0"/>
-              <a:t> </a:t>
-            </a:r>
-            <a:r>
-              <a:rPr lang="pt-PT" dirty="0" err="1"/>
-              <a:t>of</a:t>
-            </a:r>
-            <a:r>
-              <a:rPr lang="pt-PT" dirty="0"/>
-              <a:t> </a:t>
-            </a:r>
-            <a:r>
-              <a:rPr lang="pt-PT" dirty="0" err="1"/>
-              <a:t>our</a:t>
-            </a:r>
-            <a:r>
-              <a:rPr lang="pt-PT" dirty="0"/>
-              <a:t> </a:t>
-            </a:r>
-            <a:r>
-              <a:rPr lang="pt-PT" dirty="0" err="1"/>
-              <a:t>dataset</a:t>
-            </a:r>
-            <a:r>
-              <a:rPr lang="pt-PT" dirty="0"/>
-              <a:t>.	</a:t>
+              <a:t>.</a:t>
             </a:r>
           </a:p>
           <a:p>
@@ -11569,7 +11536,7 @@
         </p:spPr>
         <p:txBody>
           <a:bodyPr>
-            <a:normAutofit/>
+            <a:normAutofit lnSpcReduction="10000"/>
           </a:bodyPr>
           <a:lstStyle/>
           <a:p>
@@ -11583,7 +11550,15 @@
             <a:pPr algn="just"/>
             <a:r>
               <a:rPr lang="en-US" sz="1800" dirty="0"/>
-              <a:t>Our main goal is, using this data, to develop a model that can predict which teams go to the playoffs (8 first teams).</a:t>
+              <a:t>Our </a:t>
+            </a:r>
+            <a:r>
+              <a:rPr lang="en-US" sz="1800" b="1" dirty="0"/>
+              <a:t>main goal </a:t>
+            </a:r>
+            <a:r>
+              <a:rPr lang="en-US" sz="1800" dirty="0"/>
+              <a:t>is to develop a model using this data that can predict which teams go to the playoffs (8 best teams from the standard season).</a:t>
             </a:r>
           </a:p>
         </p:txBody>
@@ -13511,8 +13486,12 @@
           <a:p>
             <a:pPr algn="just"/>
             <a:r>
+              <a:rPr lang="en-US" b="1" dirty="0"/>
+              <a:t>Linear Regression, Support Vector Regressor, and Ridge Regression </a:t>
+            </a:r>
+            <a:r>
               <a:rPr lang="en-US" dirty="0"/>
-              <a:t>Linear Regression, Support Vector Regressor, and Ridge Regression consistently achieve high scores across all Scalers, with accuracy, recall, precision, and F1 score of 0.625 or higher.</a:t>
+              <a:t>consistently achieve high scores across all Scalers, with accuracy, recall, precision, and F1 score of 0.625 or higher.</a:t>
             </a:r>
           </a:p>
           <a:p>
@@ -13522,8 +13501,12 @@
           <a:p>
             <a:pPr algn="just"/>
             <a:r>
+              <a:rPr lang="en-US" b="1" dirty="0"/>
+              <a:t>Random Forest Regressor and MLP Regressor</a:t>
+            </a:r>
+            <a:r>
               <a:rPr lang="en-US" dirty="0"/>
-              <a:t>Random Forest Regressor and MLP Regressor exhibit less consistent performance, with scores varying depending on the Scaler used. However, the overall scores are lower than the results mentioned in the previous topic.</a:t>
+              <a:t> exhibit less consistent performance, with scores varying depending on the Scaler used. However, the overall scores are lower than the results mentioned in the previous topic.</a:t>
             </a:r>
           </a:p>
           <a:p>
@@ -13533,8 +13516,12 @@
           <a:p>
             <a:pPr algn="just"/>
             <a:r>
+              <a:rPr lang="en-US" b="1" dirty="0"/>
+              <a:t>Lasso Regression </a:t>
+            </a:r>
+            <a:r>
               <a:rPr lang="en-US" dirty="0"/>
-              <a:t>Lasso Regression achieves the highest accuracy and F1 score among all regression models, indicating strong overall predictive capability. Furthermore, the best result was obtained without using a Scaler.</a:t>
+              <a:t>achieves the highest accuracy and F1 score among all regression models, indicating strong overall predictive capability. Furthermore, the best result was obtained without using a Scaler.</a:t>
             </a:r>
           </a:p>
           <a:p>
@@ -13544,8 +13531,12 @@
           <a:p>
             <a:pPr algn="just"/>
             <a:r>
+              <a:rPr lang="en-US" b="1" dirty="0"/>
+              <a:t>Gradient Boosting Regressor </a:t>
+            </a:r>
+            <a:r>
               <a:rPr lang="en-US" dirty="0"/>
-              <a:t>Gradient Boosting Regressor demonstrates competitive performance with high accuracy, recall, precision, and an F1 score under the Normalizer Scaler.</a:t>
+              <a:t>demonstrates competitive performance with high accuracy, recall, precision, and an F1 score under the Normalizer Scaler.</a:t>
             </a:r>
           </a:p>
           <a:p>
@@ -13556,7 +13547,15 @@
             <a:pPr algn="just"/>
             <a:r>
               <a:rPr lang="en-US" dirty="0"/>
-              <a:t>As expected, Naïve Bayes did not perform well in this problem.  We were counting on this outcome, because this algorithm assumes that all the features are completely independent, however, as displayed in the confusion matrices, the columns have some correlation among them, therefore invalidating the assumption made by Naïve Bayes and leading to poor performance.</a:t>
+              <a:t>As expected, </a:t>
+            </a:r>
+            <a:r>
+              <a:rPr lang="en-US" b="1" dirty="0"/>
+              <a:t>Naïve Bayes </a:t>
+            </a:r>
+            <a:r>
+              <a:rPr lang="en-US" dirty="0"/>
+              <a:t>did not perform well in this problem.  We were counting on this outcome, because this algorithm assumes that all the features are completely independent, however, as displayed in the confusion matrices, the columns have some correlation among them, therefore invalidating the assumption made by Naïve Bayes and leading to poor performance.</a:t>
             </a:r>
           </a:p>
         </p:txBody>
@@ -13661,39 +13660,43 @@
           </a:bodyPr>
           <a:lstStyle/>
           <a:p>
-            <a:pPr marL="0" indent="0" algn="just">
-              <a:buNone/>
+            <a:pPr marL="342900" indent="-342900" algn="just">
+              <a:buFont typeface="+mj-lt"/>
+              <a:buAutoNum type="arabicPeriod"/>
             </a:pPr>
             <a:r>
               <a:rPr lang="en-US" sz="1800" dirty="0"/>
-              <a:t>1- There are teams with different coaches over the 10 years, however, a few kept the same coach. There are also teams that switched coaches during the season.</a:t>
-            </a:r>
-          </a:p>
-          <a:p>
-            <a:pPr marL="0" indent="0" algn="just">
-              <a:buNone/>
+              <a:t>There are teams with different coaches over the 10 years, however, a few kept the same coach. There are also teams that switched coaches during the season.</a:t>
+            </a:r>
+          </a:p>
+          <a:p>
+            <a:pPr marL="342900" indent="-342900" algn="just">
+              <a:buFont typeface="+mj-lt"/>
+              <a:buAutoNum type="arabicPeriod"/>
             </a:pPr>
             <a:r>
               <a:rPr lang="en-US" sz="1800" dirty="0"/>
-              <a:t>2- The 20 coaches with the higher Win-Loss Ratio.</a:t>
-            </a:r>
-          </a:p>
-          <a:p>
-            <a:pPr marL="0" indent="0" algn="just">
-              <a:buNone/>
+              <a:t>The 20 coaches with the higher Win-Loss Ratio.</a:t>
+            </a:r>
+          </a:p>
+          <a:p>
+            <a:pPr marL="342900" indent="-342900" algn="just">
+              <a:buFont typeface="+mj-lt"/>
+              <a:buAutoNum type="arabicPeriod"/>
             </a:pPr>
             <a:r>
               <a:rPr lang="en-US" sz="1800" dirty="0"/>
-              <a:t>3 – The top 10 players with the most awards won, which suggests us the best players.</a:t>
-            </a:r>
-          </a:p>
-          <a:p>
-            <a:pPr marL="0" indent="0" algn="just">
-              <a:buNone/>
+              <a:t>The top 10 players with the most awards won, which suggests us the best players.</a:t>
+            </a:r>
+          </a:p>
+          <a:p>
+            <a:pPr marL="342900" indent="-342900" algn="just">
+              <a:buFont typeface="+mj-lt"/>
+              <a:buAutoNum type="arabicPeriod"/>
             </a:pPr>
             <a:r>
               <a:rPr lang="en-US" sz="1800" dirty="0"/>
-              <a:t>4 – The number of awards given to players.</a:t>
+              <a:t>The number of awards given to players.</a:t>
             </a:r>
           </a:p>
         </p:txBody>
@@ -14722,7 +14725,7 @@
               <a:t>Using the </a:t>
             </a:r>
             <a:r>
-              <a:rPr lang="en-US" dirty="0" err="1"/>
+              <a:rPr lang="en-US" i="1" dirty="0" err="1"/>
               <a:t>series_post</a:t>
             </a:r>
             <a:r>
@@ -15207,8 +15210,12 @@
           <a:p>
             <a:pPr lvl="1"/>
             <a:r>
+              <a:rPr lang="en-US" b="1" dirty="0"/>
+              <a:t>Pandas</a:t>
+            </a:r>
+            <a:r>
               <a:rPr lang="en-US" dirty="0"/>
-              <a:t>Pandas – Data manipulation by using </a:t>
+              <a:t> – Data manipulation by using </a:t>
             </a:r>
             <a:r>
               <a:rPr lang="en-US" dirty="0" err="1"/>
@@ -15222,18 +15229,22 @@
           <a:p>
             <a:pPr lvl="1"/>
             <a:r>
-              <a:rPr lang="en-US" dirty="0" err="1"/>
+              <a:rPr lang="en-US" b="1" dirty="0" err="1"/>
               <a:t>SciKit</a:t>
             </a:r>
             <a:r>
+              <a:rPr lang="en-US" b="1" dirty="0"/>
+              <a:t> Learn </a:t>
+            </a:r>
+            <a:r>
               <a:rPr lang="en-US" dirty="0"/>
-              <a:t> Learn – Machine  Learning</a:t>
+              <a:t>– Machine  Learning</a:t>
             </a:r>
           </a:p>
           <a:p>
             <a:pPr lvl="1"/>
             <a:r>
-              <a:rPr lang="en-US" dirty="0" err="1"/>
+              <a:rPr lang="en-US" b="1" dirty="0" err="1"/>
               <a:t>Numpy</a:t>
             </a:r>
             <a:r>
@@ -15244,31 +15255,43 @@
           <a:p>
             <a:pPr lvl="1"/>
             <a:r>
+              <a:rPr lang="en-US" b="1" dirty="0" err="1"/>
+              <a:t>MatPlotLib</a:t>
+            </a:r>
+            <a:r>
+              <a:rPr lang="en-US" b="1" dirty="0"/>
+              <a:t> </a:t>
+            </a:r>
+            <a:r>
+              <a:rPr lang="en-US" dirty="0"/>
+              <a:t>– Plot drawing and visualization</a:t>
+            </a:r>
+          </a:p>
+          <a:p>
+            <a:pPr lvl="1"/>
+            <a:r>
+              <a:rPr lang="en-US" b="1" dirty="0"/>
+              <a:t>Seaborn</a:t>
+            </a:r>
+            <a:r>
+              <a:rPr lang="en-US" dirty="0"/>
+              <a:t> – Data visualization integrated with </a:t>
+            </a:r>
+            <a:r>
               <a:rPr lang="en-US" dirty="0" err="1"/>
               <a:t>MatPlotLib</a:t>
             </a:r>
+            <a:endParaRPr lang="en-US" dirty="0"/>
+          </a:p>
+          <a:p>
+            <a:pPr lvl="1"/>
+            <a:r>
+              <a:rPr lang="en-US" b="1" dirty="0"/>
+              <a:t>Math</a:t>
+            </a:r>
             <a:r>
               <a:rPr lang="en-US" dirty="0"/>
-              <a:t> – Plot drawing and visualization</a:t>
-            </a:r>
-          </a:p>
-          <a:p>
-            <a:pPr lvl="1"/>
-            <a:r>
-              <a:rPr lang="en-US" dirty="0"/>
-              <a:t>Seaborn – Data visualization integrated with </a:t>
-            </a:r>
-            <a:r>
-              <a:rPr lang="en-US" dirty="0" err="1"/>
-              <a:t>MatPlotLib</a:t>
-            </a:r>
-            <a:endParaRPr lang="en-US" dirty="0"/>
-          </a:p>
-          <a:p>
-            <a:pPr lvl="1"/>
-            <a:r>
-              <a:rPr lang="en-US" dirty="0"/>
-              <a:t>Math – Mathematical Functions</a:t>
+              <a:t> – Mathematical Functions</a:t>
             </a:r>
           </a:p>
         </p:txBody>
@@ -16952,13 +16975,13 @@
             </a:lvl9pPr>
           </a:lstStyle>
           <a:p>
-            <a:pPr marL="0" indent="0">
-              <a:buFont typeface="Arial" panose="020B0604020202020204" pitchFamily="34" charset="0"/>
-              <a:buNone/>
+            <a:pPr marL="342900" indent="-342900">
+              <a:buFont typeface="+mj-lt"/>
+              <a:buAutoNum type="arabicPeriod" startAt="5"/>
             </a:pPr>
             <a:r>
               <a:rPr lang="en-US" sz="1800" dirty="0"/>
-              <a:t>5 - The correlation matrix of </a:t>
+              <a:t>The correlation matrix of </a:t>
             </a:r>
             <a:r>
               <a:rPr lang="en-US" sz="1800" dirty="0" err="1"/>
@@ -16970,33 +16993,33 @@
             </a:r>
           </a:p>
           <a:p>
-            <a:pPr marL="0" indent="0">
-              <a:buFont typeface="Arial" panose="020B0604020202020204" pitchFamily="34" charset="0"/>
-              <a:buNone/>
+            <a:pPr marL="342900" indent="-342900">
+              <a:buFont typeface="+mj-lt"/>
+              <a:buAutoNum type="arabicPeriod" startAt="5"/>
             </a:pPr>
             <a:r>
               <a:rPr lang="en-US" sz="1800" dirty="0"/>
-              <a:t>6 - Correlation matrix, that shows us the high correlation between weight and height of a player.</a:t>
-            </a:r>
-          </a:p>
-          <a:p>
-            <a:pPr marL="0" indent="0">
-              <a:buFont typeface="Arial" panose="020B0604020202020204" pitchFamily="34" charset="0"/>
-              <a:buNone/>
+              <a:t>Correlation matrix, that shows us the high correlation between weight and height of a player.</a:t>
+            </a:r>
+          </a:p>
+          <a:p>
+            <a:pPr marL="342900" indent="-342900">
+              <a:buFont typeface="+mj-lt"/>
+              <a:buAutoNum type="arabicPeriod" startAt="5"/>
             </a:pPr>
             <a:r>
               <a:rPr lang="en-US" sz="1800" dirty="0"/>
-              <a:t>7 – Playoff appearances per team, show us the teams that are statistically more predictable to advance to playoffs again.</a:t>
-            </a:r>
-          </a:p>
-          <a:p>
-            <a:pPr marL="0" indent="0">
-              <a:buFont typeface="Arial" panose="020B0604020202020204" pitchFamily="34" charset="0"/>
-              <a:buNone/>
+              <a:t>Playoff appearances per team, show us the teams that are statistically more predictable to advance to playoffs again.</a:t>
+            </a:r>
+          </a:p>
+          <a:p>
+            <a:pPr marL="342900" indent="-342900">
+              <a:buFont typeface="+mj-lt"/>
+              <a:buAutoNum type="arabicPeriod" startAt="5"/>
             </a:pPr>
             <a:r>
               <a:rPr lang="en-US" sz="1800" dirty="0"/>
-              <a:t>8 - Playoff Wins per team that shows us the last winners of the playoffs.</a:t>
+              <a:t>Playoff Wins per team that shows us the last winners of the playoffs.</a:t>
             </a:r>
           </a:p>
         </p:txBody>
@@ -17255,7 +17278,23 @@
             </a:pPr>
             <a:r>
               <a:rPr lang="en-US" sz="1800" dirty="0"/>
-              <a:t>This project delves into the domain of basketball tournaments, specifically focusing on the prediction of playoff qualification for teams. Basketball tournaments are traditionally divided into two phases: the regular season, where teams compete to accumulate the highest number of wins and the playoffs, featuring knockout matches for the championship. The objective of this project is to utilize a decade's worth of comprehensive data, encompassing players, teams, coaches, games, and various performance metrics, to forecast which teams will qualify for the playoffs in the forthcoming season.</a:t>
+              <a:t>This project delves into the domain of basketball tournaments, specifically focusing on the </a:t>
+            </a:r>
+            <a:r>
+              <a:rPr lang="en-US" sz="1800" b="1" dirty="0"/>
+              <a:t>prediction of playoff qualification for teams</a:t>
+            </a:r>
+            <a:r>
+              <a:rPr lang="en-US" sz="1800" dirty="0"/>
+              <a:t>. Basketball tournaments are traditionally divided into two phases: the standard season, where teams compete to accumulate the highest number of wins and the playoffs, featuring knockout matches for the championship. The objective of this project is to </a:t>
+            </a:r>
+            <a:r>
+              <a:rPr lang="en-US" sz="1800" b="1" dirty="0"/>
+              <a:t>utilize a decade's worth of comprehensive data</a:t>
+            </a:r>
+            <a:r>
+              <a:rPr lang="en-US" sz="1800" dirty="0"/>
+              <a:t>, encompassing players, teams, coaches, games, and various performance metrics, to forecast which teams will qualify for the playoffs in the forthcoming season.</a:t>
             </a:r>
           </a:p>
           <a:p>
@@ -17269,15 +17308,35 @@
               <a:buNone/>
             </a:pPr>
             <a:r>
+              <a:rPr lang="en-US" sz="1700" b="1" dirty="0">
+                <a:solidFill>
+                  <a:srgbClr val="2A1A00"/>
+                </a:solidFill>
+              </a:rPr>
+              <a:t>DATASET OVERVIEW</a:t>
+            </a:r>
+            <a:r>
+              <a:rPr lang="en-US" sz="1900" dirty="0">
+                <a:solidFill>
+                  <a:srgbClr val="2A1A00"/>
+                </a:solidFill>
+              </a:rPr>
+              <a:t>:</a:t>
+            </a:r>
+          </a:p>
+          <a:p>
+            <a:pPr algn="just"/>
+            <a:r>
               <a:rPr lang="en-US" sz="1800" dirty="0"/>
-              <a:t>Dataset Overview:</a:t>
-            </a:r>
-          </a:p>
-          <a:p>
-            <a:pPr algn="just"/>
+              <a:t>The dataset at hand </a:t>
+            </a:r>
+            <a:r>
+              <a:rPr lang="en-US" sz="1800" b="1" dirty="0"/>
+              <a:t>spans ten years</a:t>
+            </a:r>
             <a:r>
               <a:rPr lang="en-US" sz="1800" dirty="0"/>
-              <a:t>The dataset at hand spans ten years, providing a rich and extensive repository of information relevant to basketball tournaments. It includes detailed player statistics and respective awards, team performance metrics, coaching data, and game-specific information. Furthermore, the dataset also provides data on the team's performance both in the season and in the post-season.</a:t>
+              <a:t>, providing a rich and extensive repository of information relevant to basketball tournaments. It includes detailed player statistics and respective awards, team performance metrics, coaching data, and game-specific information. Furthermore, the dataset also provides data on the team's performance both in the season and in the post-season.</a:t>
             </a:r>
           </a:p>
           <a:p>
@@ -17382,37 +17441,65 @@
           <a:p>
             <a:pPr algn="just"/>
             <a:r>
+              <a:rPr lang="en-US" b="1" dirty="0"/>
+              <a:t>Feature Engineering </a:t>
+            </a:r>
+            <a:r>
               <a:rPr lang="en-US" dirty="0"/>
-              <a:t>Feature Engineering in the different tables: creation, removal, and transformation of features</a:t>
+              <a:t>in the different tables: creation, removal, and transformation of features.</a:t>
             </a:r>
           </a:p>
           <a:p>
             <a:pPr algn="just"/>
             <a:r>
+              <a:rPr lang="en-US" b="1" dirty="0"/>
+              <a:t>Prediction</a:t>
+            </a:r>
+            <a:r>
               <a:rPr lang="en-US" dirty="0"/>
-              <a:t>Prediction of some player evaluation metrics like Efficiency (EFF) and </a:t>
-            </a:r>
-            <a:r>
-              <a:rPr lang="en-GB" dirty="0"/>
+              <a:t> of well-known player evaluation metrics, such as, </a:t>
+            </a:r>
+            <a:r>
+              <a:rPr lang="en-US" b="1" dirty="0"/>
+              <a:t>Efficiency (EFF) </a:t>
+            </a:r>
+            <a:r>
+              <a:rPr lang="en-US" dirty="0"/>
+              <a:t>and </a:t>
+            </a:r>
+            <a:r>
+              <a:rPr lang="en-GB" b="1" dirty="0"/>
               <a:t>Defensive Player Rating (DPR)</a:t>
             </a:r>
             <a:r>
               <a:rPr lang="en-US" dirty="0"/>
-              <a:t> that reflect the player’s performance in the upcoming season</a:t>
+              <a:t> that reflect the player’s performance in the upcoming season.</a:t>
             </a:r>
           </a:p>
           <a:p>
             <a:pPr algn="just"/>
             <a:r>
+              <a:rPr lang="en-US" b="1" dirty="0"/>
+              <a:t>Prediction of every teams’ results</a:t>
+            </a:r>
+            <a:r>
               <a:rPr lang="en-US" dirty="0"/>
-              <a:t>Prediction of the team’s results, according to the statistics of the players that are part of it</a:t>
+              <a:t>, according to the previously predicted statistics of their players.</a:t>
             </a:r>
           </a:p>
           <a:p>
             <a:pPr algn="just"/>
             <a:r>
               <a:rPr lang="en-US" dirty="0"/>
-              <a:t>Comparison between team’s results and choice of the best 8 teams for qualification</a:t>
+              <a:t>Comparison between teams’ results and </a:t>
+            </a:r>
+            <a:r>
+              <a:rPr lang="en-US" b="1" dirty="0"/>
+              <a:t>choice of the best 8 teams </a:t>
+            </a:r>
+            <a:r>
+              <a:rPr lang="en-US" dirty="0"/>
+              <a:t>for qualification.</a:t>
             </a:r>
           </a:p>
         </p:txBody>
@@ -17504,243 +17591,279 @@
         <p:spPr>
           <a:xfrm>
             <a:off x="1251678" y="1632204"/>
-            <a:ext cx="10178322" cy="3593591"/>
+            <a:ext cx="10178322" cy="4704801"/>
           </a:xfrm>
         </p:spPr>
         <p:txBody>
           <a:bodyPr>
-            <a:normAutofit fontScale="92500" lnSpcReduction="10000"/>
+            <a:normAutofit/>
           </a:bodyPr>
           <a:lstStyle/>
           <a:p>
+            <a:pPr marL="0" indent="0" algn="just">
+              <a:buNone/>
+            </a:pPr>
+            <a:r>
+              <a:rPr lang="en-US" sz="1400" b="1" dirty="0">
+                <a:solidFill>
+                  <a:srgbClr val="2A1A00"/>
+                </a:solidFill>
+              </a:rPr>
+              <a:t>TABLE</a:t>
+            </a:r>
+            <a:r>
+              <a:rPr lang="en-US" sz="1400" dirty="0">
+                <a:solidFill>
+                  <a:srgbClr val="2A1A00"/>
+                </a:solidFill>
+              </a:rPr>
+              <a:t> </a:t>
+            </a:r>
+            <a:r>
+              <a:rPr lang="en-US" sz="1400" i="1" dirty="0">
+                <a:solidFill>
+                  <a:srgbClr val="2A1A00"/>
+                </a:solidFill>
+              </a:rPr>
+              <a:t>player</a:t>
+            </a:r>
+          </a:p>
+          <a:p>
             <a:pPr algn="just"/>
             <a:r>
-              <a:rPr lang="en-US" sz="1800" dirty="0"/>
-              <a:t>Drop irrelevant features on the player's table (</a:t>
-            </a:r>
-            <a:r>
-              <a:rPr lang="en-US" sz="1800" dirty="0" err="1"/>
+              <a:rPr lang="en-US" sz="1400" dirty="0"/>
+              <a:t>Drop irrelevant features: </a:t>
+            </a:r>
+            <a:r>
+              <a:rPr lang="en-US" sz="1400" dirty="0" err="1"/>
               <a:t>deathDate</a:t>
             </a:r>
             <a:r>
-              <a:rPr lang="en-US" sz="1800" dirty="0"/>
+              <a:rPr lang="en-US" sz="1400" dirty="0"/>
               <a:t>, </a:t>
             </a:r>
             <a:r>
-              <a:rPr lang="en-US" sz="1800" dirty="0" err="1"/>
+              <a:rPr lang="en-US" sz="1400" dirty="0" err="1"/>
               <a:t>NaN</a:t>
             </a:r>
             <a:r>
-              <a:rPr lang="en-US" sz="1800" dirty="0"/>
+              <a:rPr lang="en-US" sz="1400" dirty="0"/>
               <a:t> pos, </a:t>
             </a:r>
             <a:r>
-              <a:rPr lang="en-US" sz="1800" dirty="0" err="1"/>
+              <a:rPr lang="en-US" sz="1400" dirty="0" err="1"/>
               <a:t>firstSeason</a:t>
             </a:r>
             <a:r>
-              <a:rPr lang="en-US" sz="1800" dirty="0"/>
+              <a:rPr lang="en-US" sz="1400" dirty="0"/>
               <a:t>, </a:t>
             </a:r>
             <a:r>
-              <a:rPr lang="en-US" sz="1800" dirty="0" err="1"/>
+              <a:rPr lang="en-US" sz="1400" dirty="0" err="1"/>
               <a:t>lastSeason</a:t>
             </a:r>
             <a:r>
-              <a:rPr lang="en-US" sz="1800" dirty="0"/>
-              <a:t>)</a:t>
+              <a:rPr lang="en-US" sz="1400" dirty="0"/>
+              <a:t>;</a:t>
             </a:r>
           </a:p>
           <a:p>
             <a:pPr algn="just"/>
             <a:r>
-              <a:rPr lang="en-US" sz="1800" dirty="0"/>
+              <a:rPr lang="en-US" sz="1400" dirty="0"/>
               <a:t>Drop players whose </a:t>
             </a:r>
             <a:r>
-              <a:rPr lang="en-US" sz="1800" dirty="0" err="1"/>
+              <a:rPr lang="en-US" sz="1400" dirty="0" err="1"/>
               <a:t>birthDate</a:t>
             </a:r>
             <a:r>
-              <a:rPr lang="en-US" sz="1800" dirty="0"/>
-              <a:t> = 0000-00-00 </a:t>
+              <a:rPr lang="en-US" sz="1400" dirty="0"/>
+              <a:t> = 0000-00-00;</a:t>
             </a:r>
           </a:p>
           <a:p>
             <a:pPr algn="just"/>
             <a:r>
-              <a:rPr lang="en-US" sz="1800" dirty="0"/>
-              <a:t>Mapping colleges’ names and player’s positions to numerical indexes on  the players' table</a:t>
+              <a:rPr lang="en-US" sz="1400" dirty="0"/>
+              <a:t>Mapping colleges’ names and player’s positions to numerical indexes;</a:t>
             </a:r>
           </a:p>
           <a:p>
             <a:pPr algn="just"/>
             <a:r>
-              <a:rPr lang="en-US" sz="1800" dirty="0"/>
+              <a:rPr lang="en-US" sz="1400" dirty="0"/>
               <a:t>Update </a:t>
             </a:r>
             <a:r>
-              <a:rPr lang="en-US" sz="1800" dirty="0" err="1"/>
+              <a:rPr lang="en-US" sz="1400" dirty="0" err="1"/>
               <a:t>birthDate</a:t>
             </a:r>
             <a:r>
-              <a:rPr lang="en-US" sz="1800" dirty="0"/>
+              <a:rPr lang="en-US" sz="1400" dirty="0"/>
               <a:t> to </a:t>
             </a:r>
             <a:r>
-              <a:rPr lang="en-US" sz="1800" dirty="0" err="1"/>
+              <a:rPr lang="en-US" sz="1400" dirty="0" err="1"/>
               <a:t>birthYear</a:t>
             </a:r>
             <a:r>
-              <a:rPr lang="en-US" sz="1800" dirty="0"/>
-              <a:t> (day and month are irrelevant for our goal)</a:t>
+              <a:rPr lang="en-US" sz="1400" dirty="0"/>
+              <a:t> (day and month are irrelevant for our goal);</a:t>
             </a:r>
           </a:p>
           <a:p>
             <a:pPr algn="just"/>
             <a:r>
-              <a:rPr lang="en-US" sz="1800" dirty="0"/>
+              <a:rPr lang="en-US" sz="1400" dirty="0"/>
               <a:t>Merge table awards with players, and then add a new attribute </a:t>
             </a:r>
             <a:r>
-              <a:rPr lang="en-US" sz="1800" dirty="0" err="1"/>
+              <a:rPr lang="en-US" sz="1400" dirty="0" err="1"/>
               <a:t>awards_count</a:t>
             </a:r>
             <a:r>
-              <a:rPr lang="en-US" sz="1800" dirty="0"/>
-              <a:t> for each player</a:t>
+              <a:rPr lang="en-US" sz="1400" dirty="0"/>
+              <a:t> for each player.</a:t>
             </a:r>
           </a:p>
           <a:p>
             <a:pPr algn="just"/>
-            <a:r>
-              <a:rPr lang="en-US" sz="1800" dirty="0"/>
-              <a:t>Feature Engineering for </a:t>
-            </a:r>
-            <a:r>
-              <a:rPr lang="en-US" sz="1800" dirty="0" err="1"/>
+            <a:endParaRPr lang="en-US" sz="1400" dirty="0"/>
+          </a:p>
+          <a:p>
+            <a:pPr marL="0" indent="0" algn="just">
+              <a:buNone/>
+            </a:pPr>
+            <a:r>
+              <a:rPr lang="en-US" sz="1400" b="1" dirty="0">
+                <a:solidFill>
+                  <a:srgbClr val="2A1A00"/>
+                </a:solidFill>
+              </a:rPr>
+              <a:t>TABLE</a:t>
+            </a:r>
+            <a:r>
+              <a:rPr lang="en-US" sz="1400" dirty="0">
+                <a:solidFill>
+                  <a:srgbClr val="2A1A00"/>
+                </a:solidFill>
+              </a:rPr>
+              <a:t> </a:t>
+            </a:r>
+            <a:r>
+              <a:rPr lang="en-US" sz="1400" i="1" dirty="0" err="1">
+                <a:solidFill>
+                  <a:srgbClr val="2A1A00"/>
+                </a:solidFill>
+              </a:rPr>
               <a:t>players_teams</a:t>
             </a:r>
-            <a:r>
-              <a:rPr lang="en-US" sz="1800" dirty="0"/>
-              <a:t> table (Creation of ‘EFF’, ‘DPR’, ‘</a:t>
-            </a:r>
-            <a:r>
-              <a:rPr lang="en-US" sz="1800" dirty="0" err="1"/>
+            <a:endParaRPr lang="en-US" sz="1400" dirty="0"/>
+          </a:p>
+          <a:p>
+            <a:pPr algn="just"/>
+            <a:r>
+              <a:rPr lang="en-US" sz="1400" dirty="0"/>
+              <a:t>Feature Engineering (Creation of ‘EFF’, ‘DPR’, ‘</a:t>
+            </a:r>
+            <a:r>
+              <a:rPr lang="en-US" sz="1400" dirty="0" err="1"/>
               <a:t>FG_Percentage</a:t>
             </a:r>
             <a:r>
-              <a:rPr lang="en-US" sz="1800" dirty="0"/>
+              <a:rPr lang="en-US" sz="1400" dirty="0"/>
               <a:t>,’ ‘</a:t>
             </a:r>
             <a:r>
-              <a:rPr lang="en-US" sz="1800" dirty="0" err="1"/>
+              <a:rPr lang="en-US" sz="1400" dirty="0" err="1"/>
               <a:t>FT_Percentage</a:t>
             </a:r>
             <a:r>
-              <a:rPr lang="en-US" sz="1800" dirty="0"/>
+              <a:rPr lang="en-US" sz="1400" dirty="0"/>
               <a:t>’ and ‘PPG’ and drop the rows with null values of '</a:t>
             </a:r>
             <a:r>
-              <a:rPr lang="en-US" sz="1800" dirty="0" err="1"/>
+              <a:rPr lang="en-US" sz="1400" dirty="0" err="1"/>
               <a:t>FG_Percentage</a:t>
             </a:r>
             <a:r>
-              <a:rPr lang="en-US" sz="1800" dirty="0"/>
+              <a:rPr lang="en-US" sz="1400" dirty="0"/>
               <a:t>', '</a:t>
             </a:r>
             <a:r>
-              <a:rPr lang="en-US" sz="1800" dirty="0" err="1"/>
+              <a:rPr lang="en-US" sz="1400" dirty="0" err="1"/>
               <a:t>FT_Percentage</a:t>
             </a:r>
             <a:r>
-              <a:rPr lang="en-US" sz="1800" dirty="0"/>
-              <a:t>', 'PPG’)</a:t>
+              <a:rPr lang="en-US" sz="1400" dirty="0"/>
+              <a:t>', 'PPG’);</a:t>
             </a:r>
           </a:p>
           <a:p>
             <a:pPr algn="just"/>
             <a:r>
-              <a:rPr lang="en-US" sz="1800" dirty="0"/>
+              <a:rPr lang="en-US" sz="1400" dirty="0"/>
               <a:t>Merge </a:t>
             </a:r>
             <a:r>
-              <a:rPr lang="en-US" sz="1800" dirty="0" err="1"/>
+              <a:rPr lang="en-US" sz="1400" i="1" dirty="0" err="1"/>
               <a:t>players_teams</a:t>
             </a:r>
             <a:r>
-              <a:rPr lang="en-US" sz="1800" dirty="0"/>
-              <a:t> with players by </a:t>
-            </a:r>
-            <a:r>
-              <a:rPr lang="en-US" sz="1800" dirty="0" err="1"/>
+              <a:rPr lang="en-US" sz="1400" i="1" dirty="0"/>
+              <a:t> </a:t>
+            </a:r>
+            <a:r>
+              <a:rPr lang="en-US" sz="1400" dirty="0"/>
+              <a:t>with </a:t>
+            </a:r>
+            <a:r>
+              <a:rPr lang="en-US" sz="1400" i="1" dirty="0"/>
+              <a:t>players</a:t>
+            </a:r>
+            <a:r>
+              <a:rPr lang="en-US" sz="1400" dirty="0"/>
+              <a:t> by </a:t>
+            </a:r>
+            <a:r>
+              <a:rPr lang="en-US" sz="1400" dirty="0" err="1"/>
               <a:t>playerID</a:t>
             </a:r>
             <a:r>
-              <a:rPr lang="en-US" sz="1800" dirty="0"/>
-              <a:t> (it’s the same as </a:t>
-            </a:r>
-            <a:r>
-              <a:rPr lang="en-US" sz="1800" dirty="0" err="1"/>
+              <a:rPr lang="en-US" sz="1400" dirty="0"/>
+              <a:t> (</a:t>
+            </a:r>
+            <a:r>
+              <a:rPr lang="en-US" sz="1400" dirty="0" err="1"/>
+              <a:t>playerID</a:t>
+            </a:r>
+            <a:r>
+              <a:rPr lang="en-US" sz="1400" dirty="0"/>
+              <a:t> matches </a:t>
+            </a:r>
+            <a:r>
+              <a:rPr lang="en-US" sz="1400" dirty="0" err="1"/>
               <a:t>bioID</a:t>
             </a:r>
             <a:r>
-              <a:rPr lang="en-US" sz="1800" dirty="0"/>
-              <a:t> present on players)</a:t>
+              <a:rPr lang="en-US" sz="1400" dirty="0"/>
+              <a:t> column present on </a:t>
+            </a:r>
+            <a:r>
+              <a:rPr lang="en-US" sz="1400" i="1" dirty="0"/>
+              <a:t>player</a:t>
+            </a:r>
+            <a:r>
+              <a:rPr lang="en-US" sz="1400" dirty="0"/>
+              <a:t>);</a:t>
             </a:r>
           </a:p>
           <a:p>
             <a:pPr algn="just"/>
             <a:r>
-              <a:rPr lang="en-US" sz="1800" dirty="0"/>
-              <a:t>Drop </a:t>
-            </a:r>
-            <a:r>
-              <a:rPr lang="en-US" sz="1800" dirty="0" err="1"/>
-              <a:t>lgIDLoser</a:t>
-            </a:r>
-            <a:r>
-              <a:rPr lang="en-US" sz="1800" dirty="0"/>
-              <a:t> and </a:t>
-            </a:r>
-            <a:r>
-              <a:rPr lang="en-US" sz="1800" dirty="0" err="1"/>
-              <a:t>lgIDWinner</a:t>
-            </a:r>
-            <a:r>
-              <a:rPr lang="en-US" sz="1800" dirty="0"/>
-              <a:t> (not relevant) in </a:t>
-            </a:r>
-            <a:r>
-              <a:rPr lang="en-US" sz="1800" dirty="0" err="1"/>
-              <a:t>series_post</a:t>
-            </a:r>
-            <a:r>
-              <a:rPr lang="en-US" sz="1800" dirty="0"/>
-              <a:t> and update ‘W’ and ‘L’ to percentages</a:t>
-            </a:r>
-          </a:p>
-          <a:p>
-            <a:pPr algn="just"/>
-            <a:r>
-              <a:rPr lang="en-US" sz="1800" dirty="0"/>
-              <a:t>Creation of new columns on table coaches (‘</a:t>
-            </a:r>
-            <a:r>
-              <a:rPr lang="en-US" sz="1800" dirty="0" err="1"/>
-              <a:t>WLRatio</a:t>
-            </a:r>
-            <a:r>
-              <a:rPr lang="en-US" sz="1800" dirty="0"/>
-              <a:t>’ and ‘</a:t>
-            </a:r>
-            <a:r>
-              <a:rPr lang="en-US" sz="1800" dirty="0" err="1"/>
-              <a:t>WLRatio_Post</a:t>
-            </a:r>
-            <a:r>
-              <a:rPr lang="en-US" sz="1800" dirty="0"/>
-              <a:t>’)</a:t>
+              <a:rPr lang="en-US" sz="1400" dirty="0"/>
+              <a:t>Creation of lagged features to be used with the prediction models.</a:t>
             </a:r>
           </a:p>
         </p:txBody>
@@ -17832,85 +17955,249 @@
         <p:spPr>
           <a:xfrm>
             <a:off x="1251678" y="1793411"/>
-            <a:ext cx="10178322" cy="3593591"/>
+            <a:ext cx="10178322" cy="4536505"/>
           </a:xfrm>
         </p:spPr>
         <p:txBody>
-          <a:bodyPr/>
+          <a:bodyPr>
+            <a:normAutofit/>
+          </a:bodyPr>
           <a:lstStyle/>
           <a:p>
+            <a:pPr marL="0" indent="0" algn="just">
+              <a:buNone/>
+            </a:pPr>
+            <a:r>
+              <a:rPr lang="en-US" sz="1400" b="1" dirty="0">
+                <a:solidFill>
+                  <a:srgbClr val="2A1A00"/>
+                </a:solidFill>
+              </a:rPr>
+              <a:t>TABLE</a:t>
+            </a:r>
+            <a:r>
+              <a:rPr lang="en-US" sz="1400" dirty="0">
+                <a:solidFill>
+                  <a:srgbClr val="2A1A00"/>
+                </a:solidFill>
+              </a:rPr>
+              <a:t> </a:t>
+            </a:r>
+            <a:r>
+              <a:rPr lang="en-US" sz="1400" i="1" dirty="0" err="1">
+                <a:solidFill>
+                  <a:srgbClr val="2A1A00"/>
+                </a:solidFill>
+              </a:rPr>
+              <a:t>series_post</a:t>
+            </a:r>
+            <a:endParaRPr lang="en-US" sz="1400" dirty="0"/>
+          </a:p>
+          <a:p>
             <a:pPr algn="just"/>
             <a:r>
-              <a:rPr lang="en-US" dirty="0"/>
-              <a:t>Feature Engineering related to score on table teams (creation of ‘</a:t>
-            </a:r>
-            <a:r>
-              <a:rPr lang="en-US" dirty="0" err="1"/>
+              <a:rPr lang="en-US" sz="1400" dirty="0"/>
+              <a:t>Drop </a:t>
+            </a:r>
+            <a:r>
+              <a:rPr lang="en-US" sz="1400" dirty="0" err="1"/>
+              <a:t>lgIDLoser</a:t>
+            </a:r>
+            <a:r>
+              <a:rPr lang="en-US" sz="1400" dirty="0"/>
+              <a:t> and </a:t>
+            </a:r>
+            <a:r>
+              <a:rPr lang="en-US" sz="1400" dirty="0" err="1"/>
+              <a:t>lgIDWinner</a:t>
+            </a:r>
+            <a:r>
+              <a:rPr lang="en-US" sz="1400" dirty="0"/>
+              <a:t> (not relevant) and update ‘W’ and ‘L’ to percentages.</a:t>
+            </a:r>
+          </a:p>
+          <a:p>
+            <a:pPr algn="just"/>
+            <a:endParaRPr lang="en-US" sz="1400" dirty="0"/>
+          </a:p>
+          <a:p>
+            <a:pPr marL="0" indent="0" algn="just">
+              <a:buNone/>
+            </a:pPr>
+            <a:r>
+              <a:rPr lang="en-US" sz="1400" b="1" dirty="0">
+                <a:solidFill>
+                  <a:srgbClr val="2A1A00"/>
+                </a:solidFill>
+              </a:rPr>
+              <a:t>TABLE</a:t>
+            </a:r>
+            <a:r>
+              <a:rPr lang="en-US" sz="1400" dirty="0">
+                <a:solidFill>
+                  <a:srgbClr val="2A1A00"/>
+                </a:solidFill>
+              </a:rPr>
+              <a:t> </a:t>
+            </a:r>
+            <a:r>
+              <a:rPr lang="en-US" sz="1400" i="1" dirty="0">
+                <a:solidFill>
+                  <a:srgbClr val="2A1A00"/>
+                </a:solidFill>
+              </a:rPr>
+              <a:t>coaches</a:t>
+            </a:r>
+            <a:endParaRPr lang="en-US" sz="1400" dirty="0"/>
+          </a:p>
+          <a:p>
+            <a:pPr algn="just"/>
+            <a:r>
+              <a:rPr lang="en-US" sz="1400" dirty="0"/>
+              <a:t>Creation of new columns on table </a:t>
+            </a:r>
+            <a:r>
+              <a:rPr lang="en-US" sz="1400" i="1" dirty="0"/>
+              <a:t>coaches</a:t>
+            </a:r>
+            <a:r>
+              <a:rPr lang="en-US" sz="1400" dirty="0"/>
+              <a:t> (‘</a:t>
+            </a:r>
+            <a:r>
+              <a:rPr lang="en-US" sz="1400" dirty="0" err="1"/>
+              <a:t>WLRatio</a:t>
+            </a:r>
+            <a:r>
+              <a:rPr lang="en-US" sz="1400" dirty="0"/>
+              <a:t>’ and ‘</a:t>
+            </a:r>
+            <a:r>
+              <a:rPr lang="en-US" sz="1400" dirty="0" err="1"/>
+              <a:t>WLRatio_Post</a:t>
+            </a:r>
+            <a:r>
+              <a:rPr lang="en-US" sz="1400" dirty="0"/>
+              <a:t>’).</a:t>
+            </a:r>
+          </a:p>
+          <a:p>
+            <a:pPr marL="0" indent="0" algn="just">
+              <a:buNone/>
+            </a:pPr>
+            <a:endParaRPr lang="en-US" sz="1400" b="1" dirty="0">
+              <a:solidFill>
+                <a:srgbClr val="2A1A00"/>
+              </a:solidFill>
+            </a:endParaRPr>
+          </a:p>
+          <a:p>
+            <a:pPr marL="0" indent="0" algn="just">
+              <a:buNone/>
+            </a:pPr>
+            <a:r>
+              <a:rPr lang="en-US" sz="1400" b="1" dirty="0">
+                <a:solidFill>
+                  <a:srgbClr val="2A1A00"/>
+                </a:solidFill>
+              </a:rPr>
+              <a:t>TABLE</a:t>
+            </a:r>
+            <a:r>
+              <a:rPr lang="en-US" sz="1400" dirty="0">
+                <a:solidFill>
+                  <a:srgbClr val="2A1A00"/>
+                </a:solidFill>
+              </a:rPr>
+              <a:t> </a:t>
+            </a:r>
+            <a:r>
+              <a:rPr lang="en-US" sz="1400" i="1" dirty="0">
+                <a:solidFill>
+                  <a:srgbClr val="2A1A00"/>
+                </a:solidFill>
+              </a:rPr>
+              <a:t>teams</a:t>
+            </a:r>
+            <a:endParaRPr lang="en-US" sz="1400" dirty="0"/>
+          </a:p>
+          <a:p>
+            <a:pPr algn="just"/>
+            <a:r>
+              <a:rPr lang="en-US" sz="1400" dirty="0"/>
+              <a:t>Feature Engineering related to score (creation of ‘</a:t>
+            </a:r>
+            <a:r>
+              <a:rPr lang="en-US" sz="1400" dirty="0" err="1"/>
               <a:t>PredictedTeamScore</a:t>
             </a:r>
             <a:r>
-              <a:rPr lang="en-US" dirty="0"/>
+              <a:rPr lang="en-US" sz="1400" dirty="0"/>
               <a:t>’ and ‘</a:t>
             </a:r>
             <a:r>
-              <a:rPr lang="en-US" dirty="0" err="1"/>
+              <a:rPr lang="en-US" sz="1400" dirty="0" err="1"/>
               <a:t>RealTeamScore</a:t>
             </a:r>
             <a:r>
-              <a:rPr lang="en-US" dirty="0"/>
-              <a:t>’)</a:t>
+              <a:rPr lang="en-US" sz="1400" dirty="0"/>
+              <a:t>’);</a:t>
             </a:r>
           </a:p>
           <a:p>
             <a:pPr algn="just"/>
             <a:r>
-              <a:rPr lang="en-US" dirty="0"/>
-              <a:t>More Feature Engineering on table teams (‘progress’, ‘</a:t>
-            </a:r>
-            <a:r>
-              <a:rPr lang="en-US" dirty="0" err="1"/>
+              <a:rPr lang="en-US" sz="1400" dirty="0"/>
+              <a:t>More Feature Engineering (‘progress’, ‘</a:t>
+            </a:r>
+            <a:r>
+              <a:rPr lang="en-US" sz="1400" dirty="0" err="1"/>
               <a:t>offensive_performance</a:t>
             </a:r>
             <a:r>
-              <a:rPr lang="en-US" dirty="0"/>
+              <a:rPr lang="en-US" sz="1400" dirty="0"/>
               <a:t>’ and ‘</a:t>
             </a:r>
             <a:r>
-              <a:rPr lang="en-US" dirty="0" err="1"/>
+              <a:rPr lang="en-US" sz="1400" dirty="0" err="1"/>
               <a:t>defensive_performance</a:t>
             </a:r>
             <a:r>
-              <a:rPr lang="en-US" dirty="0"/>
-              <a:t>’, …)</a:t>
+              <a:rPr lang="en-US" sz="1400" dirty="0"/>
+              <a:t>’, …);</a:t>
             </a:r>
           </a:p>
           <a:p>
             <a:pPr algn="just"/>
             <a:r>
-              <a:rPr lang="en-US" dirty="0"/>
-              <a:t>Merge of tables coaches and teams</a:t>
+              <a:rPr lang="en-US" sz="1400" dirty="0"/>
+              <a:t>Merge of table </a:t>
+            </a:r>
+            <a:r>
+              <a:rPr lang="en-US" sz="1400" i="1" dirty="0"/>
+              <a:t>coaches</a:t>
+            </a:r>
+            <a:r>
+              <a:rPr lang="en-US" sz="1400" dirty="0"/>
+              <a:t> with </a:t>
+            </a:r>
+            <a:r>
+              <a:rPr lang="en-US" sz="1400" i="1" dirty="0"/>
+              <a:t>teams;</a:t>
             </a:r>
           </a:p>
           <a:p>
             <a:pPr algn="just"/>
             <a:r>
-              <a:rPr lang="en-US" dirty="0"/>
-              <a:t>Mapping of the playoff qualification (in table teams) to Boolean values (‘Y’=1 and ‘N’=0)</a:t>
+              <a:rPr lang="en-US" sz="1400" dirty="0"/>
+              <a:t>Mapping of the playoff qualification to Boolean values (‘Y’=1 and ‘N’=0);</a:t>
             </a:r>
           </a:p>
           <a:p>
             <a:pPr algn="just"/>
             <a:r>
-              <a:rPr lang="en-US" dirty="0"/>
-              <a:t>Creation of lagged features that will be used on the models, named on tables </a:t>
-            </a:r>
-            <a:r>
-              <a:rPr lang="en-US" dirty="0" err="1"/>
-              <a:t>players_teams</a:t>
-            </a:r>
-            <a:r>
-              <a:rPr lang="en-US" dirty="0"/>
-              <a:t> and teams</a:t>
+              <a:rPr lang="en-US" sz="1400" dirty="0"/>
+              <a:t>Creation of lagged features to be used with the prediction models.</a:t>
             </a:r>
           </a:p>
         </p:txBody>
@@ -18019,12 +18306,16 @@
           <a:p>
             <a:pPr lvl="1" algn="just"/>
             <a:r>
-              <a:rPr lang="en-GB" dirty="0"/>
+              <a:rPr lang="en-GB" i="1" dirty="0"/>
               <a:t>p</a:t>
             </a:r>
             <a:r>
+              <a:rPr lang="en-PT" i="1" dirty="0"/>
+              <a:t>layers_teams </a:t>
+            </a:r>
+            <a:r>
               <a:rPr lang="en-PT" dirty="0"/>
-              <a:t>layers_teams - </a:t>
+              <a:t>- </a:t>
             </a:r>
             <a:r>
               <a:rPr lang="en-GB" dirty="0">
@@ -18151,12 +18442,16 @@
           <a:p>
             <a:pPr lvl="1" algn="just"/>
             <a:r>
-              <a:rPr lang="en-GB" dirty="0"/>
+              <a:rPr lang="en-GB" i="1" dirty="0"/>
               <a:t>t</a:t>
             </a:r>
             <a:r>
+              <a:rPr lang="en-PT" i="1" dirty="0"/>
+              <a:t>eams </a:t>
+            </a:r>
+            <a:r>
               <a:rPr lang="en-PT" dirty="0"/>
-              <a:t>eams - </a:t>
+              <a:t>- </a:t>
             </a:r>
             <a:r>
               <a:rPr lang="en-GB" dirty="0">
@@ -18454,7 +18749,29 @@
             <a:pPr algn="just"/>
             <a:r>
               <a:rPr lang="en-US" dirty="0"/>
-              <a:t>For each year we added the information of the X previous years, being X, the size of the sliding window used for testing (better explained in slide 21).</a:t>
+              <a:t>For each year we added the information of the X previous years, being X, the size of the sliding window used for testing (see annex: </a:t>
+            </a:r>
+            <a:r>
+              <a:rPr lang="en-US" u="sng" dirty="0">
+                <a:solidFill>
+                  <a:schemeClr val="tx2">
+                    <a:lumMod val="90000"/>
+                    <a:lumOff val="10000"/>
+                  </a:schemeClr>
+                </a:solidFill>
+                <a:hlinkClick r:id="rId2" action="ppaction://hlinksldjump">
+                  <a:extLst>
+                    <a:ext uri="{A12FA001-AC4F-418D-AE19-62706E023703}">
+                      <ahyp:hlinkClr xmlns:ahyp="http://schemas.microsoft.com/office/drawing/2018/hyperlinkcolor" val="tx"/>
+                    </a:ext>
+                  </a:extLst>
+                </a:hlinkClick>
+              </a:rPr>
+              <a:t>slide 21</a:t>
+            </a:r>
+            <a:r>
+              <a:rPr lang="en-US" dirty="0"/>
+              <a:t>).</a:t>
             </a:r>
           </a:p>
           <a:p>

</xml_diff>

<commit_message>
changed ppt and added legend file
</commit_message>
<xml_diff>
--- a/ppt projeto.pptx
+++ b/ppt projeto.pptx
@@ -1359,7 +1359,7 @@
           <a:p>
             <a:fld id="{A73D0D99-86C5-4560-B8F4-5530516C9A59}" type="datetimeFigureOut">
               <a:rPr lang="pt-PT" smtClean="0"/>
-              <a:t>06/12/2023</a:t>
+              <a:t>07/12/2023</a:t>
             </a:fld>
             <a:endParaRPr lang="pt-PT"/>
           </a:p>
@@ -1597,7 +1597,7 @@
           <a:p>
             <a:fld id="{A73D0D99-86C5-4560-B8F4-5530516C9A59}" type="datetimeFigureOut">
               <a:rPr lang="pt-PT" smtClean="0"/>
-              <a:t>06/12/2023</a:t>
+              <a:t>07/12/2023</a:t>
             </a:fld>
             <a:endParaRPr lang="pt-PT"/>
           </a:p>
@@ -1777,7 +1777,7 @@
           <a:p>
             <a:fld id="{A73D0D99-86C5-4560-B8F4-5530516C9A59}" type="datetimeFigureOut">
               <a:rPr lang="pt-PT" smtClean="0"/>
-              <a:t>06/12/2023</a:t>
+              <a:t>07/12/2023</a:t>
             </a:fld>
             <a:endParaRPr lang="pt-PT"/>
           </a:p>
@@ -1947,7 +1947,7 @@
           <a:p>
             <a:fld id="{A73D0D99-86C5-4560-B8F4-5530516C9A59}" type="datetimeFigureOut">
               <a:rPr lang="pt-PT" smtClean="0"/>
-              <a:t>06/12/2023</a:t>
+              <a:t>07/12/2023</a:t>
             </a:fld>
             <a:endParaRPr lang="pt-PT"/>
           </a:p>
@@ -2223,7 +2223,7 @@
           <a:p>
             <a:fld id="{A73D0D99-86C5-4560-B8F4-5530516C9A59}" type="datetimeFigureOut">
               <a:rPr lang="pt-PT" smtClean="0"/>
-              <a:t>06/12/2023</a:t>
+              <a:t>07/12/2023</a:t>
             </a:fld>
             <a:endParaRPr lang="pt-PT"/>
           </a:p>
@@ -3424,7 +3424,7 @@
           <a:p>
             <a:fld id="{A73D0D99-86C5-4560-B8F4-5530516C9A59}" type="datetimeFigureOut">
               <a:rPr lang="pt-PT" smtClean="0"/>
-              <a:t>06/12/2023</a:t>
+              <a:t>07/12/2023</a:t>
             </a:fld>
             <a:endParaRPr lang="pt-PT"/>
           </a:p>
@@ -3814,7 +3814,7 @@
           <a:p>
             <a:fld id="{A73D0D99-86C5-4560-B8F4-5530516C9A59}" type="datetimeFigureOut">
               <a:rPr lang="pt-PT" smtClean="0"/>
-              <a:t>06/12/2023</a:t>
+              <a:t>07/12/2023</a:t>
             </a:fld>
             <a:endParaRPr lang="pt-PT"/>
           </a:p>
@@ -3937,7 +3937,7 @@
           <a:p>
             <a:fld id="{A73D0D99-86C5-4560-B8F4-5530516C9A59}" type="datetimeFigureOut">
               <a:rPr lang="pt-PT" smtClean="0"/>
-              <a:t>06/12/2023</a:t>
+              <a:t>07/12/2023</a:t>
             </a:fld>
             <a:endParaRPr lang="pt-PT"/>
           </a:p>
@@ -4032,7 +4032,7 @@
           <a:p>
             <a:fld id="{A73D0D99-86C5-4560-B8F4-5530516C9A59}" type="datetimeFigureOut">
               <a:rPr lang="pt-PT" smtClean="0"/>
-              <a:t>06/12/2023</a:t>
+              <a:t>07/12/2023</a:t>
             </a:fld>
             <a:endParaRPr lang="pt-PT"/>
           </a:p>
@@ -4795,7 +4795,7 @@
           <a:p>
             <a:fld id="{A73D0D99-86C5-4560-B8F4-5530516C9A59}" type="datetimeFigureOut">
               <a:rPr lang="pt-PT" smtClean="0"/>
-              <a:t>06/12/2023</a:t>
+              <a:t>07/12/2023</a:t>
             </a:fld>
             <a:endParaRPr lang="pt-PT"/>
           </a:p>
@@ -5635,7 +5635,7 @@
           <a:p>
             <a:fld id="{A73D0D99-86C5-4560-B8F4-5530516C9A59}" type="datetimeFigureOut">
               <a:rPr lang="pt-PT" smtClean="0"/>
-              <a:t>06/12/2023</a:t>
+              <a:t>07/12/2023</a:t>
             </a:fld>
             <a:endParaRPr lang="pt-PT"/>
           </a:p>
@@ -5862,7 +5862,7 @@
           <a:p>
             <a:fld id="{A73D0D99-86C5-4560-B8F4-5530516C9A59}" type="datetimeFigureOut">
               <a:rPr lang="pt-PT" smtClean="0"/>
-              <a:t>06/12/2023</a:t>
+              <a:t>07/12/2023</a:t>
             </a:fld>
             <a:endParaRPr lang="pt-PT"/>
           </a:p>
@@ -7485,7 +7485,7 @@
             <a:pPr algn="just"/>
             <a:r>
               <a:rPr lang="en-GB" dirty="0"/>
-              <a:t>To achieve the final prediction, we made predictions on the players’ EFF and DPR, so that we could predict their performance.</a:t>
+              <a:t>To achieve the final prediction (playoffs), we made predictions on the players’ EFF and DPR, so that we could predict their individual performance.</a:t>
             </a:r>
           </a:p>
           <a:p>
@@ -10367,7 +10367,7 @@
         </p:nvSpPr>
         <p:spPr>
           <a:xfrm>
-            <a:off x="1251678" y="1744825"/>
+            <a:off x="1251678" y="1632204"/>
             <a:ext cx="10178322" cy="3593591"/>
           </a:xfrm>
         </p:spPr>
@@ -10377,7 +10377,7 @@
           <a:p>
             <a:r>
               <a:rPr lang="en-US" dirty="0"/>
-              <a:t>The main goal of our project was to predict which teams go to the playoff, and for that the model that had the highest accuracy, was the ‘Lasso Regression Model’, with None Scaler.</a:t>
+              <a:t>The main goal of our project was to predict which teams go to the playoff, and for that the model that had the highest accuracy, was the ‘Lasso Regression Model’, with no Scaler applied to it.</a:t>
             </a:r>
           </a:p>
         </p:txBody>
@@ -10630,13 +10630,13 @@
           <a:p>
             <a:r>
               <a:rPr lang="en-US" dirty="0"/>
-              <a:t>As we can see, with None Scaler, it obtained an accuracy of nearly 0.85 and values of Precision, Recall, and F1 Score of 0.875.</a:t>
+              <a:t>As we can see, with no (None) Scaler, it obtained an accuracy of nearly 0.85 and values of Precision, Recall, and F1 Score of 0.875.</a:t>
             </a:r>
           </a:p>
           <a:p>
             <a:r>
               <a:rPr lang="en-US" dirty="0"/>
-              <a:t>This accuracy is very good, given that we must predict the first 8 teams of 12, and one wrong prediction has a large effect on the final accuracy.</a:t>
+              <a:t>These results are very good, given that we must predict the first 8 teams of 12, and one wrong prediction has a large effect on the final results.</a:t>
             </a:r>
             <a:endParaRPr lang="pt-PT" dirty="0"/>
           </a:p>
@@ -10923,9 +10923,16 @@
             <p:ph idx="1"/>
           </p:nvPr>
         </p:nvSpPr>
-        <p:spPr/>
+        <p:spPr>
+          <a:xfrm>
+            <a:off x="1251678" y="2286001"/>
+            <a:ext cx="10178322" cy="3847380"/>
+          </a:xfrm>
+        </p:spPr>
         <p:txBody>
-          <a:bodyPr/>
+          <a:bodyPr>
+            <a:normAutofit lnSpcReduction="10000"/>
+          </a:bodyPr>
           <a:lstStyle/>
           <a:p>
             <a:pPr marL="0" indent="0" algn="just">
@@ -10933,7 +10940,25 @@
             </a:pPr>
             <a:r>
               <a:rPr lang="en-US" dirty="0"/>
-              <a:t>In the competitive landscape of professional sports, the ability to accurately predict which WNBA teams are likely to qualify for the playoffs holds immense strategic importance for various stakeholders. This machine learning project leverages Python and the scikit-learn library to develop a predictive model that assists decision-makers in anticipating the postseason fate of WNBA teams. By analyzing historical data, player statistics, team performance metrics, and other relevant factors, the project aims to provide valuable insights into the potential success of a team in making it to the playoffs.</a:t>
+              <a:t>In the competitive landscape of professional sports, the ability to accurately predict which WNBA teams are likely to qualify for the playoffs holds immense strategic importance for various stakeholders. </a:t>
+            </a:r>
+          </a:p>
+          <a:p>
+            <a:pPr marL="0" indent="0" algn="just">
+              <a:buNone/>
+            </a:pPr>
+            <a:r>
+              <a:rPr lang="en-US" dirty="0"/>
+              <a:t>This machine learning project leverages Python and the scikit-learn library to develop a predictive model that assists decision-makers in anticipating the postseason fate of WNBA teams. By analyzing historical data, player statistics, team performance metrics, and other relevant factors, the project aims to provide valuable insights into the potential success of a team in making it to the playoffs.</a:t>
+            </a:r>
+          </a:p>
+          <a:p>
+            <a:pPr marL="0" indent="0" algn="just">
+              <a:buNone/>
+            </a:pPr>
+            <a:r>
+              <a:rPr lang="en-US" dirty="0"/>
+              <a:t>For additional comprehension of the concepts used in the business, we searched the web (including the NBA official glossary) and compiled a file (Legend.md) with details about each metric that was provided in the initial dataset.</a:t>
             </a:r>
             <a:endParaRPr lang="en-GB" dirty="0"/>
           </a:p>
@@ -11042,11 +11067,11 @@
             </a:pPr>
             <a:r>
               <a:rPr lang="en-US" u="sng" dirty="0"/>
-              <a:t>Business Goal: </a:t>
+              <a:t>Business Goal:</a:t>
             </a:r>
             <a:r>
               <a:rPr lang="en-US" dirty="0"/>
-              <a:t>Collect and preprocess historical WNBA team and player data, including game statistics, player performance metrics, and team records, to create a comprehensive dataset for model training.</a:t>
+              <a:t> Collect and preprocess historical WNBA team and player data, including game statistics, player performance metrics, and team records, to create a comprehensive dataset for model training.</a:t>
             </a:r>
           </a:p>
           <a:p>
@@ -11055,11 +11080,11 @@
             </a:pPr>
             <a:r>
               <a:rPr lang="en-US" u="sng" dirty="0"/>
-              <a:t>Model Goal: </a:t>
+              <a:t>Model Goal:</a:t>
             </a:r>
             <a:r>
               <a:rPr lang="en-US" dirty="0"/>
-              <a:t>Develop a predictive model using scikit-learn algorithms that effectively analyzes historical data and generates accurate predictions for playoff qualification.</a:t>
+              <a:t> Develop a predictive model using scikit-learn algorithms that effectively analyze historical data and generate accurate predictions for playoff qualification.</a:t>
             </a:r>
           </a:p>
           <a:p>
@@ -11091,11 +11116,11 @@
             </a:pPr>
             <a:r>
               <a:rPr lang="en-US" u="sng" dirty="0"/>
-              <a:t>Data Goal</a:t>
+              <a:t>Data Goal:</a:t>
             </a:r>
             <a:r>
               <a:rPr lang="en-US" dirty="0"/>
-              <a:t>: Gather data on long-term player development, draft outcomes, and coaching strategies to create a dataset that supports strategic planning for team improvement and success.</a:t>
+              <a:t> Gather data on long-term player development, draft outcomes, and coaching strategies to create a dataset that supports strategic planning for team improvement and success.</a:t>
             </a:r>
           </a:p>
           <a:p>
@@ -11444,7 +11469,7 @@
           <p:nvPr>
             <p:extLst>
               <p:ext uri="{D42A27DB-BD31-4B8C-83A1-F6EECF244321}">
-                <p14:modId xmlns:p14="http://schemas.microsoft.com/office/powerpoint/2010/main" val="3565553112"/>
+                <p14:modId xmlns:p14="http://schemas.microsoft.com/office/powerpoint/2010/main" val="690834194"/>
               </p:ext>
             </p:extLst>
           </p:nvPr>
@@ -11511,7 +11536,7 @@
                       </a:r>
                       <a:r>
                         <a:rPr lang="pt-PT" sz="1400" dirty="0" err="1"/>
-                        <a:t>Nan</a:t>
+                        <a:t>NaN</a:t>
                       </a:r>
                       <a:r>
                         <a:rPr lang="pt-PT" sz="1400" dirty="0"/>
@@ -12151,7 +12176,15 @@
             <a:pPr lvl="1"/>
             <a:r>
               <a:rPr lang="en-US" dirty="0"/>
-              <a:t>For the ‘pos’ column, we dropped the Nan values and kept the others. This approach is justified by the fact that if a player does not have a position in the team, it is probably an error and should not be considered.</a:t>
+              <a:t>For the ‘pos’ column, we dropped the </a:t>
+            </a:r>
+            <a:r>
+              <a:rPr lang="en-US" dirty="0" err="1"/>
+              <a:t>NaN</a:t>
+            </a:r>
+            <a:r>
+              <a:rPr lang="en-US" dirty="0"/>
+              <a:t> values and kept the others. This approach is justified by the fact that if a player does not have a position in the team, it is probably an error and should not be considered.</a:t>
             </a:r>
           </a:p>
           <a:p>
@@ -12592,18 +12625,9 @@
           <a:lstStyle/>
           <a:p>
             <a:r>
-              <a:rPr lang="pt-PT" sz="4500" dirty="0" err="1"/>
-              <a:t>Domain</a:t>
-            </a:r>
-            <a:r>
-              <a:rPr lang="pt-PT" sz="4500" dirty="0"/>
-              <a:t> </a:t>
-            </a:r>
-            <a:r>
-              <a:rPr lang="pt-PT" sz="4500" dirty="0" err="1"/>
-              <a:t>description</a:t>
-            </a:r>
-            <a:endParaRPr lang="pt-PT" sz="4500" dirty="0"/>
+              <a:rPr lang="en-US" sz="4500" dirty="0"/>
+              <a:t>Domain description</a:t>
+            </a:r>
           </a:p>
         </p:txBody>
       </p:sp>
@@ -12884,7 +12908,7 @@
         </p:nvSpPr>
         <p:spPr>
           <a:xfrm>
-            <a:off x="1251678" y="4525348"/>
+            <a:off x="1251678" y="4618654"/>
             <a:ext cx="10178322" cy="2332652"/>
           </a:xfrm>
           <a:prstGeom prst="rect">
@@ -15150,14 +15174,14 @@
             <a:pPr algn="just"/>
             <a:r>
               <a:rPr lang="en-US" dirty="0"/>
-              <a:t>In this project, we did not use the Hold-out methodology for evaluating our models since this technique does not provide sufficient data for training and testing the models. For this reason, we applied the Stratified K Folding methodology. However, the standard implementation of this technique is not suitable for the problem at hand since it splits the data regardless of its semantical meaning. </a:t>
+              <a:t>In this project, we did not use the Hold-out methodology for evaluating our models since this technique does not provide sufficient data for training and testing them. For this reason, we applied the Stratified K Folding methodology. However, the standard implementation of this technique is not suitable for the problem at hand since it splits the data regardless of its semantical meaning. </a:t>
             </a:r>
           </a:p>
           <a:p>
             <a:pPr algn="just"/>
             <a:r>
               <a:rPr lang="en-US" dirty="0"/>
-              <a:t>In this case, a likely scenario would be, for example, training the model with portions of data from seasons 5 and 8, but testing would be done with the complete data from season 7.  This is not a realistic scenario; therefore, it cannot be used to train and evaluate our models.</a:t>
+              <a:t>In this case, a likely scenario would be, for example, training the model with random portions of data from seasons 5 and 8, but testing would be done with the complete data from season 7.  This is not a realistic scenario; therefore, it cannot be used to train and evaluate our models.</a:t>
             </a:r>
           </a:p>
         </p:txBody>
@@ -15400,14 +15424,14 @@
             <a:pPr algn="just"/>
             <a:r>
               <a:rPr lang="en-US" dirty="0"/>
-              <a:t>As we mentioned before, we created Lagged Features, so that, for each feature, we added the information of the previous X years, being X the length of the sliding window.  We did this because it would improve both the accuracy and efficiency of the model.</a:t>
+              <a:t>As we mentioned before, we created Lagged Features: for each feature, we added the information of the previous X years, being X the length of the sliding window.  We did this because it would improve both the accuracy and efficiency of the model.</a:t>
             </a:r>
           </a:p>
           <a:p>
             <a:pPr algn="just"/>
             <a:r>
               <a:rPr lang="en-US" dirty="0"/>
-              <a:t>When we tested, we concluded exactly that so, for the other metrics that we created after to be used in the models, we kept doing that and creating the lagged features using the shift function, which made our work easier.</a:t>
+              <a:t>When we tested the model, we concluded exactly that, therefore, for the other metrics that we created after to be used in the models, we kept doing that and creating the lagged features using the shift function, which made our work more accurate and robust.</a:t>
             </a:r>
           </a:p>
           <a:p>
@@ -15512,19 +15536,19 @@
         <p:spPr>
           <a:xfrm>
             <a:off x="929944" y="1562101"/>
-            <a:ext cx="10703255" cy="4571999"/>
+            <a:ext cx="10703255" cy="5011227"/>
           </a:xfrm>
         </p:spPr>
         <p:txBody>
           <a:bodyPr>
-            <a:normAutofit fontScale="85000" lnSpcReduction="20000"/>
+            <a:normAutofit fontScale="92500" lnSpcReduction="20000"/>
           </a:bodyPr>
           <a:lstStyle/>
           <a:p>
             <a:pPr algn="just"/>
             <a:r>
               <a:rPr lang="en-US" dirty="0"/>
-              <a:t>In the upcoming slide, we will enumerate the Machine Learning (ML) models utilized for predicting the qualification of basketball teams for the playoffs.</a:t>
+              <a:t>In the upcoming slide, we will enumerate the Machine Learning (ML) models employed for predicting the qualification of basketball teams for the playoffs.</a:t>
             </a:r>
           </a:p>
           <a:p>
@@ -15915,15 +15939,22 @@
             <p:ph idx="1"/>
           </p:nvPr>
         </p:nvSpPr>
-        <p:spPr/>
+        <p:spPr>
+          <a:xfrm>
+            <a:off x="1251678" y="2286001"/>
+            <a:ext cx="10178322" cy="4002656"/>
+          </a:xfrm>
+        </p:spPr>
         <p:txBody>
-          <a:bodyPr/>
+          <a:bodyPr>
+            <a:normAutofit lnSpcReduction="10000"/>
+          </a:bodyPr>
           <a:lstStyle/>
           <a:p>
             <a:pPr algn="just"/>
             <a:r>
               <a:rPr lang="en-US" dirty="0"/>
-              <a:t>Given that the output of a Machine Learning algorithm is intricately tied to the input data it receives, we embarked on an exploration of diverse data normalization techniques. Our aim was to assess the impact of these normalization methods on the performance of each model.</a:t>
+              <a:t>Given that the output of a Machine Learning algorithm is intricately tied to the quality of the input data it receives, we embarked on an exploration of diverse data normalization techniques. Our aim was to assess the impact of these normalization methods on the performance of each model.</a:t>
             </a:r>
           </a:p>
           <a:p>
@@ -15974,6 +16005,13 @@
             <a:r>
               <a:rPr lang="en-US" dirty="0"/>
               <a:t>Normalizer</a:t>
+            </a:r>
+          </a:p>
+          <a:p>
+            <a:pPr lvl="1" algn="just"/>
+            <a:r>
+              <a:rPr lang="en-US" dirty="0"/>
+              <a:t>None (represents the values obtained without using a Scaler)</a:t>
             </a:r>
           </a:p>
         </p:txBody>
@@ -16308,7 +16346,7 @@
             </a:pPr>
             <a:r>
               <a:rPr lang="en-US" sz="1800" dirty="0"/>
-              <a:t>There are teams with different coaches over the 10 years, however, a few kept the same coach. There are also teams that switched coaches during a season.</a:t>
+              <a:t>There have been teams with different coaches over the 10 years, however, a few kept the same coach. There are also teams that switch coaches during a season.</a:t>
             </a:r>
           </a:p>
           <a:p>
@@ -17226,7 +17264,7 @@
             </a:r>
             <a:r>
               <a:rPr lang="en-US" dirty="0"/>
-              <a:t>consistently achieve high scores across all Scalers, with accuracy, recall, precision, and F1 score of 0.625 or higher.</a:t>
+              <a:t>consistently achieve high scores across all Scalers, with accuracy, recall, precision, and an F1 score of 0.625 or higher.</a:t>
             </a:r>
           </a:p>
           <a:p>
@@ -17256,7 +17294,7 @@
             </a:r>
             <a:r>
               <a:rPr lang="en-US" dirty="0"/>
-              <a:t>achieves the highest accuracy and F1 score among all regression models, indicating strong overall predictive capability. Furthermore, the best result was obtained without using a Scaler, due to the fact that Lasso already performs regularization. This result can be explained by the following reasons:</a:t>
+              <a:t>achieves the highest accuracy and F1 score among all regression models, indicating strong overall predictive capability. Furthermore, the best result was obtained without using a Scaler, since Lasso already performs regularization.  This result can be explained by the following reasons:</a:t>
             </a:r>
           </a:p>
           <a:p>
@@ -17277,7 +17315,7 @@
             <a:pPr lvl="1" algn="just"/>
             <a:r>
               <a:rPr lang="en-US" dirty="0"/>
-              <a:t>Overfitting is prevented by applying penalties to the magnitude of coefficients, so that the model does not fit to noise</a:t>
+              <a:t>Overfitting is prevented by applying penalties to the magnitude of coefficients so that the model does not fit to noise</a:t>
             </a:r>
           </a:p>
           <a:p>
@@ -17294,7 +17332,7 @@
             </a:r>
             <a:r>
               <a:rPr lang="en-US" dirty="0"/>
-              <a:t>demonstrates competitive performance with high accuracy, recall, precision, and an F1 score under the Normalizer Scaler.</a:t>
+              <a:t>demonstrates competitive performance with high accuracy, recall, precision, and an F1 score with the Normalizer Scaler.</a:t>
             </a:r>
           </a:p>
           <a:p>
@@ -17795,7 +17833,7 @@
           <a:p>
             <a:r>
               <a:rPr lang="en-US" dirty="0"/>
-              <a:t>By using the individual games in the </a:t>
+              <a:t>By using the data of individual games in the </a:t>
             </a:r>
             <a:r>
               <a:rPr lang="en-US" dirty="0" err="1"/>
@@ -18384,14 +18422,21 @@
             <p:ph idx="1"/>
           </p:nvPr>
         </p:nvSpPr>
-        <p:spPr/>
+        <p:spPr>
+          <a:xfrm>
+            <a:off x="1251678" y="1751374"/>
+            <a:ext cx="10178322" cy="3593591"/>
+          </a:xfrm>
+        </p:spPr>
         <p:txBody>
-          <a:bodyPr/>
+          <a:bodyPr>
+            <a:normAutofit/>
+          </a:bodyPr>
           <a:lstStyle/>
           <a:p>
             <a:r>
               <a:rPr lang="en-US" dirty="0"/>
-              <a:t>To make this project, we used different technologies like libraries to draw plots or libraries specific for Machine Learning:</a:t>
+              <a:t>To develop this project, we used different technologies like libraries to draw plots or libraries specific for Machine Learning:</a:t>
             </a:r>
           </a:p>
           <a:p>
@@ -18416,16 +18461,16 @@
           <a:p>
             <a:pPr lvl="1"/>
             <a:r>
-              <a:rPr lang="en-US" b="1" dirty="0" err="1"/>
-              <a:t>SciKit</a:t>
-            </a:r>
-            <a:r>
-              <a:rPr lang="en-US" b="1" dirty="0"/>
-              <a:t> Learn </a:t>
+              <a:rPr lang="en-US" b="1"/>
+              <a:t>scikit-learn </a:t>
+            </a:r>
+            <a:r>
+              <a:rPr lang="en-US"/>
+              <a:t>– </a:t>
             </a:r>
             <a:r>
               <a:rPr lang="en-US" dirty="0"/>
-              <a:t>– Machine  Learning</a:t>
+              <a:t>Machine Learning models</a:t>
             </a:r>
           </a:p>
           <a:p>
@@ -18480,6 +18525,26 @@
               <a:rPr lang="en-US" dirty="0"/>
               <a:t> – Mathematical Functions</a:t>
             </a:r>
+          </a:p>
+          <a:p>
+            <a:pPr lvl="1"/>
+            <a:r>
+              <a:rPr lang="en-GB" b="1" dirty="0" err="1"/>
+              <a:t>YData</a:t>
+            </a:r>
+            <a:r>
+              <a:rPr lang="en-GB" b="1" dirty="0"/>
+              <a:t> Profiling </a:t>
+            </a:r>
+            <a:r>
+              <a:rPr lang="en-GB" dirty="0"/>
+              <a:t>– Comprehensive analysis of the initial dataset</a:t>
+            </a:r>
+            <a:endParaRPr lang="en-US" dirty="0"/>
+          </a:p>
+          <a:p>
+            <a:pPr lvl="1"/>
+            <a:endParaRPr lang="en-US" dirty="0"/>
           </a:p>
         </p:txBody>
       </p:sp>
@@ -18512,7 +18577,7 @@
         </p:blipFill>
         <p:spPr bwMode="auto">
           <a:xfrm>
-            <a:off x="1251678" y="5550707"/>
+            <a:off x="1296735" y="5550707"/>
             <a:ext cx="2839452" cy="1146872"/>
           </a:xfrm>
           <a:prstGeom prst="rect">
@@ -20486,7 +20551,7 @@
             </a:r>
             <a:r>
               <a:rPr lang="en-US" sz="1800" dirty="0"/>
-              <a:t>. Basketball tournaments are traditionally divided into two phases: the standard season, where teams compete to accumulate the highest number of wins and the playoffs, featuring knockout matches for the championship. The objective of this project is to </a:t>
+              <a:t>. Basketball tournaments are traditionally divided into two phases: the standard season, where teams compete to accumulate the highest number of wins, and the playoffs, featuring knockout matches for the championship. The objective of this project is to </a:t>
             </a:r>
             <a:r>
               <a:rPr lang="en-US" sz="1800" b="1" dirty="0"/>
@@ -20657,7 +20722,7 @@
             </a:r>
             <a:r>
               <a:rPr lang="en-US" dirty="0"/>
-              <a:t> of well-known player evaluation metrics, such as, </a:t>
+              <a:t> of well-known player evaluation metrics, such as </a:t>
             </a:r>
             <a:r>
               <a:rPr lang="en-US" b="1" dirty="0"/>
@@ -20680,7 +20745,7 @@
             <a:pPr algn="just"/>
             <a:r>
               <a:rPr lang="en-US" b="1" dirty="0"/>
-              <a:t>Prediction of every teams’ results</a:t>
+              <a:t>Prediction of every team’s results</a:t>
             </a:r>
             <a:r>
               <a:rPr lang="en-US" dirty="0"/>
@@ -20840,7 +20905,7 @@
             </a:r>
             <a:r>
               <a:rPr lang="en-US" sz="1400" dirty="0"/>
-              <a:t>, </a:t>
+              <a:t>, rows of column “pos” with </a:t>
             </a:r>
             <a:r>
               <a:rPr lang="en-US" sz="1400" dirty="0" err="1"/>
@@ -20848,7 +20913,7 @@
             </a:r>
             <a:r>
               <a:rPr lang="en-US" sz="1400" dirty="0"/>
-              <a:t> pos, </a:t>
+              <a:t> values, </a:t>
             </a:r>
             <a:r>
               <a:rPr lang="en-US" sz="1400" dirty="0" err="1"/>
@@ -20879,7 +20944,7 @@
             </a:r>
             <a:r>
               <a:rPr lang="en-US" sz="1400" dirty="0"/>
-              <a:t> = 0000-00-00;</a:t>
+              <a:t> = 0000-00-00, since this is clearly a mistake;</a:t>
             </a:r>
           </a:p>
           <a:p>
@@ -21258,11 +21323,11 @@
             </a:r>
             <a:r>
               <a:rPr lang="en-US" sz="1400" i="1" dirty="0"/>
-              <a:t>coaches</a:t>
+              <a:t>coaches: </a:t>
             </a:r>
             <a:r>
               <a:rPr lang="en-US" sz="1400" dirty="0"/>
-              <a:t> (‘</a:t>
+              <a:t>‘</a:t>
             </a:r>
             <a:r>
               <a:rPr lang="en-US" sz="1400" dirty="0" err="1"/>
@@ -21278,7 +21343,7 @@
             </a:r>
             <a:r>
               <a:rPr lang="en-US" sz="1400" dirty="0"/>
-              <a:t>’).</a:t>
+              <a:t>’, representing the Win/Loss ratio in the standard season and in the postseason.</a:t>
             </a:r>
           </a:p>
           <a:p>

</xml_diff>